<commit_message>
Added Learned Folder + Jordan.txt For It
</commit_message>
<xml_diff>
--- a/Group Project.pptx
+++ b/Group Project.pptx
@@ -23616,8 +23616,8 @@
         </p:nvSpPr>
         <p:spPr>
           <a:xfrm>
-            <a:off x="5232401" y="180975"/>
-            <a:ext cx="6140449" cy="6438900"/>
+            <a:off x="5224463" y="92197"/>
+            <a:ext cx="6140449" cy="6601565"/>
           </a:xfrm>
         </p:spPr>
         <p:txBody>
@@ -23634,7 +23634,7 @@
                   </a:schemeClr>
                 </a:solidFill>
               </a:rPr>
-              <a:t>This game idea was inspired by the game: Sonic Adventure 2: Battle. In this game, every zone the player enters will be a “dome”. These rooms vary in sizes and tries to capture the idea of somehow being “open-world” by showing the player a much larger world outside of the dome.</a:t>
+              <a:t>This game idea was inspired by the game: Sonic Adventure 2: Battle. In this game, every zone the player enters will be a “dome”. These domes vary in sizes and tries to capture the idea of somehow being “open-world” by showing the player a much larger world outside of the dome.</a:t>
             </a:r>
           </a:p>
           <a:p>
@@ -23658,7 +23658,7 @@
                   </a:schemeClr>
                 </a:solidFill>
               </a:rPr>
-              <a:t>The current thoughts on these domes will be three gardens for the dragons: Haven, Hell, and Peace. Other doors will be a lot different than these gardens, as they will be full of nature which include trees, water, rocks, plants, dragons, and dragon nests containing eggs. Inside these gardens you will be able to feed your dragons to improve their stats (these will be discussed later).</a:t>
+              <a:t>The current thoughts on these domes will be three gardens for the dragons: Haven, Hell, and Peace which are unlocked based on the evolution of your dragon. For instance, if your baby dragon evolves into an evil dragon, then you unlocked Hell as a garden. Other doors will be a lot different than these gardens, as they will be full of nature consisting of: trees, water, rocks, plants, dragons, and dragon nests containing eggs. Inside these gardens you will be able to feed your dragons to improve their stats (these will be discussed later).</a:t>
             </a:r>
           </a:p>
           <a:p>
@@ -23670,7 +23670,7 @@
                   </a:schemeClr>
                 </a:solidFill>
               </a:rPr>
-              <a:t>The other doors will include schooling to teach the dragons how to do different actions such as music or drawing, NPC vendors that allow purchasing of different eggs, seeds (for plants and trees), and fruits, doctor, name changer, arena for dragon combat, and whatever comes to mind. The options are truly endless!</a:t>
+              <a:t>The other doors will include: schooling to teach the dragons how to do different actions such as music or drawing, NPC vendors that allow purchasing of different eggs, seeds (for plants and trees), fruits, a Doctor NPC, a name changer NPC, an arena for dragon combat, and whatever comes to mind. The options are truly endless!</a:t>
             </a:r>
           </a:p>
           <a:p>
@@ -23694,7 +23694,7 @@
                   </a:schemeClr>
                 </a:solidFill>
               </a:rPr>
-              <a:t>These dragons can breed with other dragons and considering life today gender will not matter but we can still include gender. The stats will have ranks that can be displayed in someway and these affect the “level value”. Level value will be seen in the next slide. In breeding you can expect the offspring to have a little bit of every random values from the parents. These traits will not follow the rules of genetics in real life, but instead completely randomized. As an example, the swimming grade of one parent is ranked an A and the other parent a C. The offspring will compare these two and randomly choose which one to acquire.</a:t>
+              <a:t>These dragons can breed with other dragons and considering life today gender will not matter but we can still include gender. The stats will have ranks that can be displayed in someway and these affect the “level value”. Level value will be seen in the next slide. In breeding you can expect the offspring to have a little bit of every random values from the parents. These traits will not follow the rules of genetics in real life, but instead completely randomized. As an example, the swimming grade of one parent is ranked an A and the other parent a C. The offspring will compare these two and randomly choose which one to acquire for swimming.</a:t>
             </a:r>
           </a:p>
           <a:p>
@@ -33658,7 +33658,7 @@
           <a:lstStyle/>
           <a:p>
             <a:r>
-              <a:rPr lang="en-US" sz="1400">
+              <a:rPr lang="en-US" sz="1400" dirty="0">
                 <a:solidFill>
                   <a:schemeClr val="bg1"/>
                 </a:solidFill>
@@ -33668,7 +33668,7 @@
           </a:p>
           <a:p>
             <a:r>
-              <a:rPr lang="en-US" sz="1400">
+              <a:rPr lang="en-US" sz="1400" dirty="0">
                 <a:solidFill>
                   <a:schemeClr val="bg1"/>
                 </a:solidFill>
@@ -33678,7 +33678,7 @@
           </a:p>
           <a:p>
             <a:r>
-              <a:rPr lang="en-US" sz="1400">
+              <a:rPr lang="en-US" sz="1400" dirty="0">
                 <a:solidFill>
                   <a:schemeClr val="bg1"/>
                 </a:solidFill>
@@ -33688,19 +33688,115 @@
           </a:p>
           <a:p>
             <a:r>
-              <a:rPr lang="en-US" sz="1400">
+              <a:rPr lang="en-US" sz="1400" dirty="0">
                 <a:solidFill>
                   <a:schemeClr val="bg1"/>
                 </a:solidFill>
               </a:rPr>
-              <a:t>Here’s an example: Hunter is working on the player’s movement, and I am working on the map. Therefore, Hunter’s branch will be called PlayerMovement and my branch will be PlayerCollision. We both finish our projects and push them onto the feature branch only to find that we have problems because the player’s movement interferes with the world! How do we solve this issue? Hunter’s branch should be named PlayerMovement / PlayerCollision and I should have a completely unrelated project, SaveData / LoadData.</a:t>
+              <a:t>Here’s an example: Hunter is working on the player’s movement, and I am working on the map. Therefore, Hunter’s branch will be called </a:t>
+            </a:r>
+            <a:r>
+              <a:rPr lang="en-US" sz="1400" dirty="0" err="1">
+                <a:solidFill>
+                  <a:schemeClr val="bg1"/>
+                </a:solidFill>
+              </a:rPr>
+              <a:t>PlayerMovement</a:t>
+            </a:r>
+            <a:r>
+              <a:rPr lang="en-US" sz="1400" dirty="0">
+                <a:solidFill>
+                  <a:schemeClr val="bg1"/>
+                </a:solidFill>
+              </a:rPr>
+              <a:t> and my branch will be </a:t>
+            </a:r>
+            <a:r>
+              <a:rPr lang="en-US" sz="1400" dirty="0" err="1">
+                <a:solidFill>
+                  <a:schemeClr val="bg1"/>
+                </a:solidFill>
+              </a:rPr>
+              <a:t>PlayerCollision</a:t>
+            </a:r>
+            <a:r>
+              <a:rPr lang="en-US" sz="1400" dirty="0">
+                <a:solidFill>
+                  <a:schemeClr val="bg1"/>
+                </a:solidFill>
+              </a:rPr>
+              <a:t>. We both finish our projects and push them onto the feature branch only to find that we have problems because the player’s movement interferes with the world! How do we solve this issue? Hunter’s branch should be named </a:t>
+            </a:r>
+            <a:r>
+              <a:rPr lang="en-US" sz="1400" dirty="0" err="1">
+                <a:solidFill>
+                  <a:schemeClr val="bg1"/>
+                </a:solidFill>
+              </a:rPr>
+              <a:t>PlayerMovement</a:t>
+            </a:r>
+            <a:r>
+              <a:rPr lang="en-US" sz="1400" dirty="0">
+                <a:solidFill>
+                  <a:schemeClr val="bg1"/>
+                </a:solidFill>
+              </a:rPr>
+              <a:t> / </a:t>
+            </a:r>
+            <a:r>
+              <a:rPr lang="en-US" sz="1400" dirty="0" err="1">
+                <a:solidFill>
+                  <a:schemeClr val="bg1"/>
+                </a:solidFill>
+              </a:rPr>
+              <a:t>PlayerCollision</a:t>
+            </a:r>
+            <a:r>
+              <a:rPr lang="en-US" sz="1400" dirty="0">
+                <a:solidFill>
+                  <a:schemeClr val="bg1"/>
+                </a:solidFill>
+              </a:rPr>
+              <a:t> and I should have a completely unrelated project, </a:t>
+            </a:r>
+            <a:r>
+              <a:rPr lang="en-US" sz="1400" dirty="0" err="1">
+                <a:solidFill>
+                  <a:schemeClr val="bg1"/>
+                </a:solidFill>
+              </a:rPr>
+              <a:t>SaveData</a:t>
+            </a:r>
+            <a:r>
+              <a:rPr lang="en-US" sz="1400" dirty="0">
+                <a:solidFill>
+                  <a:schemeClr val="bg1"/>
+                </a:solidFill>
+              </a:rPr>
+              <a:t> / </a:t>
+            </a:r>
+            <a:r>
+              <a:rPr lang="en-US" sz="1400" dirty="0" err="1">
+                <a:solidFill>
+                  <a:schemeClr val="bg1"/>
+                </a:solidFill>
+              </a:rPr>
+              <a:t>LoadData</a:t>
+            </a:r>
+            <a:r>
+              <a:rPr lang="en-US" sz="1400" dirty="0">
+                <a:solidFill>
+                  <a:schemeClr val="bg1"/>
+                </a:solidFill>
+              </a:rPr>
+              <a:t>.</a:t>
             </a:r>
           </a:p>
           <a:p>
             <a:pPr marL="0" indent="0">
               <a:buNone/>
             </a:pPr>
-            <a:endParaRPr lang="en-US" sz="1400">
+            <a:endParaRPr lang="en-US" sz="1400" dirty="0">
               <a:solidFill>
                 <a:schemeClr val="bg1"/>
               </a:solidFill>
@@ -35870,7 +35966,7 @@
     <p:bg>
       <p:bgPr>
         <a:solidFill>
-          <a:schemeClr val="bg1"/>
+          <a:schemeClr val="bg2"/>
         </a:solidFill>
         <a:effectLst/>
       </p:bgPr>
@@ -35889,12 +35985,12 @@
           <a:chExt cx="0" cy="0"/>
         </a:xfrm>
       </p:grpSpPr>
-      <p:sp useBgFill="1">
+      <p:sp>
         <p:nvSpPr>
-          <p:cNvPr id="18" name="Rectangle 17">
+          <p:cNvPr id="27" name="Rectangle 26">
             <a:extLst>
               <a:ext uri="{FF2B5EF4-FFF2-40B4-BE49-F238E27FC236}">
-                <a16:creationId xmlns:a16="http://schemas.microsoft.com/office/drawing/2014/main" id="{73AD41DB-DF9F-49BC-85AE-6AB1840AD517}"/>
+                <a16:creationId xmlns:a16="http://schemas.microsoft.com/office/drawing/2014/main" id="{BEE73255-8084-4DF9-BB0B-15EAC92E2CB9}"/>
               </a:ext>
               <a:ext uri="{C183D7F6-B498-43B3-948B-1728B52AA6E4}">
                 <adec:decorative xmlns:adec="http://schemas.microsoft.com/office/drawing/2017/decorative" val="1"/>
@@ -35921,14 +36017,11 @@
             <a:avLst/>
           </a:prstGeom>
           <a:solidFill>
-            <a:schemeClr val="tx1"/>
+            <a:srgbClr val="C8CACA"/>
           </a:solidFill>
-          <a:ln w="12700" cap="flat" cmpd="sng" algn="ctr">
+          <a:ln>
             <a:noFill/>
-            <a:prstDash val="solid"/>
-            <a:miter lim="800000"/>
           </a:ln>
-          <a:effectLst/>
         </p:spPr>
         <p:style>
           <a:lnRef idx="2">
@@ -35973,24 +36066,98 @@
         </p:nvSpPr>
         <p:spPr>
           <a:xfrm>
-            <a:off x="866774" y="4605445"/>
-            <a:ext cx="4978659" cy="1330772"/>
+            <a:off x="603938" y="640081"/>
+            <a:ext cx="2608655" cy="5257799"/>
           </a:xfrm>
         </p:spPr>
         <p:txBody>
-          <a:bodyPr anchor="t">
+          <a:bodyPr vert="horz" lIns="91440" tIns="45720" rIns="91440" bIns="45720" rtlCol="0" anchor="ctr">
             <a:normAutofit/>
           </a:bodyPr>
           <a:lstStyle/>
           <a:p>
             <a:r>
-              <a:rPr lang="en-US" sz="4300" dirty="0">
+              <a:rPr lang="en-US" sz="3600">
                 <a:solidFill>
-                  <a:schemeClr val="bg1"/>
+                  <a:srgbClr val="2C2C2C"/>
                 </a:solidFill>
               </a:rPr>
               <a:t>Trello Suggestion #1: Learning Format</a:t>
             </a:r>
+          </a:p>
+        </p:txBody>
+      </p:sp>
+      <p:sp>
+        <p:nvSpPr>
+          <p:cNvPr id="29" name="Rounded Rectangle 9">
+            <a:extLst>
+              <a:ext uri="{FF2B5EF4-FFF2-40B4-BE49-F238E27FC236}">
+                <a16:creationId xmlns:a16="http://schemas.microsoft.com/office/drawing/2014/main" id="{67048353-8981-459A-9BC6-9711CE462E06}"/>
+              </a:ext>
+              <a:ext uri="{C183D7F6-B498-43B3-948B-1728B52AA6E4}">
+                <adec:decorative xmlns:adec="http://schemas.microsoft.com/office/drawing/2017/decorative" val="1"/>
+              </a:ext>
+            </a:extLst>
+          </p:cNvPr>
+          <p:cNvSpPr>
+            <a:spLocks noGrp="1" noRot="1" noChangeAspect="1" noMove="1" noResize="1" noEditPoints="1" noAdjustHandles="1" noChangeArrowheads="1" noChangeShapeType="1" noTextEdit="1"/>
+          </p:cNvSpPr>
+          <p:nvPr>
+            <p:extLst>
+              <p:ext uri="{386F3935-93C4-4BCD-93E2-E3B085C9AB24}">
+                <p16:designElem xmlns:p16="http://schemas.microsoft.com/office/powerpoint/2015/main" val="1"/>
+              </p:ext>
+            </p:extLst>
+          </p:nvPr>
+        </p:nvSpPr>
+        <p:spPr>
+          <a:xfrm>
+            <a:off x="3580067" y="484632"/>
+            <a:ext cx="8129016" cy="5724144"/>
+          </a:xfrm>
+          <a:prstGeom prst="roundRect">
+            <a:avLst>
+              <a:gd name="adj" fmla="val 0"/>
+            </a:avLst>
+          </a:prstGeom>
+          <a:solidFill>
+            <a:srgbClr val="FFFFFF"/>
+          </a:solidFill>
+          <a:ln w="9525">
+            <a:solidFill>
+              <a:srgbClr val="C8CACA"/>
+            </a:solidFill>
+          </a:ln>
+          <a:effectLst>
+            <a:outerShdw blurRad="57150" dist="19050" dir="5400000" algn="t" rotWithShape="0">
+              <a:prstClr val="black">
+                <a:alpha val="63000"/>
+              </a:prstClr>
+            </a:outerShdw>
+          </a:effectLst>
+        </p:spPr>
+        <p:style>
+          <a:lnRef idx="2">
+            <a:schemeClr val="accent1">
+              <a:shade val="50000"/>
+            </a:schemeClr>
+          </a:lnRef>
+          <a:fillRef idx="1">
+            <a:schemeClr val="accent1"/>
+          </a:fillRef>
+          <a:effectRef idx="0">
+            <a:schemeClr val="accent1"/>
+          </a:effectRef>
+          <a:fontRef idx="minor">
+            <a:schemeClr val="lt1"/>
+          </a:fontRef>
+        </p:style>
+        <p:txBody>
+          <a:bodyPr rtlCol="0" anchor="ctr"/>
+          <a:lstStyle/>
+          <a:p>
+            <a:pPr algn="ctr"/>
+            <a:endParaRPr lang="en-US"/>
           </a:p>
         </p:txBody>
       </p:sp>
@@ -36016,3861 +36183,20 @@
               </a:ext>
             </a:extLst>
           </a:blip>
-          <a:srcRect t="15338" b="14748"/>
+          <a:srcRect l="15177" r="15177"/>
           <a:stretch/>
         </p:blipFill>
         <p:spPr>
           <a:xfrm>
-            <a:off x="20" y="-1"/>
-            <a:ext cx="12191980" cy="3984912"/>
+            <a:off x="4062964" y="942538"/>
+            <a:ext cx="7163222" cy="4808332"/>
           </a:xfrm>
-          <a:custGeom>
+          <a:prstGeom prst="rect">
             <a:avLst/>
-            <a:gdLst/>
-            <a:ahLst/>
-            <a:cxnLst/>
-            <a:rect l="l" t="t" r="r" b="b"/>
-            <a:pathLst>
-              <a:path w="12192000" h="3984912">
-                <a:moveTo>
-                  <a:pt x="0" y="0"/>
-                </a:moveTo>
-                <a:lnTo>
-                  <a:pt x="12192000" y="0"/>
-                </a:lnTo>
-                <a:lnTo>
-                  <a:pt x="12192000" y="566059"/>
-                </a:lnTo>
-                <a:lnTo>
-                  <a:pt x="12192000" y="794037"/>
-                </a:lnTo>
-                <a:lnTo>
-                  <a:pt x="12192000" y="2336800"/>
-                </a:lnTo>
-                <a:lnTo>
-                  <a:pt x="12192000" y="2631227"/>
-                </a:lnTo>
-                <a:lnTo>
-                  <a:pt x="12192000" y="3908712"/>
-                </a:lnTo>
-                <a:lnTo>
-                  <a:pt x="9439275" y="3984912"/>
-                </a:lnTo>
-                <a:lnTo>
-                  <a:pt x="5572127" y="3737262"/>
-                </a:lnTo>
-                <a:lnTo>
-                  <a:pt x="0" y="3908712"/>
-                </a:lnTo>
-                <a:lnTo>
-                  <a:pt x="0" y="2631227"/>
-                </a:lnTo>
-                <a:lnTo>
-                  <a:pt x="0" y="2336800"/>
-                </a:lnTo>
-                <a:lnTo>
-                  <a:pt x="0" y="794037"/>
-                </a:lnTo>
-                <a:lnTo>
-                  <a:pt x="0" y="566059"/>
-                </a:lnTo>
-                <a:close/>
-              </a:path>
-            </a:pathLst>
-          </a:custGeom>
+          </a:prstGeom>
+          <a:effectLst/>
         </p:spPr>
       </p:pic>
-      <p:grpSp>
-        <p:nvGrpSpPr>
-          <p:cNvPr id="20" name="Group 19">
-            <a:extLst>
-              <a:ext uri="{FF2B5EF4-FFF2-40B4-BE49-F238E27FC236}">
-                <a16:creationId xmlns:a16="http://schemas.microsoft.com/office/drawing/2014/main" id="{A4AE1828-51FD-4AD7-BCF6-9AF5C696CE5D}"/>
-              </a:ext>
-              <a:ext uri="{C183D7F6-B498-43B3-948B-1728B52AA6E4}">
-                <adec:decorative xmlns:adec="http://schemas.microsoft.com/office/drawing/2017/decorative" val="1"/>
-              </a:ext>
-            </a:extLst>
-          </p:cNvPr>
-          <p:cNvGrpSpPr>
-            <a:grpSpLocks noGrp="1" noUngrp="1" noRot="1" noChangeAspect="1" noMove="1" noResize="1"/>
-          </p:cNvGrpSpPr>
-          <p:nvPr>
-            <p:extLst>
-              <p:ext uri="{386F3935-93C4-4BCD-93E2-E3B085C9AB24}">
-                <p16:designElem xmlns:p16="http://schemas.microsoft.com/office/powerpoint/2015/main" val="1"/>
-              </p:ext>
-            </p:extLst>
-          </p:nvPr>
-        </p:nvGrpSpPr>
-        <p:grpSpPr>
-          <a:xfrm>
-            <a:off x="0" y="3528992"/>
-            <a:ext cx="12192000" cy="757168"/>
-            <a:chOff x="0" y="2959818"/>
-            <a:chExt cx="12192000" cy="757168"/>
-          </a:xfrm>
-        </p:grpSpPr>
-        <p:sp>
-          <p:nvSpPr>
-            <p:cNvPr id="21" name="Freeform: Shape 20">
-              <a:extLst>
-                <a:ext uri="{FF2B5EF4-FFF2-40B4-BE49-F238E27FC236}">
-                  <a16:creationId xmlns:a16="http://schemas.microsoft.com/office/drawing/2014/main" id="{8542C7CD-02BE-4ADE-8D2F-DFB759D71A39}"/>
-                </a:ext>
-                <a:ext uri="{C183D7F6-B498-43B3-948B-1728B52AA6E4}">
-                  <adec:decorative xmlns:adec="http://schemas.microsoft.com/office/drawing/2017/decorative" val="1"/>
-                </a:ext>
-              </a:extLst>
-            </p:cNvPr>
-            <p:cNvSpPr/>
-            <p:nvPr>
-              <p:extLst>
-                <p:ext uri="{386F3935-93C4-4BCD-93E2-E3B085C9AB24}">
-                  <p16:designElem xmlns:p16="http://schemas.microsoft.com/office/powerpoint/2015/main" val="1"/>
-                </p:ext>
-              </p:extLst>
-            </p:nvPr>
-          </p:nvSpPr>
-          <p:spPr>
-            <a:xfrm>
-              <a:off x="0" y="2959818"/>
-              <a:ext cx="12192000" cy="757168"/>
-            </a:xfrm>
-            <a:custGeom>
-              <a:avLst/>
-              <a:gdLst>
-                <a:gd name="connsiteX0" fmla="*/ 0 w 12192000"/>
-                <a:gd name="connsiteY0" fmla="*/ 0 h 757168"/>
-                <a:gd name="connsiteX1" fmla="*/ 41653 w 12192000"/>
-                <a:gd name="connsiteY1" fmla="*/ 6945 h 757168"/>
-                <a:gd name="connsiteX2" fmla="*/ 81317 w 12192000"/>
-                <a:gd name="connsiteY2" fmla="*/ 15509 h 757168"/>
-                <a:gd name="connsiteX3" fmla="*/ 114150 w 12192000"/>
-                <a:gd name="connsiteY3" fmla="*/ 28105 h 757168"/>
-                <a:gd name="connsiteX4" fmla="*/ 214865 w 12192000"/>
-                <a:gd name="connsiteY4" fmla="*/ 58374 h 757168"/>
-                <a:gd name="connsiteX5" fmla="*/ 299237 w 12192000"/>
-                <a:gd name="connsiteY5" fmla="*/ 63560 h 757168"/>
-                <a:gd name="connsiteX6" fmla="*/ 415570 w 12192000"/>
-                <a:gd name="connsiteY6" fmla="*/ 83774 h 757168"/>
-                <a:gd name="connsiteX7" fmla="*/ 633210 w 12192000"/>
-                <a:gd name="connsiteY7" fmla="*/ 109108 h 757168"/>
-                <a:gd name="connsiteX8" fmla="*/ 677567 w 12192000"/>
-                <a:gd name="connsiteY8" fmla="*/ 119446 h 757168"/>
-                <a:gd name="connsiteX9" fmla="*/ 946429 w 12192000"/>
-                <a:gd name="connsiteY9" fmla="*/ 171502 h 757168"/>
-                <a:gd name="connsiteX10" fmla="*/ 1163367 w 12192000"/>
-                <a:gd name="connsiteY10" fmla="*/ 182106 h 757168"/>
-                <a:gd name="connsiteX11" fmla="*/ 1180337 w 12192000"/>
-                <a:gd name="connsiteY11" fmla="*/ 181279 h 757168"/>
-                <a:gd name="connsiteX12" fmla="*/ 1263939 w 12192000"/>
-                <a:gd name="connsiteY12" fmla="*/ 173070 h 757168"/>
-                <a:gd name="connsiteX13" fmla="*/ 1392213 w 12192000"/>
-                <a:gd name="connsiteY13" fmla="*/ 183225 h 757168"/>
-                <a:gd name="connsiteX14" fmla="*/ 1479752 w 12192000"/>
-                <a:gd name="connsiteY14" fmla="*/ 205174 h 757168"/>
-                <a:gd name="connsiteX15" fmla="*/ 1589813 w 12192000"/>
-                <a:gd name="connsiteY15" fmla="*/ 211706 h 757168"/>
-                <a:gd name="connsiteX16" fmla="*/ 1716264 w 12192000"/>
-                <a:gd name="connsiteY16" fmla="*/ 207459 h 757168"/>
-                <a:gd name="connsiteX17" fmla="*/ 1772900 w 12192000"/>
-                <a:gd name="connsiteY17" fmla="*/ 208137 h 757168"/>
-                <a:gd name="connsiteX18" fmla="*/ 1929319 w 12192000"/>
-                <a:gd name="connsiteY18" fmla="*/ 193822 h 757168"/>
-                <a:gd name="connsiteX19" fmla="*/ 2021514 w 12192000"/>
-                <a:gd name="connsiteY19" fmla="*/ 204186 h 757168"/>
-                <a:gd name="connsiteX20" fmla="*/ 2111753 w 12192000"/>
-                <a:gd name="connsiteY20" fmla="*/ 223797 h 757168"/>
-                <a:gd name="connsiteX21" fmla="*/ 2169356 w 12192000"/>
-                <a:gd name="connsiteY21" fmla="*/ 241125 h 757168"/>
-                <a:gd name="connsiteX22" fmla="*/ 2286638 w 12192000"/>
-                <a:gd name="connsiteY22" fmla="*/ 257382 h 757168"/>
-                <a:gd name="connsiteX23" fmla="*/ 2308368 w 12192000"/>
-                <a:gd name="connsiteY23" fmla="*/ 256995 h 757168"/>
-                <a:gd name="connsiteX24" fmla="*/ 2660621 w 12192000"/>
-                <a:gd name="connsiteY24" fmla="*/ 262863 h 757168"/>
-                <a:gd name="connsiteX25" fmla="*/ 2801134 w 12192000"/>
-                <a:gd name="connsiteY25" fmla="*/ 250006 h 757168"/>
-                <a:gd name="connsiteX26" fmla="*/ 2830994 w 12192000"/>
-                <a:gd name="connsiteY26" fmla="*/ 249091 h 757168"/>
-                <a:gd name="connsiteX27" fmla="*/ 3129084 w 12192000"/>
-                <a:gd name="connsiteY27" fmla="*/ 242009 h 757168"/>
-                <a:gd name="connsiteX28" fmla="*/ 3162162 w 12192000"/>
-                <a:gd name="connsiteY28" fmla="*/ 242789 h 757168"/>
-                <a:gd name="connsiteX29" fmla="*/ 3254072 w 12192000"/>
-                <a:gd name="connsiteY29" fmla="*/ 251612 h 757168"/>
-                <a:gd name="connsiteX30" fmla="*/ 3473491 w 12192000"/>
-                <a:gd name="connsiteY30" fmla="*/ 221903 h 757168"/>
-                <a:gd name="connsiteX31" fmla="*/ 3691860 w 12192000"/>
-                <a:gd name="connsiteY31" fmla="*/ 219228 h 757168"/>
-                <a:gd name="connsiteX32" fmla="*/ 3811494 w 12192000"/>
-                <a:gd name="connsiteY32" fmla="*/ 225691 h 757168"/>
-                <a:gd name="connsiteX33" fmla="*/ 3897533 w 12192000"/>
-                <a:gd name="connsiteY33" fmla="*/ 220087 h 757168"/>
-                <a:gd name="connsiteX34" fmla="*/ 4109430 w 12192000"/>
-                <a:gd name="connsiteY34" fmla="*/ 200477 h 757168"/>
-                <a:gd name="connsiteX35" fmla="*/ 4208772 w 12192000"/>
-                <a:gd name="connsiteY35" fmla="*/ 200914 h 757168"/>
-                <a:gd name="connsiteX36" fmla="*/ 4314641 w 12192000"/>
-                <a:gd name="connsiteY36" fmla="*/ 196159 h 757168"/>
-                <a:gd name="connsiteX37" fmla="*/ 4577622 w 12192000"/>
-                <a:gd name="connsiteY37" fmla="*/ 163774 h 757168"/>
-                <a:gd name="connsiteX38" fmla="*/ 4790345 w 12192000"/>
-                <a:gd name="connsiteY38" fmla="*/ 177592 h 757168"/>
-                <a:gd name="connsiteX39" fmla="*/ 4926164 w 12192000"/>
-                <a:gd name="connsiteY39" fmla="*/ 184139 h 757168"/>
-                <a:gd name="connsiteX40" fmla="*/ 5088812 w 12192000"/>
-                <a:gd name="connsiteY40" fmla="*/ 177401 h 757168"/>
-                <a:gd name="connsiteX41" fmla="*/ 5222466 w 12192000"/>
-                <a:gd name="connsiteY41" fmla="*/ 162082 h 757168"/>
-                <a:gd name="connsiteX42" fmla="*/ 5406528 w 12192000"/>
-                <a:gd name="connsiteY42" fmla="*/ 153987 h 757168"/>
-                <a:gd name="connsiteX43" fmla="*/ 5590716 w 12192000"/>
-                <a:gd name="connsiteY43" fmla="*/ 129490 h 757168"/>
-                <a:gd name="connsiteX44" fmla="*/ 5719429 w 12192000"/>
-                <a:gd name="connsiteY44" fmla="*/ 110099 h 757168"/>
-                <a:gd name="connsiteX45" fmla="*/ 5897895 w 12192000"/>
-                <a:gd name="connsiteY45" fmla="*/ 96368 h 757168"/>
-                <a:gd name="connsiteX46" fmla="*/ 6169957 w 12192000"/>
-                <a:gd name="connsiteY46" fmla="*/ 94411 h 757168"/>
-                <a:gd name="connsiteX47" fmla="*/ 6294827 w 12192000"/>
-                <a:gd name="connsiteY47" fmla="*/ 99236 h 757168"/>
-                <a:gd name="connsiteX48" fmla="*/ 6494261 w 12192000"/>
-                <a:gd name="connsiteY48" fmla="*/ 71724 h 757168"/>
-                <a:gd name="connsiteX49" fmla="*/ 6579627 w 12192000"/>
-                <a:gd name="connsiteY49" fmla="*/ 57883 h 757168"/>
-                <a:gd name="connsiteX50" fmla="*/ 6654800 w 12192000"/>
-                <a:gd name="connsiteY50" fmla="*/ 77086 h 757168"/>
-                <a:gd name="connsiteX51" fmla="*/ 6703059 w 12192000"/>
-                <a:gd name="connsiteY51" fmla="*/ 97166 h 757168"/>
-                <a:gd name="connsiteX52" fmla="*/ 6859445 w 12192000"/>
-                <a:gd name="connsiteY52" fmla="*/ 90481 h 757168"/>
-                <a:gd name="connsiteX53" fmla="*/ 7025414 w 12192000"/>
-                <a:gd name="connsiteY53" fmla="*/ 83536 h 757168"/>
-                <a:gd name="connsiteX54" fmla="*/ 7144137 w 12192000"/>
-                <a:gd name="connsiteY54" fmla="*/ 79264 h 757168"/>
-                <a:gd name="connsiteX55" fmla="*/ 7291235 w 12192000"/>
-                <a:gd name="connsiteY55" fmla="*/ 95367 h 757168"/>
-                <a:gd name="connsiteX56" fmla="*/ 7407395 w 12192000"/>
-                <a:gd name="connsiteY56" fmla="*/ 104888 h 757168"/>
-                <a:gd name="connsiteX57" fmla="*/ 7500837 w 12192000"/>
-                <a:gd name="connsiteY57" fmla="*/ 119515 h 757168"/>
-                <a:gd name="connsiteX58" fmla="*/ 7533567 w 12192000"/>
-                <a:gd name="connsiteY58" fmla="*/ 126955 h 757168"/>
-                <a:gd name="connsiteX59" fmla="*/ 7792910 w 12192000"/>
-                <a:gd name="connsiteY59" fmla="*/ 185188 h 757168"/>
-                <a:gd name="connsiteX60" fmla="*/ 8070699 w 12192000"/>
-                <a:gd name="connsiteY60" fmla="*/ 235423 h 757168"/>
-                <a:gd name="connsiteX61" fmla="*/ 8253177 w 12192000"/>
-                <a:gd name="connsiteY61" fmla="*/ 222473 h 757168"/>
-                <a:gd name="connsiteX62" fmla="*/ 8320683 w 12192000"/>
-                <a:gd name="connsiteY62" fmla="*/ 226393 h 757168"/>
-                <a:gd name="connsiteX63" fmla="*/ 8631438 w 12192000"/>
-                <a:gd name="connsiteY63" fmla="*/ 237528 h 757168"/>
-                <a:gd name="connsiteX64" fmla="*/ 8686410 w 12192000"/>
-                <a:gd name="connsiteY64" fmla="*/ 234877 h 757168"/>
-                <a:gd name="connsiteX65" fmla="*/ 8980658 w 12192000"/>
-                <a:gd name="connsiteY65" fmla="*/ 273001 h 757168"/>
-                <a:gd name="connsiteX66" fmla="*/ 9087625 w 12192000"/>
-                <a:gd name="connsiteY66" fmla="*/ 282423 h 757168"/>
-                <a:gd name="connsiteX67" fmla="*/ 9186017 w 12192000"/>
-                <a:gd name="connsiteY67" fmla="*/ 293875 h 757168"/>
-                <a:gd name="connsiteX68" fmla="*/ 9323931 w 12192000"/>
-                <a:gd name="connsiteY68" fmla="*/ 302628 h 757168"/>
-                <a:gd name="connsiteX69" fmla="*/ 9467213 w 12192000"/>
-                <a:gd name="connsiteY69" fmla="*/ 307275 h 757168"/>
-                <a:gd name="connsiteX70" fmla="*/ 9626826 w 12192000"/>
-                <a:gd name="connsiteY70" fmla="*/ 316213 h 757168"/>
-                <a:gd name="connsiteX71" fmla="*/ 9689696 w 12192000"/>
-                <a:gd name="connsiteY71" fmla="*/ 324467 h 757168"/>
-                <a:gd name="connsiteX72" fmla="*/ 9860526 w 12192000"/>
-                <a:gd name="connsiteY72" fmla="*/ 329986 h 757168"/>
-                <a:gd name="connsiteX73" fmla="*/ 9949775 w 12192000"/>
-                <a:gd name="connsiteY73" fmla="*/ 340386 h 757168"/>
-                <a:gd name="connsiteX74" fmla="*/ 10097252 w 12192000"/>
-                <a:gd name="connsiteY74" fmla="*/ 349262 h 757168"/>
-                <a:gd name="connsiteX75" fmla="*/ 10145261 w 12192000"/>
-                <a:gd name="connsiteY75" fmla="*/ 353113 h 757168"/>
-                <a:gd name="connsiteX76" fmla="*/ 10188159 w 12192000"/>
-                <a:gd name="connsiteY76" fmla="*/ 356124 h 757168"/>
-                <a:gd name="connsiteX77" fmla="*/ 10336144 w 12192000"/>
-                <a:gd name="connsiteY77" fmla="*/ 348235 h 757168"/>
-                <a:gd name="connsiteX78" fmla="*/ 10466847 w 12192000"/>
-                <a:gd name="connsiteY78" fmla="*/ 354131 h 757168"/>
-                <a:gd name="connsiteX79" fmla="*/ 10696514 w 12192000"/>
-                <a:gd name="connsiteY79" fmla="*/ 353575 h 757168"/>
-                <a:gd name="connsiteX80" fmla="*/ 10746932 w 12192000"/>
-                <a:gd name="connsiteY80" fmla="*/ 360606 h 757168"/>
-                <a:gd name="connsiteX81" fmla="*/ 10905388 w 12192000"/>
-                <a:gd name="connsiteY81" fmla="*/ 370627 h 757168"/>
-                <a:gd name="connsiteX82" fmla="*/ 10995602 w 12192000"/>
-                <a:gd name="connsiteY82" fmla="*/ 376691 h 757168"/>
-                <a:gd name="connsiteX83" fmla="*/ 11107647 w 12192000"/>
-                <a:gd name="connsiteY83" fmla="*/ 373405 h 757168"/>
-                <a:gd name="connsiteX84" fmla="*/ 11302440 w 12192000"/>
-                <a:gd name="connsiteY84" fmla="*/ 364156 h 757168"/>
-                <a:gd name="connsiteX85" fmla="*/ 11353613 w 12192000"/>
-                <a:gd name="connsiteY85" fmla="*/ 363785 h 757168"/>
-                <a:gd name="connsiteX86" fmla="*/ 11447323 w 12192000"/>
-                <a:gd name="connsiteY86" fmla="*/ 359346 h 757168"/>
-                <a:gd name="connsiteX87" fmla="*/ 11464292 w 12192000"/>
-                <a:gd name="connsiteY87" fmla="*/ 358519 h 757168"/>
-                <a:gd name="connsiteX88" fmla="*/ 11607560 w 12192000"/>
-                <a:gd name="connsiteY88" fmla="*/ 342370 h 757168"/>
-                <a:gd name="connsiteX89" fmla="*/ 11681426 w 12192000"/>
-                <a:gd name="connsiteY89" fmla="*/ 344335 h 757168"/>
-                <a:gd name="connsiteX90" fmla="*/ 11893565 w 12192000"/>
-                <a:gd name="connsiteY90" fmla="*/ 355261 h 757168"/>
-                <a:gd name="connsiteX91" fmla="*/ 11983290 w 12192000"/>
-                <a:gd name="connsiteY91" fmla="*/ 363588 h 757168"/>
-                <a:gd name="connsiteX92" fmla="*/ 12192000 w 12192000"/>
-                <a:gd name="connsiteY92" fmla="*/ 388018 h 757168"/>
-                <a:gd name="connsiteX93" fmla="*/ 12192000 w 12192000"/>
-                <a:gd name="connsiteY93" fmla="*/ 577115 h 757168"/>
-                <a:gd name="connsiteX94" fmla="*/ 12157329 w 12192000"/>
-                <a:gd name="connsiteY94" fmla="*/ 588862 h 757168"/>
-                <a:gd name="connsiteX95" fmla="*/ 12066948 w 12192000"/>
-                <a:gd name="connsiteY95" fmla="*/ 586034 h 757168"/>
-                <a:gd name="connsiteX96" fmla="*/ 11911344 w 12192000"/>
-                <a:gd name="connsiteY96" fmla="*/ 521599 h 757168"/>
-                <a:gd name="connsiteX97" fmla="*/ 11847823 w 12192000"/>
-                <a:gd name="connsiteY97" fmla="*/ 511785 h 757168"/>
-                <a:gd name="connsiteX98" fmla="*/ 11737547 w 12192000"/>
-                <a:gd name="connsiteY98" fmla="*/ 502380 h 757168"/>
-                <a:gd name="connsiteX99" fmla="*/ 11636052 w 12192000"/>
-                <a:gd name="connsiteY99" fmla="*/ 514993 h 757168"/>
-                <a:gd name="connsiteX100" fmla="*/ 11394706 w 12192000"/>
-                <a:gd name="connsiteY100" fmla="*/ 590867 h 757168"/>
-                <a:gd name="connsiteX101" fmla="*/ 11354978 w 12192000"/>
-                <a:gd name="connsiteY101" fmla="*/ 597561 h 757168"/>
-                <a:gd name="connsiteX102" fmla="*/ 11285306 w 12192000"/>
-                <a:gd name="connsiteY102" fmla="*/ 599825 h 757168"/>
-                <a:gd name="connsiteX103" fmla="*/ 11008528 w 12192000"/>
-                <a:gd name="connsiteY103" fmla="*/ 656670 h 757168"/>
-                <a:gd name="connsiteX104" fmla="*/ 10948735 w 12192000"/>
-                <a:gd name="connsiteY104" fmla="*/ 652964 h 757168"/>
-                <a:gd name="connsiteX105" fmla="*/ 10850698 w 12192000"/>
-                <a:gd name="connsiteY105" fmla="*/ 641721 h 757168"/>
-                <a:gd name="connsiteX106" fmla="*/ 10744026 w 12192000"/>
-                <a:gd name="connsiteY106" fmla="*/ 647769 h 757168"/>
-                <a:gd name="connsiteX107" fmla="*/ 10666160 w 12192000"/>
-                <a:gd name="connsiteY107" fmla="*/ 651891 h 757168"/>
-                <a:gd name="connsiteX108" fmla="*/ 10450521 w 12192000"/>
-                <a:gd name="connsiteY108" fmla="*/ 616552 h 757168"/>
-                <a:gd name="connsiteX109" fmla="*/ 10271192 w 12192000"/>
-                <a:gd name="connsiteY109" fmla="*/ 583498 h 757168"/>
-                <a:gd name="connsiteX110" fmla="*/ 10246067 w 12192000"/>
-                <a:gd name="connsiteY110" fmla="*/ 585423 h 757168"/>
-                <a:gd name="connsiteX111" fmla="*/ 10005027 w 12192000"/>
-                <a:gd name="connsiteY111" fmla="*/ 592252 h 757168"/>
-                <a:gd name="connsiteX112" fmla="*/ 9898681 w 12192000"/>
-                <a:gd name="connsiteY112" fmla="*/ 613195 h 757168"/>
-                <a:gd name="connsiteX113" fmla="*/ 9753225 w 12192000"/>
-                <a:gd name="connsiteY113" fmla="*/ 629038 h 757168"/>
-                <a:gd name="connsiteX114" fmla="*/ 9591376 w 12192000"/>
-                <a:gd name="connsiteY114" fmla="*/ 648601 h 757168"/>
-                <a:gd name="connsiteX115" fmla="*/ 9472860 w 12192000"/>
-                <a:gd name="connsiteY115" fmla="*/ 655936 h 757168"/>
-                <a:gd name="connsiteX116" fmla="*/ 9299788 w 12192000"/>
-                <a:gd name="connsiteY116" fmla="*/ 636945 h 757168"/>
-                <a:gd name="connsiteX117" fmla="*/ 9264605 w 12192000"/>
-                <a:gd name="connsiteY117" fmla="*/ 627087 h 757168"/>
-                <a:gd name="connsiteX118" fmla="*/ 8926435 w 12192000"/>
-                <a:gd name="connsiteY118" fmla="*/ 549269 h 757168"/>
-                <a:gd name="connsiteX119" fmla="*/ 8698934 w 12192000"/>
-                <a:gd name="connsiteY119" fmla="*/ 536583 h 757168"/>
-                <a:gd name="connsiteX120" fmla="*/ 8622862 w 12192000"/>
-                <a:gd name="connsiteY120" fmla="*/ 541563 h 757168"/>
-                <a:gd name="connsiteX121" fmla="*/ 8482784 w 12192000"/>
-                <a:gd name="connsiteY121" fmla="*/ 574094 h 757168"/>
-                <a:gd name="connsiteX122" fmla="*/ 8421565 w 12192000"/>
-                <a:gd name="connsiteY122" fmla="*/ 576610 h 757168"/>
-                <a:gd name="connsiteX123" fmla="*/ 8313469 w 12192000"/>
-                <a:gd name="connsiteY123" fmla="*/ 574762 h 757168"/>
-                <a:gd name="connsiteX124" fmla="*/ 8079520 w 12192000"/>
-                <a:gd name="connsiteY124" fmla="*/ 558685 h 757168"/>
-                <a:gd name="connsiteX125" fmla="*/ 7773327 w 12192000"/>
-                <a:gd name="connsiteY125" fmla="*/ 558854 h 757168"/>
-                <a:gd name="connsiteX126" fmla="*/ 7652477 w 12192000"/>
-                <a:gd name="connsiteY126" fmla="*/ 547561 h 757168"/>
-                <a:gd name="connsiteX127" fmla="*/ 7522274 w 12192000"/>
-                <a:gd name="connsiteY127" fmla="*/ 532150 h 757168"/>
-                <a:gd name="connsiteX128" fmla="*/ 7484080 w 12192000"/>
-                <a:gd name="connsiteY128" fmla="*/ 530532 h 757168"/>
-                <a:gd name="connsiteX129" fmla="*/ 7282277 w 12192000"/>
-                <a:gd name="connsiteY129" fmla="*/ 540177 h 757168"/>
-                <a:gd name="connsiteX130" fmla="*/ 7235690 w 12192000"/>
-                <a:gd name="connsiteY130" fmla="*/ 551282 h 757168"/>
-                <a:gd name="connsiteX131" fmla="*/ 7116339 w 12192000"/>
-                <a:gd name="connsiteY131" fmla="*/ 539494 h 757168"/>
-                <a:gd name="connsiteX132" fmla="*/ 7011067 w 12192000"/>
-                <a:gd name="connsiteY132" fmla="*/ 511848 h 757168"/>
-                <a:gd name="connsiteX133" fmla="*/ 6403234 w 12192000"/>
-                <a:gd name="connsiteY133" fmla="*/ 432296 h 757168"/>
-                <a:gd name="connsiteX134" fmla="*/ 6036273 w 12192000"/>
-                <a:gd name="connsiteY134" fmla="*/ 412301 h 757168"/>
-                <a:gd name="connsiteX135" fmla="*/ 5780467 w 12192000"/>
-                <a:gd name="connsiteY135" fmla="*/ 377910 h 757168"/>
-                <a:gd name="connsiteX136" fmla="*/ 5739051 w 12192000"/>
-                <a:gd name="connsiteY136" fmla="*/ 353609 h 757168"/>
-                <a:gd name="connsiteX137" fmla="*/ 5583566 w 12192000"/>
-                <a:gd name="connsiteY137" fmla="*/ 321995 h 757168"/>
-                <a:gd name="connsiteX138" fmla="*/ 5432030 w 12192000"/>
-                <a:gd name="connsiteY138" fmla="*/ 362512 h 757168"/>
-                <a:gd name="connsiteX139" fmla="*/ 5241398 w 12192000"/>
-                <a:gd name="connsiteY139" fmla="*/ 425781 h 757168"/>
-                <a:gd name="connsiteX140" fmla="*/ 5139710 w 12192000"/>
-                <a:gd name="connsiteY140" fmla="*/ 421022 h 757168"/>
-                <a:gd name="connsiteX141" fmla="*/ 4929402 w 12192000"/>
-                <a:gd name="connsiteY141" fmla="*/ 424310 h 757168"/>
-                <a:gd name="connsiteX142" fmla="*/ 4782793 w 12192000"/>
-                <a:gd name="connsiteY142" fmla="*/ 441046 h 757168"/>
-                <a:gd name="connsiteX143" fmla="*/ 4577594 w 12192000"/>
-                <a:gd name="connsiteY143" fmla="*/ 459290 h 757168"/>
-                <a:gd name="connsiteX144" fmla="*/ 4500826 w 12192000"/>
-                <a:gd name="connsiteY144" fmla="*/ 470529 h 757168"/>
-                <a:gd name="connsiteX145" fmla="*/ 4317973 w 12192000"/>
-                <a:gd name="connsiteY145" fmla="*/ 483649 h 757168"/>
-                <a:gd name="connsiteX146" fmla="*/ 4166722 w 12192000"/>
-                <a:gd name="connsiteY146" fmla="*/ 490602 h 757168"/>
-                <a:gd name="connsiteX147" fmla="*/ 4042814 w 12192000"/>
-                <a:gd name="connsiteY147" fmla="*/ 530660 h 757168"/>
-                <a:gd name="connsiteX148" fmla="*/ 4002653 w 12192000"/>
-                <a:gd name="connsiteY148" fmla="*/ 552594 h 757168"/>
-                <a:gd name="connsiteX149" fmla="*/ 3969549 w 12192000"/>
-                <a:gd name="connsiteY149" fmla="*/ 566312 h 757168"/>
-                <a:gd name="connsiteX150" fmla="*/ 3821685 w 12192000"/>
-                <a:gd name="connsiteY150" fmla="*/ 649183 h 757168"/>
-                <a:gd name="connsiteX151" fmla="*/ 3805138 w 12192000"/>
-                <a:gd name="connsiteY151" fmla="*/ 655947 h 757168"/>
-                <a:gd name="connsiteX152" fmla="*/ 3609177 w 12192000"/>
-                <a:gd name="connsiteY152" fmla="*/ 687459 h 757168"/>
-                <a:gd name="connsiteX153" fmla="*/ 3539727 w 12192000"/>
-                <a:gd name="connsiteY153" fmla="*/ 706521 h 757168"/>
-                <a:gd name="connsiteX154" fmla="*/ 3396572 w 12192000"/>
-                <a:gd name="connsiteY154" fmla="*/ 755681 h 757168"/>
-                <a:gd name="connsiteX155" fmla="*/ 3341054 w 12192000"/>
-                <a:gd name="connsiteY155" fmla="*/ 754679 h 757168"/>
-                <a:gd name="connsiteX156" fmla="*/ 3138775 w 12192000"/>
-                <a:gd name="connsiteY156" fmla="*/ 710120 h 757168"/>
-                <a:gd name="connsiteX157" fmla="*/ 3037283 w 12192000"/>
-                <a:gd name="connsiteY157" fmla="*/ 666453 h 757168"/>
-                <a:gd name="connsiteX158" fmla="*/ 3002117 w 12192000"/>
-                <a:gd name="connsiteY158" fmla="*/ 649347 h 757168"/>
-                <a:gd name="connsiteX159" fmla="*/ 2747294 w 12192000"/>
-                <a:gd name="connsiteY159" fmla="*/ 652400 h 757168"/>
-                <a:gd name="connsiteX160" fmla="*/ 2676273 w 12192000"/>
-                <a:gd name="connsiteY160" fmla="*/ 652304 h 757168"/>
-                <a:gd name="connsiteX161" fmla="*/ 2432360 w 12192000"/>
-                <a:gd name="connsiteY161" fmla="*/ 657836 h 757168"/>
-                <a:gd name="connsiteX162" fmla="*/ 2382311 w 12192000"/>
-                <a:gd name="connsiteY162" fmla="*/ 650824 h 757168"/>
-                <a:gd name="connsiteX163" fmla="*/ 2055134 w 12192000"/>
-                <a:gd name="connsiteY163" fmla="*/ 630053 h 757168"/>
-                <a:gd name="connsiteX164" fmla="*/ 2031829 w 12192000"/>
-                <a:gd name="connsiteY164" fmla="*/ 639324 h 757168"/>
-                <a:gd name="connsiteX165" fmla="*/ 1912764 w 12192000"/>
-                <a:gd name="connsiteY165" fmla="*/ 664183 h 757168"/>
-                <a:gd name="connsiteX166" fmla="*/ 1755637 w 12192000"/>
-                <a:gd name="connsiteY166" fmla="*/ 663960 h 757168"/>
-                <a:gd name="connsiteX167" fmla="*/ 1727159 w 12192000"/>
-                <a:gd name="connsiteY167" fmla="*/ 659605 h 757168"/>
-                <a:gd name="connsiteX168" fmla="*/ 1622470 w 12192000"/>
-                <a:gd name="connsiteY168" fmla="*/ 634850 h 757168"/>
-                <a:gd name="connsiteX169" fmla="*/ 1385955 w 12192000"/>
-                <a:gd name="connsiteY169" fmla="*/ 604522 h 757168"/>
-                <a:gd name="connsiteX170" fmla="*/ 1340055 w 12192000"/>
-                <a:gd name="connsiteY170" fmla="*/ 595629 h 757168"/>
-                <a:gd name="connsiteX171" fmla="*/ 1257271 w 12192000"/>
-                <a:gd name="connsiteY171" fmla="*/ 581180 h 757168"/>
-                <a:gd name="connsiteX172" fmla="*/ 1031914 w 12192000"/>
-                <a:gd name="connsiteY172" fmla="*/ 562692 h 757168"/>
-                <a:gd name="connsiteX173" fmla="*/ 922031 w 12192000"/>
-                <a:gd name="connsiteY173" fmla="*/ 566853 h 757168"/>
-                <a:gd name="connsiteX174" fmla="*/ 873250 w 12192000"/>
-                <a:gd name="connsiteY174" fmla="*/ 563724 h 757168"/>
-                <a:gd name="connsiteX175" fmla="*/ 711627 w 12192000"/>
-                <a:gd name="connsiteY175" fmla="*/ 529880 h 757168"/>
-                <a:gd name="connsiteX176" fmla="*/ 311112 w 12192000"/>
-                <a:gd name="connsiteY176" fmla="*/ 525106 h 757168"/>
-                <a:gd name="connsiteX177" fmla="*/ 184145 w 12192000"/>
-                <a:gd name="connsiteY177" fmla="*/ 532188 h 757168"/>
-                <a:gd name="connsiteX178" fmla="*/ 116886 w 12192000"/>
-                <a:gd name="connsiteY178" fmla="*/ 530572 h 757168"/>
-                <a:gd name="connsiteX179" fmla="*/ 23941 w 12192000"/>
-                <a:gd name="connsiteY179" fmla="*/ 506433 h 757168"/>
-                <a:gd name="connsiteX180" fmla="*/ 0 w 12192000"/>
-                <a:gd name="connsiteY180" fmla="*/ 502149 h 757168"/>
-              </a:gdLst>
-              <a:ahLst/>
-              <a:cxnLst>
-                <a:cxn ang="0">
-                  <a:pos x="connsiteX0" y="connsiteY0"/>
-                </a:cxn>
-                <a:cxn ang="0">
-                  <a:pos x="connsiteX1" y="connsiteY1"/>
-                </a:cxn>
-                <a:cxn ang="0">
-                  <a:pos x="connsiteX2" y="connsiteY2"/>
-                </a:cxn>
-                <a:cxn ang="0">
-                  <a:pos x="connsiteX3" y="connsiteY3"/>
-                </a:cxn>
-                <a:cxn ang="0">
-                  <a:pos x="connsiteX4" y="connsiteY4"/>
-                </a:cxn>
-                <a:cxn ang="0">
-                  <a:pos x="connsiteX5" y="connsiteY5"/>
-                </a:cxn>
-                <a:cxn ang="0">
-                  <a:pos x="connsiteX6" y="connsiteY6"/>
-                </a:cxn>
-                <a:cxn ang="0">
-                  <a:pos x="connsiteX7" y="connsiteY7"/>
-                </a:cxn>
-                <a:cxn ang="0">
-                  <a:pos x="connsiteX8" y="connsiteY8"/>
-                </a:cxn>
-                <a:cxn ang="0">
-                  <a:pos x="connsiteX9" y="connsiteY9"/>
-                </a:cxn>
-                <a:cxn ang="0">
-                  <a:pos x="connsiteX10" y="connsiteY10"/>
-                </a:cxn>
-                <a:cxn ang="0">
-                  <a:pos x="connsiteX11" y="connsiteY11"/>
-                </a:cxn>
-                <a:cxn ang="0">
-                  <a:pos x="connsiteX12" y="connsiteY12"/>
-                </a:cxn>
-                <a:cxn ang="0">
-                  <a:pos x="connsiteX13" y="connsiteY13"/>
-                </a:cxn>
-                <a:cxn ang="0">
-                  <a:pos x="connsiteX14" y="connsiteY14"/>
-                </a:cxn>
-                <a:cxn ang="0">
-                  <a:pos x="connsiteX15" y="connsiteY15"/>
-                </a:cxn>
-                <a:cxn ang="0">
-                  <a:pos x="connsiteX16" y="connsiteY16"/>
-                </a:cxn>
-                <a:cxn ang="0">
-                  <a:pos x="connsiteX17" y="connsiteY17"/>
-                </a:cxn>
-                <a:cxn ang="0">
-                  <a:pos x="connsiteX18" y="connsiteY18"/>
-                </a:cxn>
-                <a:cxn ang="0">
-                  <a:pos x="connsiteX19" y="connsiteY19"/>
-                </a:cxn>
-                <a:cxn ang="0">
-                  <a:pos x="connsiteX20" y="connsiteY20"/>
-                </a:cxn>
-                <a:cxn ang="0">
-                  <a:pos x="connsiteX21" y="connsiteY21"/>
-                </a:cxn>
-                <a:cxn ang="0">
-                  <a:pos x="connsiteX22" y="connsiteY22"/>
-                </a:cxn>
-                <a:cxn ang="0">
-                  <a:pos x="connsiteX23" y="connsiteY23"/>
-                </a:cxn>
-                <a:cxn ang="0">
-                  <a:pos x="connsiteX24" y="connsiteY24"/>
-                </a:cxn>
-                <a:cxn ang="0">
-                  <a:pos x="connsiteX25" y="connsiteY25"/>
-                </a:cxn>
-                <a:cxn ang="0">
-                  <a:pos x="connsiteX26" y="connsiteY26"/>
-                </a:cxn>
-                <a:cxn ang="0">
-                  <a:pos x="connsiteX27" y="connsiteY27"/>
-                </a:cxn>
-                <a:cxn ang="0">
-                  <a:pos x="connsiteX28" y="connsiteY28"/>
-                </a:cxn>
-                <a:cxn ang="0">
-                  <a:pos x="connsiteX29" y="connsiteY29"/>
-                </a:cxn>
-                <a:cxn ang="0">
-                  <a:pos x="connsiteX30" y="connsiteY30"/>
-                </a:cxn>
-                <a:cxn ang="0">
-                  <a:pos x="connsiteX31" y="connsiteY31"/>
-                </a:cxn>
-                <a:cxn ang="0">
-                  <a:pos x="connsiteX32" y="connsiteY32"/>
-                </a:cxn>
-                <a:cxn ang="0">
-                  <a:pos x="connsiteX33" y="connsiteY33"/>
-                </a:cxn>
-                <a:cxn ang="0">
-                  <a:pos x="connsiteX34" y="connsiteY34"/>
-                </a:cxn>
-                <a:cxn ang="0">
-                  <a:pos x="connsiteX35" y="connsiteY35"/>
-                </a:cxn>
-                <a:cxn ang="0">
-                  <a:pos x="connsiteX36" y="connsiteY36"/>
-                </a:cxn>
-                <a:cxn ang="0">
-                  <a:pos x="connsiteX37" y="connsiteY37"/>
-                </a:cxn>
-                <a:cxn ang="0">
-                  <a:pos x="connsiteX38" y="connsiteY38"/>
-                </a:cxn>
-                <a:cxn ang="0">
-                  <a:pos x="connsiteX39" y="connsiteY39"/>
-                </a:cxn>
-                <a:cxn ang="0">
-                  <a:pos x="connsiteX40" y="connsiteY40"/>
-                </a:cxn>
-                <a:cxn ang="0">
-                  <a:pos x="connsiteX41" y="connsiteY41"/>
-                </a:cxn>
-                <a:cxn ang="0">
-                  <a:pos x="connsiteX42" y="connsiteY42"/>
-                </a:cxn>
-                <a:cxn ang="0">
-                  <a:pos x="connsiteX43" y="connsiteY43"/>
-                </a:cxn>
-                <a:cxn ang="0">
-                  <a:pos x="connsiteX44" y="connsiteY44"/>
-                </a:cxn>
-                <a:cxn ang="0">
-                  <a:pos x="connsiteX45" y="connsiteY45"/>
-                </a:cxn>
-                <a:cxn ang="0">
-                  <a:pos x="connsiteX46" y="connsiteY46"/>
-                </a:cxn>
-                <a:cxn ang="0">
-                  <a:pos x="connsiteX47" y="connsiteY47"/>
-                </a:cxn>
-                <a:cxn ang="0">
-                  <a:pos x="connsiteX48" y="connsiteY48"/>
-                </a:cxn>
-                <a:cxn ang="0">
-                  <a:pos x="connsiteX49" y="connsiteY49"/>
-                </a:cxn>
-                <a:cxn ang="0">
-                  <a:pos x="connsiteX50" y="connsiteY50"/>
-                </a:cxn>
-                <a:cxn ang="0">
-                  <a:pos x="connsiteX51" y="connsiteY51"/>
-                </a:cxn>
-                <a:cxn ang="0">
-                  <a:pos x="connsiteX52" y="connsiteY52"/>
-                </a:cxn>
-                <a:cxn ang="0">
-                  <a:pos x="connsiteX53" y="connsiteY53"/>
-                </a:cxn>
-                <a:cxn ang="0">
-                  <a:pos x="connsiteX54" y="connsiteY54"/>
-                </a:cxn>
-                <a:cxn ang="0">
-                  <a:pos x="connsiteX55" y="connsiteY55"/>
-                </a:cxn>
-                <a:cxn ang="0">
-                  <a:pos x="connsiteX56" y="connsiteY56"/>
-                </a:cxn>
-                <a:cxn ang="0">
-                  <a:pos x="connsiteX57" y="connsiteY57"/>
-                </a:cxn>
-                <a:cxn ang="0">
-                  <a:pos x="connsiteX58" y="connsiteY58"/>
-                </a:cxn>
-                <a:cxn ang="0">
-                  <a:pos x="connsiteX59" y="connsiteY59"/>
-                </a:cxn>
-                <a:cxn ang="0">
-                  <a:pos x="connsiteX60" y="connsiteY60"/>
-                </a:cxn>
-                <a:cxn ang="0">
-                  <a:pos x="connsiteX61" y="connsiteY61"/>
-                </a:cxn>
-                <a:cxn ang="0">
-                  <a:pos x="connsiteX62" y="connsiteY62"/>
-                </a:cxn>
-                <a:cxn ang="0">
-                  <a:pos x="connsiteX63" y="connsiteY63"/>
-                </a:cxn>
-                <a:cxn ang="0">
-                  <a:pos x="connsiteX64" y="connsiteY64"/>
-                </a:cxn>
-                <a:cxn ang="0">
-                  <a:pos x="connsiteX65" y="connsiteY65"/>
-                </a:cxn>
-                <a:cxn ang="0">
-                  <a:pos x="connsiteX66" y="connsiteY66"/>
-                </a:cxn>
-                <a:cxn ang="0">
-                  <a:pos x="connsiteX67" y="connsiteY67"/>
-                </a:cxn>
-                <a:cxn ang="0">
-                  <a:pos x="connsiteX68" y="connsiteY68"/>
-                </a:cxn>
-                <a:cxn ang="0">
-                  <a:pos x="connsiteX69" y="connsiteY69"/>
-                </a:cxn>
-                <a:cxn ang="0">
-                  <a:pos x="connsiteX70" y="connsiteY70"/>
-                </a:cxn>
-                <a:cxn ang="0">
-                  <a:pos x="connsiteX71" y="connsiteY71"/>
-                </a:cxn>
-                <a:cxn ang="0">
-                  <a:pos x="connsiteX72" y="connsiteY72"/>
-                </a:cxn>
-                <a:cxn ang="0">
-                  <a:pos x="connsiteX73" y="connsiteY73"/>
-                </a:cxn>
-                <a:cxn ang="0">
-                  <a:pos x="connsiteX74" y="connsiteY74"/>
-                </a:cxn>
-                <a:cxn ang="0">
-                  <a:pos x="connsiteX75" y="connsiteY75"/>
-                </a:cxn>
-                <a:cxn ang="0">
-                  <a:pos x="connsiteX76" y="connsiteY76"/>
-                </a:cxn>
-                <a:cxn ang="0">
-                  <a:pos x="connsiteX77" y="connsiteY77"/>
-                </a:cxn>
-                <a:cxn ang="0">
-                  <a:pos x="connsiteX78" y="connsiteY78"/>
-                </a:cxn>
-                <a:cxn ang="0">
-                  <a:pos x="connsiteX79" y="connsiteY79"/>
-                </a:cxn>
-                <a:cxn ang="0">
-                  <a:pos x="connsiteX80" y="connsiteY80"/>
-                </a:cxn>
-                <a:cxn ang="0">
-                  <a:pos x="connsiteX81" y="connsiteY81"/>
-                </a:cxn>
-                <a:cxn ang="0">
-                  <a:pos x="connsiteX82" y="connsiteY82"/>
-                </a:cxn>
-                <a:cxn ang="0">
-                  <a:pos x="connsiteX83" y="connsiteY83"/>
-                </a:cxn>
-                <a:cxn ang="0">
-                  <a:pos x="connsiteX84" y="connsiteY84"/>
-                </a:cxn>
-                <a:cxn ang="0">
-                  <a:pos x="connsiteX85" y="connsiteY85"/>
-                </a:cxn>
-                <a:cxn ang="0">
-                  <a:pos x="connsiteX86" y="connsiteY86"/>
-                </a:cxn>
-                <a:cxn ang="0">
-                  <a:pos x="connsiteX87" y="connsiteY87"/>
-                </a:cxn>
-                <a:cxn ang="0">
-                  <a:pos x="connsiteX88" y="connsiteY88"/>
-                </a:cxn>
-                <a:cxn ang="0">
-                  <a:pos x="connsiteX89" y="connsiteY89"/>
-                </a:cxn>
-                <a:cxn ang="0">
-                  <a:pos x="connsiteX90" y="connsiteY90"/>
-                </a:cxn>
-                <a:cxn ang="0">
-                  <a:pos x="connsiteX91" y="connsiteY91"/>
-                </a:cxn>
-                <a:cxn ang="0">
-                  <a:pos x="connsiteX92" y="connsiteY92"/>
-                </a:cxn>
-                <a:cxn ang="0">
-                  <a:pos x="connsiteX93" y="connsiteY93"/>
-                </a:cxn>
-                <a:cxn ang="0">
-                  <a:pos x="connsiteX94" y="connsiteY94"/>
-                </a:cxn>
-                <a:cxn ang="0">
-                  <a:pos x="connsiteX95" y="connsiteY95"/>
-                </a:cxn>
-                <a:cxn ang="0">
-                  <a:pos x="connsiteX96" y="connsiteY96"/>
-                </a:cxn>
-                <a:cxn ang="0">
-                  <a:pos x="connsiteX97" y="connsiteY97"/>
-                </a:cxn>
-                <a:cxn ang="0">
-                  <a:pos x="connsiteX98" y="connsiteY98"/>
-                </a:cxn>
-                <a:cxn ang="0">
-                  <a:pos x="connsiteX99" y="connsiteY99"/>
-                </a:cxn>
-                <a:cxn ang="0">
-                  <a:pos x="connsiteX100" y="connsiteY100"/>
-                </a:cxn>
-                <a:cxn ang="0">
-                  <a:pos x="connsiteX101" y="connsiteY101"/>
-                </a:cxn>
-                <a:cxn ang="0">
-                  <a:pos x="connsiteX102" y="connsiteY102"/>
-                </a:cxn>
-                <a:cxn ang="0">
-                  <a:pos x="connsiteX103" y="connsiteY103"/>
-                </a:cxn>
-                <a:cxn ang="0">
-                  <a:pos x="connsiteX104" y="connsiteY104"/>
-                </a:cxn>
-                <a:cxn ang="0">
-                  <a:pos x="connsiteX105" y="connsiteY105"/>
-                </a:cxn>
-                <a:cxn ang="0">
-                  <a:pos x="connsiteX106" y="connsiteY106"/>
-                </a:cxn>
-                <a:cxn ang="0">
-                  <a:pos x="connsiteX107" y="connsiteY107"/>
-                </a:cxn>
-                <a:cxn ang="0">
-                  <a:pos x="connsiteX108" y="connsiteY108"/>
-                </a:cxn>
-                <a:cxn ang="0">
-                  <a:pos x="connsiteX109" y="connsiteY109"/>
-                </a:cxn>
-                <a:cxn ang="0">
-                  <a:pos x="connsiteX110" y="connsiteY110"/>
-                </a:cxn>
-                <a:cxn ang="0">
-                  <a:pos x="connsiteX111" y="connsiteY111"/>
-                </a:cxn>
-                <a:cxn ang="0">
-                  <a:pos x="connsiteX112" y="connsiteY112"/>
-                </a:cxn>
-                <a:cxn ang="0">
-                  <a:pos x="connsiteX113" y="connsiteY113"/>
-                </a:cxn>
-                <a:cxn ang="0">
-                  <a:pos x="connsiteX114" y="connsiteY114"/>
-                </a:cxn>
-                <a:cxn ang="0">
-                  <a:pos x="connsiteX115" y="connsiteY115"/>
-                </a:cxn>
-                <a:cxn ang="0">
-                  <a:pos x="connsiteX116" y="connsiteY116"/>
-                </a:cxn>
-                <a:cxn ang="0">
-                  <a:pos x="connsiteX117" y="connsiteY117"/>
-                </a:cxn>
-                <a:cxn ang="0">
-                  <a:pos x="connsiteX118" y="connsiteY118"/>
-                </a:cxn>
-                <a:cxn ang="0">
-                  <a:pos x="connsiteX119" y="connsiteY119"/>
-                </a:cxn>
-                <a:cxn ang="0">
-                  <a:pos x="connsiteX120" y="connsiteY120"/>
-                </a:cxn>
-                <a:cxn ang="0">
-                  <a:pos x="connsiteX121" y="connsiteY121"/>
-                </a:cxn>
-                <a:cxn ang="0">
-                  <a:pos x="connsiteX122" y="connsiteY122"/>
-                </a:cxn>
-                <a:cxn ang="0">
-                  <a:pos x="connsiteX123" y="connsiteY123"/>
-                </a:cxn>
-                <a:cxn ang="0">
-                  <a:pos x="connsiteX124" y="connsiteY124"/>
-                </a:cxn>
-                <a:cxn ang="0">
-                  <a:pos x="connsiteX125" y="connsiteY125"/>
-                </a:cxn>
-                <a:cxn ang="0">
-                  <a:pos x="connsiteX126" y="connsiteY126"/>
-                </a:cxn>
-                <a:cxn ang="0">
-                  <a:pos x="connsiteX127" y="connsiteY127"/>
-                </a:cxn>
-                <a:cxn ang="0">
-                  <a:pos x="connsiteX128" y="connsiteY128"/>
-                </a:cxn>
-                <a:cxn ang="0">
-                  <a:pos x="connsiteX129" y="connsiteY129"/>
-                </a:cxn>
-                <a:cxn ang="0">
-                  <a:pos x="connsiteX130" y="connsiteY130"/>
-                </a:cxn>
-                <a:cxn ang="0">
-                  <a:pos x="connsiteX131" y="connsiteY131"/>
-                </a:cxn>
-                <a:cxn ang="0">
-                  <a:pos x="connsiteX132" y="connsiteY132"/>
-                </a:cxn>
-                <a:cxn ang="0">
-                  <a:pos x="connsiteX133" y="connsiteY133"/>
-                </a:cxn>
-                <a:cxn ang="0">
-                  <a:pos x="connsiteX134" y="connsiteY134"/>
-                </a:cxn>
-                <a:cxn ang="0">
-                  <a:pos x="connsiteX135" y="connsiteY135"/>
-                </a:cxn>
-                <a:cxn ang="0">
-                  <a:pos x="connsiteX136" y="connsiteY136"/>
-                </a:cxn>
-                <a:cxn ang="0">
-                  <a:pos x="connsiteX137" y="connsiteY137"/>
-                </a:cxn>
-                <a:cxn ang="0">
-                  <a:pos x="connsiteX138" y="connsiteY138"/>
-                </a:cxn>
-                <a:cxn ang="0">
-                  <a:pos x="connsiteX139" y="connsiteY139"/>
-                </a:cxn>
-                <a:cxn ang="0">
-                  <a:pos x="connsiteX140" y="connsiteY140"/>
-                </a:cxn>
-                <a:cxn ang="0">
-                  <a:pos x="connsiteX141" y="connsiteY141"/>
-                </a:cxn>
-                <a:cxn ang="0">
-                  <a:pos x="connsiteX142" y="connsiteY142"/>
-                </a:cxn>
-                <a:cxn ang="0">
-                  <a:pos x="connsiteX143" y="connsiteY143"/>
-                </a:cxn>
-                <a:cxn ang="0">
-                  <a:pos x="connsiteX144" y="connsiteY144"/>
-                </a:cxn>
-                <a:cxn ang="0">
-                  <a:pos x="connsiteX145" y="connsiteY145"/>
-                </a:cxn>
-                <a:cxn ang="0">
-                  <a:pos x="connsiteX146" y="connsiteY146"/>
-                </a:cxn>
-                <a:cxn ang="0">
-                  <a:pos x="connsiteX147" y="connsiteY147"/>
-                </a:cxn>
-                <a:cxn ang="0">
-                  <a:pos x="connsiteX148" y="connsiteY148"/>
-                </a:cxn>
-                <a:cxn ang="0">
-                  <a:pos x="connsiteX149" y="connsiteY149"/>
-                </a:cxn>
-                <a:cxn ang="0">
-                  <a:pos x="connsiteX150" y="connsiteY150"/>
-                </a:cxn>
-                <a:cxn ang="0">
-                  <a:pos x="connsiteX151" y="connsiteY151"/>
-                </a:cxn>
-                <a:cxn ang="0">
-                  <a:pos x="connsiteX152" y="connsiteY152"/>
-                </a:cxn>
-                <a:cxn ang="0">
-                  <a:pos x="connsiteX153" y="connsiteY153"/>
-                </a:cxn>
-                <a:cxn ang="0">
-                  <a:pos x="connsiteX154" y="connsiteY154"/>
-                </a:cxn>
-                <a:cxn ang="0">
-                  <a:pos x="connsiteX155" y="connsiteY155"/>
-                </a:cxn>
-                <a:cxn ang="0">
-                  <a:pos x="connsiteX156" y="connsiteY156"/>
-                </a:cxn>
-                <a:cxn ang="0">
-                  <a:pos x="connsiteX157" y="connsiteY157"/>
-                </a:cxn>
-                <a:cxn ang="0">
-                  <a:pos x="connsiteX158" y="connsiteY158"/>
-                </a:cxn>
-                <a:cxn ang="0">
-                  <a:pos x="connsiteX159" y="connsiteY159"/>
-                </a:cxn>
-                <a:cxn ang="0">
-                  <a:pos x="connsiteX160" y="connsiteY160"/>
-                </a:cxn>
-                <a:cxn ang="0">
-                  <a:pos x="connsiteX161" y="connsiteY161"/>
-                </a:cxn>
-                <a:cxn ang="0">
-                  <a:pos x="connsiteX162" y="connsiteY162"/>
-                </a:cxn>
-                <a:cxn ang="0">
-                  <a:pos x="connsiteX163" y="connsiteY163"/>
-                </a:cxn>
-                <a:cxn ang="0">
-                  <a:pos x="connsiteX164" y="connsiteY164"/>
-                </a:cxn>
-                <a:cxn ang="0">
-                  <a:pos x="connsiteX165" y="connsiteY165"/>
-                </a:cxn>
-                <a:cxn ang="0">
-                  <a:pos x="connsiteX166" y="connsiteY166"/>
-                </a:cxn>
-                <a:cxn ang="0">
-                  <a:pos x="connsiteX167" y="connsiteY167"/>
-                </a:cxn>
-                <a:cxn ang="0">
-                  <a:pos x="connsiteX168" y="connsiteY168"/>
-                </a:cxn>
-                <a:cxn ang="0">
-                  <a:pos x="connsiteX169" y="connsiteY169"/>
-                </a:cxn>
-                <a:cxn ang="0">
-                  <a:pos x="connsiteX170" y="connsiteY170"/>
-                </a:cxn>
-                <a:cxn ang="0">
-                  <a:pos x="connsiteX171" y="connsiteY171"/>
-                </a:cxn>
-                <a:cxn ang="0">
-                  <a:pos x="connsiteX172" y="connsiteY172"/>
-                </a:cxn>
-                <a:cxn ang="0">
-                  <a:pos x="connsiteX173" y="connsiteY173"/>
-                </a:cxn>
-                <a:cxn ang="0">
-                  <a:pos x="connsiteX174" y="connsiteY174"/>
-                </a:cxn>
-                <a:cxn ang="0">
-                  <a:pos x="connsiteX175" y="connsiteY175"/>
-                </a:cxn>
-                <a:cxn ang="0">
-                  <a:pos x="connsiteX176" y="connsiteY176"/>
-                </a:cxn>
-                <a:cxn ang="0">
-                  <a:pos x="connsiteX177" y="connsiteY177"/>
-                </a:cxn>
-                <a:cxn ang="0">
-                  <a:pos x="connsiteX178" y="connsiteY178"/>
-                </a:cxn>
-                <a:cxn ang="0">
-                  <a:pos x="connsiteX179" y="connsiteY179"/>
-                </a:cxn>
-                <a:cxn ang="0">
-                  <a:pos x="connsiteX180" y="connsiteY180"/>
-                </a:cxn>
-              </a:cxnLst>
-              <a:rect l="l" t="t" r="r" b="b"/>
-              <a:pathLst>
-                <a:path w="12192000" h="757168">
-                  <a:moveTo>
-                    <a:pt x="0" y="0"/>
-                  </a:moveTo>
-                  <a:lnTo>
-                    <a:pt x="41653" y="6945"/>
-                  </a:lnTo>
-                  <a:cubicBezTo>
-                    <a:pt x="55151" y="9178"/>
-                    <a:pt x="68996" y="11810"/>
-                    <a:pt x="81317" y="15509"/>
-                  </a:cubicBezTo>
-                  <a:cubicBezTo>
-                    <a:pt x="92911" y="18978"/>
-                    <a:pt x="102562" y="24446"/>
-                    <a:pt x="114150" y="28105"/>
-                  </a:cubicBezTo>
-                  <a:cubicBezTo>
-                    <a:pt x="145644" y="37958"/>
-                    <a:pt x="177914" y="47281"/>
-                    <a:pt x="214865" y="58374"/>
-                  </a:cubicBezTo>
-                  <a:cubicBezTo>
-                    <a:pt x="236680" y="42349"/>
-                    <a:pt x="264438" y="53534"/>
-                    <a:pt x="299237" y="63560"/>
-                  </a:cubicBezTo>
-                  <a:cubicBezTo>
-                    <a:pt x="334763" y="73816"/>
-                    <a:pt x="376093" y="78654"/>
-                    <a:pt x="415570" y="83774"/>
-                  </a:cubicBezTo>
-                  <a:cubicBezTo>
-                    <a:pt x="487949" y="93100"/>
-                    <a:pt x="560804" y="100354"/>
-                    <a:pt x="633210" y="109108"/>
-                  </a:cubicBezTo>
-                  <a:cubicBezTo>
-                    <a:pt x="648566" y="111058"/>
-                    <a:pt x="666073" y="114072"/>
-                    <a:pt x="677567" y="119446"/>
-                  </a:cubicBezTo>
-                  <a:cubicBezTo>
-                    <a:pt x="756262" y="155621"/>
-                    <a:pt x="853422" y="169678"/>
-                    <a:pt x="946429" y="171502"/>
-                  </a:cubicBezTo>
-                  <a:cubicBezTo>
-                    <a:pt x="1019582" y="173044"/>
-                    <a:pt x="1091239" y="175083"/>
-                    <a:pt x="1163367" y="182106"/>
-                  </a:cubicBezTo>
-                  <a:cubicBezTo>
-                    <a:pt x="1168863" y="182586"/>
-                    <a:pt x="1176224" y="182589"/>
-                    <a:pt x="1180337" y="181279"/>
-                  </a:cubicBezTo>
-                  <a:cubicBezTo>
-                    <a:pt x="1205822" y="172503"/>
-                    <a:pt x="1231920" y="173109"/>
-                    <a:pt x="1263939" y="173070"/>
-                  </a:cubicBezTo>
-                  <a:cubicBezTo>
-                    <a:pt x="1309211" y="172961"/>
-                    <a:pt x="1350592" y="176848"/>
-                    <a:pt x="1392213" y="183225"/>
-                  </a:cubicBezTo>
-                  <a:cubicBezTo>
-                    <a:pt x="1422516" y="187866"/>
-                    <a:pt x="1453010" y="195759"/>
-                    <a:pt x="1479752" y="205174"/>
-                  </a:cubicBezTo>
-                  <a:cubicBezTo>
-                    <a:pt x="1516962" y="218381"/>
-                    <a:pt x="1553071" y="224660"/>
-                    <a:pt x="1589813" y="211706"/>
-                  </a:cubicBezTo>
-                  <a:cubicBezTo>
-                    <a:pt x="1629541" y="197953"/>
-                    <a:pt x="1673292" y="205778"/>
-                    <a:pt x="1716264" y="207459"/>
-                  </a:cubicBezTo>
-                  <a:cubicBezTo>
-                    <a:pt x="1734988" y="208248"/>
-                    <a:pt x="1754789" y="209668"/>
-                    <a:pt x="1772900" y="208137"/>
-                  </a:cubicBezTo>
-                  <a:cubicBezTo>
-                    <a:pt x="1825381" y="203828"/>
-                    <a:pt x="1876222" y="195808"/>
-                    <a:pt x="1929319" y="193822"/>
-                  </a:cubicBezTo>
-                  <a:cubicBezTo>
-                    <a:pt x="1958819" y="192698"/>
-                    <a:pt x="1991232" y="199166"/>
-                    <a:pt x="2021514" y="204186"/>
-                  </a:cubicBezTo>
-                  <a:cubicBezTo>
-                    <a:pt x="2052154" y="209417"/>
-                    <a:pt x="2082323" y="216530"/>
-                    <a:pt x="2111753" y="223797"/>
-                  </a:cubicBezTo>
-                  <a:cubicBezTo>
-                    <a:pt x="2131736" y="228659"/>
-                    <a:pt x="2153567" y="233429"/>
-                    <a:pt x="2169356" y="241125"/>
-                  </a:cubicBezTo>
-                  <a:cubicBezTo>
-                    <a:pt x="2205243" y="258649"/>
-                    <a:pt x="2242901" y="263295"/>
-                    <a:pt x="2286638" y="257382"/>
-                  </a:cubicBezTo>
-                  <a:cubicBezTo>
-                    <a:pt x="2293313" y="256396"/>
-                    <a:pt x="2301018" y="256799"/>
-                    <a:pt x="2308368" y="256995"/>
-                  </a:cubicBezTo>
-                  <a:cubicBezTo>
-                    <a:pt x="2426026" y="259155"/>
-                    <a:pt x="2543593" y="262834"/>
-                    <a:pt x="2660621" y="262863"/>
-                  </a:cubicBezTo>
-                  <a:cubicBezTo>
-                    <a:pt x="2708088" y="262871"/>
-                    <a:pt x="2754165" y="254412"/>
-                    <a:pt x="2801134" y="250006"/>
-                  </a:cubicBezTo>
-                  <a:cubicBezTo>
-                    <a:pt x="2810748" y="249174"/>
-                    <a:pt x="2821504" y="247638"/>
-                    <a:pt x="2830994" y="249091"/>
-                  </a:cubicBezTo>
-                  <a:cubicBezTo>
-                    <a:pt x="2934354" y="264045"/>
-                    <a:pt x="3032340" y="255254"/>
-                    <a:pt x="3129084" y="242009"/>
-                  </a:cubicBezTo>
-                  <a:cubicBezTo>
-                    <a:pt x="3139090" y="240625"/>
-                    <a:pt x="3151170" y="241831"/>
-                    <a:pt x="3162162" y="242789"/>
-                  </a:cubicBezTo>
-                  <a:cubicBezTo>
-                    <a:pt x="3192925" y="245736"/>
-                    <a:pt x="3225969" y="254145"/>
-                    <a:pt x="3254072" y="251612"/>
-                  </a:cubicBezTo>
-                  <a:cubicBezTo>
-                    <a:pt x="3328782" y="244461"/>
-                    <a:pt x="3402881" y="234992"/>
-                    <a:pt x="3473491" y="221903"/>
-                  </a:cubicBezTo>
-                  <a:cubicBezTo>
-                    <a:pt x="3545212" y="208683"/>
-                    <a:pt x="3611651" y="197856"/>
-                    <a:pt x="3691860" y="219228"/>
-                  </a:cubicBezTo>
-                  <a:cubicBezTo>
-                    <a:pt x="3725977" y="228268"/>
-                    <a:pt x="3771754" y="225515"/>
-                    <a:pt x="3811494" y="225691"/>
-                  </a:cubicBezTo>
-                  <a:cubicBezTo>
-                    <a:pt x="3840564" y="225687"/>
-                    <a:pt x="3868906" y="218586"/>
-                    <a:pt x="3897533" y="220087"/>
-                  </a:cubicBezTo>
-                  <a:cubicBezTo>
-                    <a:pt x="3973874" y="224087"/>
-                    <a:pt x="4042293" y="217563"/>
-                    <a:pt x="4109430" y="200477"/>
-                  </a:cubicBezTo>
-                  <a:cubicBezTo>
-                    <a:pt x="4135544" y="193834"/>
-                    <a:pt x="4175268" y="201258"/>
-                    <a:pt x="4208772" y="200914"/>
-                  </a:cubicBezTo>
-                  <a:cubicBezTo>
-                    <a:pt x="4244136" y="200288"/>
-                    <a:pt x="4280583" y="199908"/>
-                    <a:pt x="4314641" y="196159"/>
-                  </a:cubicBezTo>
-                  <a:cubicBezTo>
-                    <a:pt x="4402743" y="186278"/>
-                    <a:pt x="4489848" y="174436"/>
-                    <a:pt x="4577622" y="163774"/>
-                  </a:cubicBezTo>
-                  <a:cubicBezTo>
-                    <a:pt x="4649843" y="154967"/>
-                    <a:pt x="4719794" y="168553"/>
-                    <a:pt x="4790345" y="177592"/>
-                  </a:cubicBezTo>
-                  <a:cubicBezTo>
-                    <a:pt x="4834576" y="183345"/>
-                    <a:pt x="4875614" y="193701"/>
-                    <a:pt x="4926164" y="184139"/>
-                  </a:cubicBezTo>
-                  <a:cubicBezTo>
-                    <a:pt x="4974485" y="175032"/>
-                    <a:pt x="5034899" y="180870"/>
-                    <a:pt x="5088812" y="177401"/>
-                  </a:cubicBezTo>
-                  <a:cubicBezTo>
-                    <a:pt x="5134238" y="174439"/>
-                    <a:pt x="5178353" y="168165"/>
-                    <a:pt x="5222466" y="162082"/>
-                  </a:cubicBezTo>
-                  <a:cubicBezTo>
-                    <a:pt x="5282519" y="153783"/>
-                    <a:pt x="5341864" y="144876"/>
-                    <a:pt x="5406528" y="153987"/>
-                  </a:cubicBezTo>
-                  <a:cubicBezTo>
-                    <a:pt x="5479960" y="164323"/>
-                    <a:pt x="5531876" y="142624"/>
-                    <a:pt x="5590716" y="129490"/>
-                  </a:cubicBezTo>
-                  <a:cubicBezTo>
-                    <a:pt x="5631296" y="120553"/>
-                    <a:pt x="5675395" y="114659"/>
-                    <a:pt x="5719429" y="110099"/>
-                  </a:cubicBezTo>
-                  <a:cubicBezTo>
-                    <a:pt x="5778247" y="104215"/>
-                    <a:pt x="5838715" y="102042"/>
-                    <a:pt x="5897895" y="96368"/>
-                  </a:cubicBezTo>
-                  <a:cubicBezTo>
-                    <a:pt x="5987399" y="87895"/>
-                    <a:pt x="6077855" y="82333"/>
-                    <a:pt x="6169957" y="94411"/>
-                  </a:cubicBezTo>
-                  <a:cubicBezTo>
-                    <a:pt x="6212360" y="99875"/>
-                    <a:pt x="6252010" y="101763"/>
-                    <a:pt x="6294827" y="99236"/>
-                  </a:cubicBezTo>
-                  <a:cubicBezTo>
-                    <a:pt x="6364965" y="95091"/>
-                    <a:pt x="6436581" y="97891"/>
-                    <a:pt x="6494261" y="71724"/>
-                  </a:cubicBezTo>
-                  <a:cubicBezTo>
-                    <a:pt x="6514615" y="62488"/>
-                    <a:pt x="6550354" y="61691"/>
-                    <a:pt x="6579627" y="57883"/>
-                  </a:cubicBezTo>
-                  <a:cubicBezTo>
-                    <a:pt x="6613354" y="53353"/>
-                    <a:pt x="6637770" y="57878"/>
-                    <a:pt x="6654800" y="77086"/>
-                  </a:cubicBezTo>
-                  <a:cubicBezTo>
-                    <a:pt x="6662444" y="85688"/>
-                    <a:pt x="6685147" y="94892"/>
-                    <a:pt x="6703059" y="97166"/>
-                  </a:cubicBezTo>
-                  <a:cubicBezTo>
-                    <a:pt x="6756799" y="103989"/>
-                    <a:pt x="6806654" y="100687"/>
-                    <a:pt x="6859445" y="90481"/>
-                  </a:cubicBezTo>
-                  <a:cubicBezTo>
-                    <a:pt x="6908894" y="80861"/>
-                    <a:pt x="6969747" y="85387"/>
-                    <a:pt x="7025414" y="83536"/>
-                  </a:cubicBezTo>
-                  <a:cubicBezTo>
-                    <a:pt x="7064862" y="82168"/>
-                    <a:pt x="7104501" y="77186"/>
-                    <a:pt x="7144137" y="79264"/>
-                  </a:cubicBezTo>
-                  <a:cubicBezTo>
-                    <a:pt x="7193316" y="81841"/>
-                    <a:pt x="7241809" y="90488"/>
-                    <a:pt x="7291235" y="95367"/>
-                  </a:cubicBezTo>
-                  <a:cubicBezTo>
-                    <a:pt x="7329668" y="99288"/>
-                    <a:pt x="7368978" y="100585"/>
-                    <a:pt x="7407395" y="104888"/>
-                  </a:cubicBezTo>
-                  <a:cubicBezTo>
-                    <a:pt x="7438868" y="108256"/>
-                    <a:pt x="7469832" y="114265"/>
-                    <a:pt x="7500837" y="119515"/>
-                  </a:cubicBezTo>
-                  <a:cubicBezTo>
-                    <a:pt x="7512146" y="121444"/>
-                    <a:pt x="7523255" y="127178"/>
-                    <a:pt x="7533567" y="126955"/>
-                  </a:cubicBezTo>
-                  <a:cubicBezTo>
-                    <a:pt x="7636025" y="124121"/>
-                    <a:pt x="7707510" y="164497"/>
-                    <a:pt x="7792910" y="185188"/>
-                  </a:cubicBezTo>
-                  <a:cubicBezTo>
-                    <a:pt x="7882663" y="207063"/>
-                    <a:pt x="7969001" y="237914"/>
-                    <a:pt x="8070699" y="235423"/>
-                  </a:cubicBezTo>
-                  <a:cubicBezTo>
-                    <a:pt x="8132239" y="233879"/>
-                    <a:pt x="8191903" y="225939"/>
-                    <a:pt x="8253177" y="222473"/>
-                  </a:cubicBezTo>
-                  <a:cubicBezTo>
-                    <a:pt x="8274949" y="221324"/>
-                    <a:pt x="8299150" y="222976"/>
-                    <a:pt x="8320683" y="226393"/>
-                  </a:cubicBezTo>
-                  <a:cubicBezTo>
-                    <a:pt x="8424731" y="242340"/>
-                    <a:pt x="8527777" y="249266"/>
-                    <a:pt x="8631438" y="237528"/>
-                  </a:cubicBezTo>
-                  <a:cubicBezTo>
-                    <a:pt x="8649201" y="235596"/>
-                    <a:pt x="8668058" y="233915"/>
-                    <a:pt x="8686410" y="234877"/>
-                  </a:cubicBezTo>
-                  <a:cubicBezTo>
-                    <a:pt x="8786966" y="240146"/>
-                    <a:pt x="8885480" y="249315"/>
-                    <a:pt x="8980658" y="273001"/>
-                  </a:cubicBezTo>
-                  <a:cubicBezTo>
-                    <a:pt x="9012626" y="280972"/>
-                    <a:pt x="9052108" y="279035"/>
-                    <a:pt x="9087625" y="282423"/>
-                  </a:cubicBezTo>
-                  <a:cubicBezTo>
-                    <a:pt x="9120583" y="285484"/>
-                    <a:pt x="9154319" y="287825"/>
-                    <a:pt x="9186017" y="293875"/>
-                  </a:cubicBezTo>
-                  <a:cubicBezTo>
-                    <a:pt x="9232288" y="302785"/>
-                    <a:pt x="9275554" y="305815"/>
-                    <a:pt x="9323931" y="302628"/>
-                  </a:cubicBezTo>
-                  <a:cubicBezTo>
-                    <a:pt x="9370084" y="299705"/>
-                    <a:pt x="9419491" y="304964"/>
-                    <a:pt x="9467213" y="307275"/>
-                  </a:cubicBezTo>
-                  <a:cubicBezTo>
-                    <a:pt x="9520438" y="309874"/>
-                    <a:pt x="9573661" y="312473"/>
-                    <a:pt x="9626826" y="316213"/>
-                  </a:cubicBezTo>
-                  <a:cubicBezTo>
-                    <a:pt x="9648094" y="317708"/>
-                    <a:pt x="9671915" y="326588"/>
-                    <a:pt x="9689696" y="324467"/>
-                  </a:cubicBezTo>
-                  <a:cubicBezTo>
-                    <a:pt x="9747117" y="317175"/>
-                    <a:pt x="9803355" y="332523"/>
-                    <a:pt x="9860526" y="329986"/>
-                  </a:cubicBezTo>
-                  <a:cubicBezTo>
-                    <a:pt x="9888572" y="328594"/>
-                    <a:pt x="9919723" y="338048"/>
-                    <a:pt x="9949775" y="340386"/>
-                  </a:cubicBezTo>
-                  <a:cubicBezTo>
-                    <a:pt x="9998886" y="344296"/>
-                    <a:pt x="10048092" y="346302"/>
-                    <a:pt x="10097252" y="349262"/>
-                  </a:cubicBezTo>
-                  <a:cubicBezTo>
-                    <a:pt x="10113390" y="350297"/>
-                    <a:pt x="10129133" y="351886"/>
-                    <a:pt x="10145261" y="353113"/>
-                  </a:cubicBezTo>
-                  <a:cubicBezTo>
-                    <a:pt x="10159555" y="354243"/>
-                    <a:pt x="10174512" y="356743"/>
-                    <a:pt x="10188159" y="356124"/>
-                  </a:cubicBezTo>
-                  <a:cubicBezTo>
-                    <a:pt x="10237589" y="353944"/>
-                    <a:pt x="10286441" y="348682"/>
-                    <a:pt x="10336144" y="348235"/>
-                  </a:cubicBezTo>
-                  <a:cubicBezTo>
-                    <a:pt x="10379222" y="347822"/>
-                    <a:pt x="10423443" y="353764"/>
-                    <a:pt x="10466847" y="354131"/>
-                  </a:cubicBezTo>
-                  <a:cubicBezTo>
-                    <a:pt x="10543353" y="354898"/>
-                    <a:pt x="10619988" y="353190"/>
-                    <a:pt x="10696514" y="353575"/>
-                  </a:cubicBezTo>
-                  <a:cubicBezTo>
-                    <a:pt x="10713071" y="353680"/>
-                    <a:pt x="10730069" y="359342"/>
-                    <a:pt x="10746932" y="360606"/>
-                  </a:cubicBezTo>
-                  <a:cubicBezTo>
-                    <a:pt x="10799731" y="364326"/>
-                    <a:pt x="10852569" y="367289"/>
-                    <a:pt x="10905388" y="370627"/>
-                  </a:cubicBezTo>
-                  <a:cubicBezTo>
-                    <a:pt x="10935470" y="372396"/>
-                    <a:pt x="10965963" y="373421"/>
-                    <a:pt x="10995602" y="376691"/>
-                  </a:cubicBezTo>
-                  <a:cubicBezTo>
-                    <a:pt x="11034750" y="381032"/>
-                    <a:pt x="11070168" y="386324"/>
-                    <a:pt x="11107647" y="373405"/>
-                  </a:cubicBezTo>
-                  <a:cubicBezTo>
-                    <a:pt x="11165372" y="353347"/>
-                    <a:pt x="11236837" y="366060"/>
-                    <a:pt x="11302440" y="364156"/>
-                  </a:cubicBezTo>
-                  <a:cubicBezTo>
-                    <a:pt x="11319394" y="363708"/>
-                    <a:pt x="11336655" y="364422"/>
-                    <a:pt x="11353613" y="363785"/>
-                  </a:cubicBezTo>
-                  <a:cubicBezTo>
-                    <a:pt x="11384961" y="362566"/>
-                    <a:pt x="11415955" y="360947"/>
-                    <a:pt x="11447323" y="359346"/>
-                  </a:cubicBezTo>
-                  <a:cubicBezTo>
-                    <a:pt x="11452855" y="359066"/>
-                    <a:pt x="11459104" y="359200"/>
-                    <a:pt x="11464292" y="358519"/>
-                  </a:cubicBezTo>
-                  <a:cubicBezTo>
-                    <a:pt x="11512058" y="353010"/>
-                    <a:pt x="11559143" y="346321"/>
-                    <a:pt x="11607560" y="342370"/>
-                  </a:cubicBezTo>
-                  <a:cubicBezTo>
-                    <a:pt x="11631218" y="340368"/>
-                    <a:pt x="11657295" y="341352"/>
-                    <a:pt x="11681426" y="344335"/>
-                  </a:cubicBezTo>
-                  <a:cubicBezTo>
-                    <a:pt x="11751997" y="352993"/>
-                    <a:pt x="11821986" y="358760"/>
-                    <a:pt x="11893565" y="355261"/>
-                  </a:cubicBezTo>
-                  <a:cubicBezTo>
-                    <a:pt x="11921973" y="353889"/>
-                    <a:pt x="11953288" y="360300"/>
-                    <a:pt x="11983290" y="363588"/>
-                  </a:cubicBezTo>
-                  <a:lnTo>
-                    <a:pt x="12192000" y="388018"/>
-                  </a:lnTo>
-                  <a:lnTo>
-                    <a:pt x="12192000" y="577115"/>
-                  </a:lnTo>
-                  <a:lnTo>
-                    <a:pt x="12157329" y="588862"/>
-                  </a:lnTo>
-                  <a:cubicBezTo>
-                    <a:pt x="12118393" y="608572"/>
-                    <a:pt x="12109715" y="605637"/>
-                    <a:pt x="12066948" y="586034"/>
-                  </a:cubicBezTo>
-                  <a:cubicBezTo>
-                    <a:pt x="12016991" y="563193"/>
-                    <a:pt x="11965119" y="541779"/>
-                    <a:pt x="11911344" y="521599"/>
-                  </a:cubicBezTo>
-                  <a:cubicBezTo>
-                    <a:pt x="11894383" y="515178"/>
-                    <a:pt x="11869417" y="514060"/>
-                    <a:pt x="11847823" y="511785"/>
-                  </a:cubicBezTo>
-                  <a:cubicBezTo>
-                    <a:pt x="11811233" y="507768"/>
-                    <a:pt x="11773630" y="501982"/>
-                    <a:pt x="11737547" y="502380"/>
-                  </a:cubicBezTo>
-                  <a:cubicBezTo>
-                    <a:pt x="11702930" y="502855"/>
-                    <a:pt x="11668388" y="508866"/>
-                    <a:pt x="11636052" y="514993"/>
-                  </a:cubicBezTo>
-                  <a:cubicBezTo>
-                    <a:pt x="11545722" y="532199"/>
-                    <a:pt x="11462455" y="555118"/>
-                    <a:pt x="11394706" y="590867"/>
-                  </a:cubicBezTo>
-                  <a:cubicBezTo>
-                    <a:pt x="11385999" y="595562"/>
-                    <a:pt x="11369016" y="596581"/>
-                    <a:pt x="11354978" y="597561"/>
-                  </a:cubicBezTo>
-                  <a:cubicBezTo>
-                    <a:pt x="11332076" y="599224"/>
-                    <a:pt x="11308448" y="600655"/>
-                    <a:pt x="11285306" y="599825"/>
-                  </a:cubicBezTo>
-                  <a:cubicBezTo>
-                    <a:pt x="11172906" y="595841"/>
-                    <a:pt x="11083430" y="617861"/>
-                    <a:pt x="11008528" y="656670"/>
-                  </a:cubicBezTo>
-                  <a:cubicBezTo>
-                    <a:pt x="10986971" y="667750"/>
-                    <a:pt x="10970753" y="668236"/>
-                    <a:pt x="10948735" y="652964"/>
-                  </a:cubicBezTo>
-                  <a:cubicBezTo>
-                    <a:pt x="10923173" y="635218"/>
-                    <a:pt x="10885031" y="639705"/>
-                    <a:pt x="10850698" y="641721"/>
-                  </a:cubicBezTo>
-                  <a:cubicBezTo>
-                    <a:pt x="10815269" y="643680"/>
-                    <a:pt x="10779458" y="645811"/>
-                    <a:pt x="10744026" y="647769"/>
-                  </a:cubicBezTo>
-                  <a:cubicBezTo>
-                    <a:pt x="10717832" y="649066"/>
-                    <a:pt x="10692021" y="650003"/>
-                    <a:pt x="10666160" y="651891"/>
-                  </a:cubicBezTo>
-                  <a:cubicBezTo>
-                    <a:pt x="10585627" y="657783"/>
-                    <a:pt x="10513854" y="650969"/>
-                    <a:pt x="10450521" y="616552"/>
-                  </a:cubicBezTo>
-                  <a:cubicBezTo>
-                    <a:pt x="10402221" y="590175"/>
-                    <a:pt x="10339099" y="579806"/>
-                    <a:pt x="10271192" y="583498"/>
-                  </a:cubicBezTo>
-                  <a:cubicBezTo>
-                    <a:pt x="10262701" y="584006"/>
-                    <a:pt x="10251859" y="587254"/>
-                    <a:pt x="10246067" y="585423"/>
-                  </a:cubicBezTo>
-                  <a:cubicBezTo>
-                    <a:pt x="10158786" y="558528"/>
-                    <a:pt x="10086634" y="594049"/>
-                    <a:pt x="10005027" y="592252"/>
-                  </a:cubicBezTo>
-                  <a:cubicBezTo>
-                    <a:pt x="9969004" y="591507"/>
-                    <a:pt x="9931565" y="603664"/>
-                    <a:pt x="9898681" y="613195"/>
-                  </a:cubicBezTo>
-                  <a:cubicBezTo>
-                    <a:pt x="9853463" y="626281"/>
-                    <a:pt x="9813049" y="639042"/>
-                    <a:pt x="9753225" y="629038"/>
-                  </a:cubicBezTo>
-                  <a:cubicBezTo>
-                    <a:pt x="9693404" y="618845"/>
-                    <a:pt x="9637675" y="628898"/>
-                    <a:pt x="9591376" y="648601"/>
-                  </a:cubicBezTo>
-                  <a:cubicBezTo>
-                    <a:pt x="9556001" y="663537"/>
-                    <a:pt x="9518120" y="663077"/>
-                    <a:pt x="9472860" y="655936"/>
-                  </a:cubicBezTo>
-                  <a:cubicBezTo>
-                    <a:pt x="9416283" y="647056"/>
-                    <a:pt x="9357217" y="643578"/>
-                    <a:pt x="9299788" y="636945"/>
-                  </a:cubicBezTo>
-                  <a:cubicBezTo>
-                    <a:pt x="9287347" y="635531"/>
-                    <a:pt x="9271710" y="632039"/>
-                    <a:pt x="9264605" y="627087"/>
-                  </a:cubicBezTo>
-                  <a:cubicBezTo>
-                    <a:pt x="9177661" y="565680"/>
-                    <a:pt x="9051076" y="558473"/>
-                    <a:pt x="8926435" y="549269"/>
-                  </a:cubicBezTo>
-                  <a:cubicBezTo>
-                    <a:pt x="8850925" y="543595"/>
-                    <a:pt x="8774954" y="539613"/>
-                    <a:pt x="8698934" y="536583"/>
-                  </a:cubicBezTo>
-                  <a:cubicBezTo>
-                    <a:pt x="8673232" y="535428"/>
-                    <a:pt x="8645916" y="537050"/>
-                    <a:pt x="8622862" y="541563"/>
-                  </a:cubicBezTo>
-                  <a:cubicBezTo>
-                    <a:pt x="8574890" y="551069"/>
-                    <a:pt x="8530403" y="564380"/>
-                    <a:pt x="8482784" y="574094"/>
-                  </a:cubicBezTo>
-                  <a:cubicBezTo>
-                    <a:pt x="8464923" y="577929"/>
-                    <a:pt x="8442157" y="576927"/>
-                    <a:pt x="8421565" y="576610"/>
-                  </a:cubicBezTo>
-                  <a:cubicBezTo>
-                    <a:pt x="8385152" y="576229"/>
-                    <a:pt x="8345023" y="569546"/>
-                    <a:pt x="8313469" y="574762"/>
-                  </a:cubicBezTo>
-                  <a:cubicBezTo>
-                    <a:pt x="8231431" y="588203"/>
-                    <a:pt x="8155671" y="580227"/>
-                    <a:pt x="8079520" y="558685"/>
-                  </a:cubicBezTo>
-                  <a:cubicBezTo>
-                    <a:pt x="7972906" y="528487"/>
-                    <a:pt x="7870782" y="525043"/>
-                    <a:pt x="7773327" y="558854"/>
-                  </a:cubicBezTo>
-                  <a:cubicBezTo>
-                    <a:pt x="7729470" y="574107"/>
-                    <a:pt x="7688069" y="563543"/>
-                    <a:pt x="7652477" y="547561"/>
-                  </a:cubicBezTo>
-                  <a:cubicBezTo>
-                    <a:pt x="7611494" y="529005"/>
-                    <a:pt x="7570974" y="522685"/>
-                    <a:pt x="7522274" y="532150"/>
-                  </a:cubicBezTo>
-                  <a:cubicBezTo>
-                    <a:pt x="7511488" y="534257"/>
-                    <a:pt x="7496511" y="532136"/>
-                    <a:pt x="7484080" y="530532"/>
-                  </a:cubicBezTo>
-                  <a:cubicBezTo>
-                    <a:pt x="7413133" y="522044"/>
-                    <a:pt x="7341987" y="510303"/>
-                    <a:pt x="7282277" y="540177"/>
-                  </a:cubicBezTo>
-                  <a:cubicBezTo>
-                    <a:pt x="7270558" y="546051"/>
-                    <a:pt x="7251336" y="547713"/>
-                    <a:pt x="7235690" y="551282"/>
-                  </a:cubicBezTo>
-                  <a:cubicBezTo>
-                    <a:pt x="7170161" y="565782"/>
-                    <a:pt x="7172820" y="564203"/>
-                    <a:pt x="7116339" y="539494"/>
-                  </a:cubicBezTo>
-                  <a:cubicBezTo>
-                    <a:pt x="7086841" y="526502"/>
-                    <a:pt x="7045980" y="512724"/>
-                    <a:pt x="7011067" y="511848"/>
-                  </a:cubicBezTo>
-                  <a:cubicBezTo>
-                    <a:pt x="6800473" y="506533"/>
-                    <a:pt x="6601893" y="468653"/>
-                    <a:pt x="6403234" y="432296"/>
-                  </a:cubicBezTo>
-                  <a:cubicBezTo>
-                    <a:pt x="6280760" y="409851"/>
-                    <a:pt x="6160432" y="402592"/>
-                    <a:pt x="6036273" y="412301"/>
-                  </a:cubicBezTo>
-                  <a:cubicBezTo>
-                    <a:pt x="5946471" y="419425"/>
-                    <a:pt x="5863077" y="395593"/>
-                    <a:pt x="5780467" y="377910"/>
-                  </a:cubicBezTo>
-                  <a:cubicBezTo>
-                    <a:pt x="5763357" y="374343"/>
-                    <a:pt x="5747757" y="363033"/>
-                    <a:pt x="5739051" y="353609"/>
-                  </a:cubicBezTo>
-                  <a:cubicBezTo>
-                    <a:pt x="5707675" y="320294"/>
-                    <a:pt x="5653252" y="312483"/>
-                    <a:pt x="5583566" y="321995"/>
-                  </a:cubicBezTo>
-                  <a:cubicBezTo>
-                    <a:pt x="5528347" y="329404"/>
-                    <a:pt x="5477716" y="340486"/>
-                    <a:pt x="5432030" y="362512"/>
-                  </a:cubicBezTo>
-                  <a:cubicBezTo>
-                    <a:pt x="5378421" y="388318"/>
-                    <a:pt x="5322767" y="418026"/>
-                    <a:pt x="5241398" y="425781"/>
-                  </a:cubicBezTo>
-                  <a:cubicBezTo>
-                    <a:pt x="5206262" y="429089"/>
-                    <a:pt x="5176131" y="428273"/>
-                    <a:pt x="5139710" y="421022"/>
-                  </a:cubicBezTo>
-                  <a:cubicBezTo>
-                    <a:pt x="5069048" y="407018"/>
-                    <a:pt x="4997864" y="396037"/>
-                    <a:pt x="4929402" y="424310"/>
-                  </a:cubicBezTo>
-                  <a:cubicBezTo>
-                    <a:pt x="4891785" y="439890"/>
-                    <a:pt x="4841650" y="448519"/>
-                    <a:pt x="4782793" y="441046"/>
-                  </a:cubicBezTo>
-                  <a:cubicBezTo>
-                    <a:pt x="4709316" y="431663"/>
-                    <a:pt x="4641426" y="442031"/>
-                    <a:pt x="4577594" y="459290"/>
-                  </a:cubicBezTo>
-                  <a:cubicBezTo>
-                    <a:pt x="4554816" y="465538"/>
-                    <a:pt x="4527069" y="468279"/>
-                    <a:pt x="4500826" y="470529"/>
-                  </a:cubicBezTo>
-                  <a:cubicBezTo>
-                    <a:pt x="4440199" y="475746"/>
-                    <a:pt x="4379252" y="479993"/>
-                    <a:pt x="4317973" y="483649"/>
-                  </a:cubicBezTo>
-                  <a:cubicBezTo>
-                    <a:pt x="4267762" y="486741"/>
-                    <a:pt x="4217264" y="488292"/>
-                    <a:pt x="4166722" y="490602"/>
-                  </a:cubicBezTo>
-                  <a:cubicBezTo>
-                    <a:pt x="4111394" y="493045"/>
-                    <a:pt x="4067073" y="503124"/>
-                    <a:pt x="4042814" y="530660"/>
-                  </a:cubicBezTo>
-                  <a:cubicBezTo>
-                    <a:pt x="4034996" y="539407"/>
-                    <a:pt x="4017001" y="545715"/>
-                    <a:pt x="4002653" y="552594"/>
-                  </a:cubicBezTo>
-                  <a:cubicBezTo>
-                    <a:pt x="3992459" y="557592"/>
-                    <a:pt x="3979023" y="561086"/>
-                    <a:pt x="3969549" y="566312"/>
-                  </a:cubicBezTo>
-                  <a:cubicBezTo>
-                    <a:pt x="3919896" y="593854"/>
-                    <a:pt x="3870968" y="621622"/>
-                    <a:pt x="3821685" y="649183"/>
-                  </a:cubicBezTo>
-                  <a:cubicBezTo>
-                    <a:pt x="3816761" y="651788"/>
-                    <a:pt x="3811445" y="654943"/>
-                    <a:pt x="3805138" y="655947"/>
-                  </a:cubicBezTo>
-                  <a:cubicBezTo>
-                    <a:pt x="3739817" y="666451"/>
-                    <a:pt x="3673801" y="676154"/>
-                    <a:pt x="3609177" y="687459"/>
-                  </a:cubicBezTo>
-                  <a:cubicBezTo>
-                    <a:pt x="3584288" y="691878"/>
-                    <a:pt x="3558597" y="697589"/>
-                    <a:pt x="3539727" y="706521"/>
-                  </a:cubicBezTo>
-                  <a:cubicBezTo>
-                    <a:pt x="3496714" y="726780"/>
-                    <a:pt x="3457268" y="749132"/>
-                    <a:pt x="3396572" y="755681"/>
-                  </a:cubicBezTo>
-                  <a:cubicBezTo>
-                    <a:pt x="3378807" y="757611"/>
-                    <a:pt x="3357809" y="758036"/>
-                    <a:pt x="3341054" y="754679"/>
-                  </a:cubicBezTo>
-                  <a:cubicBezTo>
-                    <a:pt x="3272962" y="740809"/>
-                    <a:pt x="3206471" y="724541"/>
-                    <a:pt x="3138775" y="710120"/>
-                  </a:cubicBezTo>
-                  <a:cubicBezTo>
-                    <a:pt x="3095820" y="701191"/>
-                    <a:pt x="3056969" y="691141"/>
-                    <a:pt x="3037283" y="666453"/>
-                  </a:cubicBezTo>
-                  <a:cubicBezTo>
-                    <a:pt x="3031764" y="659487"/>
-                    <a:pt x="3015626" y="651391"/>
-                    <a:pt x="3002117" y="649347"/>
-                  </a:cubicBezTo>
-                  <a:cubicBezTo>
-                    <a:pt x="2915220" y="636209"/>
-                    <a:pt x="2829194" y="627503"/>
-                    <a:pt x="2747294" y="652400"/>
-                  </a:cubicBezTo>
-                  <a:cubicBezTo>
-                    <a:pt x="2730084" y="657794"/>
-                    <a:pt x="2698519" y="656140"/>
-                    <a:pt x="2676273" y="652304"/>
-                  </a:cubicBezTo>
-                  <a:cubicBezTo>
-                    <a:pt x="2590546" y="637890"/>
-                    <a:pt x="2508883" y="630176"/>
-                    <a:pt x="2432360" y="657836"/>
-                  </a:cubicBezTo>
-                  <a:cubicBezTo>
-                    <a:pt x="2423352" y="661179"/>
-                    <a:pt x="2395274" y="656272"/>
-                    <a:pt x="2382311" y="650824"/>
-                  </a:cubicBezTo>
-                  <a:cubicBezTo>
-                    <a:pt x="2257393" y="597728"/>
-                    <a:pt x="2187724" y="592930"/>
-                    <a:pt x="2055134" y="630053"/>
-                  </a:cubicBezTo>
-                  <a:cubicBezTo>
-                    <a:pt x="2046542" y="632464"/>
-                    <a:pt x="2035364" y="635121"/>
-                    <a:pt x="2031829" y="639324"/>
-                  </a:cubicBezTo>
-                  <a:cubicBezTo>
-                    <a:pt x="2007977" y="666120"/>
-                    <a:pt x="1960229" y="664380"/>
-                    <a:pt x="1912764" y="664183"/>
-                  </a:cubicBezTo>
-                  <a:cubicBezTo>
-                    <a:pt x="1860521" y="663924"/>
-                    <a:pt x="1808236" y="664426"/>
-                    <a:pt x="1755637" y="663960"/>
-                  </a:cubicBezTo>
-                  <a:cubicBezTo>
-                    <a:pt x="1746439" y="663859"/>
-                    <a:pt x="1736243" y="661799"/>
-                    <a:pt x="1727159" y="659605"/>
-                  </a:cubicBezTo>
-                  <a:cubicBezTo>
-                    <a:pt x="1692256" y="651480"/>
-                    <a:pt x="1658604" y="640559"/>
-                    <a:pt x="1622470" y="634850"/>
-                  </a:cubicBezTo>
-                  <a:cubicBezTo>
-                    <a:pt x="1544362" y="622552"/>
-                    <a:pt x="1469248" y="602210"/>
-                    <a:pt x="1385955" y="604522"/>
-                  </a:cubicBezTo>
-                  <a:cubicBezTo>
-                    <a:pt x="1371585" y="604913"/>
-                    <a:pt x="1355357" y="598530"/>
-                    <a:pt x="1340055" y="595629"/>
-                  </a:cubicBezTo>
-                  <a:cubicBezTo>
-                    <a:pt x="1312351" y="590552"/>
-                    <a:pt x="1285460" y="583993"/>
-                    <a:pt x="1257271" y="581180"/>
-                  </a:cubicBezTo>
-                  <a:cubicBezTo>
-                    <a:pt x="1182583" y="573830"/>
-                    <a:pt x="1107142" y="566824"/>
-                    <a:pt x="1031914" y="562692"/>
-                  </a:cubicBezTo>
-                  <a:cubicBezTo>
-                    <a:pt x="995593" y="560597"/>
-                    <a:pt x="958880" y="565923"/>
-                    <a:pt x="922031" y="566853"/>
-                  </a:cubicBezTo>
-                  <a:cubicBezTo>
-                    <a:pt x="905446" y="567320"/>
-                    <a:pt x="878533" y="568199"/>
-                    <a:pt x="873250" y="563724"/>
-                  </a:cubicBezTo>
-                  <a:cubicBezTo>
-                    <a:pt x="832343" y="529722"/>
-                    <a:pt x="772202" y="532674"/>
-                    <a:pt x="711627" y="529880"/>
-                  </a:cubicBezTo>
-                  <a:cubicBezTo>
-                    <a:pt x="577999" y="523641"/>
-                    <a:pt x="447408" y="543696"/>
-                    <a:pt x="311112" y="525106"/>
-                  </a:cubicBezTo>
-                  <a:cubicBezTo>
-                    <a:pt x="271645" y="519795"/>
-                    <a:pt x="226936" y="530235"/>
-                    <a:pt x="184145" y="532188"/>
-                  </a:cubicBezTo>
-                  <a:cubicBezTo>
-                    <a:pt x="162015" y="533128"/>
-                    <a:pt x="137665" y="534333"/>
-                    <a:pt x="116886" y="530572"/>
-                  </a:cubicBezTo>
-                  <a:cubicBezTo>
-                    <a:pt x="84810" y="524693"/>
-                    <a:pt x="54011" y="515448"/>
-                    <a:pt x="23941" y="506433"/>
-                  </a:cubicBezTo>
-                  <a:lnTo>
-                    <a:pt x="0" y="502149"/>
-                  </a:lnTo>
-                  <a:close/>
-                </a:path>
-              </a:pathLst>
-            </a:custGeom>
-            <a:solidFill>
-              <a:srgbClr val="FFFFFF"/>
-            </a:solidFill>
-            <a:ln w="12700" cap="flat" cmpd="sng" algn="ctr">
-              <a:noFill/>
-              <a:prstDash val="solid"/>
-              <a:miter lim="800000"/>
-            </a:ln>
-            <a:effectLst>
-              <a:outerShdw blurRad="381000" dist="152400" dir="5400000" algn="t" rotWithShape="0">
-                <a:prstClr val="black">
-                  <a:alpha val="10000"/>
-                </a:prstClr>
-              </a:outerShdw>
-            </a:effectLst>
-          </p:spPr>
-          <p:style>
-            <a:lnRef idx="2">
-              <a:schemeClr val="accent1">
-                <a:shade val="50000"/>
-              </a:schemeClr>
-            </a:lnRef>
-            <a:fillRef idx="1">
-              <a:schemeClr val="accent1"/>
-            </a:fillRef>
-            <a:effectRef idx="0">
-              <a:schemeClr val="accent1"/>
-            </a:effectRef>
-            <a:fontRef idx="minor">
-              <a:schemeClr val="lt1"/>
-            </a:fontRef>
-          </p:style>
-          <p:txBody>
-            <a:bodyPr wrap="square" rtlCol="0" anchor="ctr">
-              <a:noAutofit/>
-            </a:bodyPr>
-            <a:lstStyle/>
-            <a:p>
-              <a:pPr algn="ctr"/>
-              <a:endParaRPr lang="en-US"/>
-            </a:p>
-          </p:txBody>
-        </p:sp>
-        <p:sp>
-          <p:nvSpPr>
-            <p:cNvPr id="22" name="Freeform: Shape 21">
-              <a:extLst>
-                <a:ext uri="{FF2B5EF4-FFF2-40B4-BE49-F238E27FC236}">
-                  <a16:creationId xmlns:a16="http://schemas.microsoft.com/office/drawing/2014/main" id="{840A04EE-8E37-4C28-B09B-A9593A4AAB0C}"/>
-                </a:ext>
-                <a:ext uri="{C183D7F6-B498-43B3-948B-1728B52AA6E4}">
-                  <adec:decorative xmlns:adec="http://schemas.microsoft.com/office/drawing/2017/decorative" val="1"/>
-                </a:ext>
-              </a:extLst>
-            </p:cNvPr>
-            <p:cNvSpPr/>
-            <p:nvPr>
-              <p:extLst>
-                <p:ext uri="{386F3935-93C4-4BCD-93E2-E3B085C9AB24}">
-                  <p16:designElem xmlns:p16="http://schemas.microsoft.com/office/powerpoint/2015/main" val="1"/>
-                </p:ext>
-              </p:extLst>
-            </p:nvPr>
-          </p:nvSpPr>
-          <p:spPr>
-            <a:xfrm>
-              <a:off x="0" y="2959818"/>
-              <a:ext cx="12192000" cy="757168"/>
-            </a:xfrm>
-            <a:custGeom>
-              <a:avLst/>
-              <a:gdLst>
-                <a:gd name="connsiteX0" fmla="*/ 0 w 12192000"/>
-                <a:gd name="connsiteY0" fmla="*/ 0 h 757168"/>
-                <a:gd name="connsiteX1" fmla="*/ 41653 w 12192000"/>
-                <a:gd name="connsiteY1" fmla="*/ 6945 h 757168"/>
-                <a:gd name="connsiteX2" fmla="*/ 81317 w 12192000"/>
-                <a:gd name="connsiteY2" fmla="*/ 15509 h 757168"/>
-                <a:gd name="connsiteX3" fmla="*/ 114150 w 12192000"/>
-                <a:gd name="connsiteY3" fmla="*/ 28105 h 757168"/>
-                <a:gd name="connsiteX4" fmla="*/ 214865 w 12192000"/>
-                <a:gd name="connsiteY4" fmla="*/ 58374 h 757168"/>
-                <a:gd name="connsiteX5" fmla="*/ 299237 w 12192000"/>
-                <a:gd name="connsiteY5" fmla="*/ 63560 h 757168"/>
-                <a:gd name="connsiteX6" fmla="*/ 415570 w 12192000"/>
-                <a:gd name="connsiteY6" fmla="*/ 83774 h 757168"/>
-                <a:gd name="connsiteX7" fmla="*/ 633210 w 12192000"/>
-                <a:gd name="connsiteY7" fmla="*/ 109108 h 757168"/>
-                <a:gd name="connsiteX8" fmla="*/ 677567 w 12192000"/>
-                <a:gd name="connsiteY8" fmla="*/ 119446 h 757168"/>
-                <a:gd name="connsiteX9" fmla="*/ 946429 w 12192000"/>
-                <a:gd name="connsiteY9" fmla="*/ 171502 h 757168"/>
-                <a:gd name="connsiteX10" fmla="*/ 1163367 w 12192000"/>
-                <a:gd name="connsiteY10" fmla="*/ 182106 h 757168"/>
-                <a:gd name="connsiteX11" fmla="*/ 1180337 w 12192000"/>
-                <a:gd name="connsiteY11" fmla="*/ 181279 h 757168"/>
-                <a:gd name="connsiteX12" fmla="*/ 1263939 w 12192000"/>
-                <a:gd name="connsiteY12" fmla="*/ 173070 h 757168"/>
-                <a:gd name="connsiteX13" fmla="*/ 1392213 w 12192000"/>
-                <a:gd name="connsiteY13" fmla="*/ 183225 h 757168"/>
-                <a:gd name="connsiteX14" fmla="*/ 1479752 w 12192000"/>
-                <a:gd name="connsiteY14" fmla="*/ 205174 h 757168"/>
-                <a:gd name="connsiteX15" fmla="*/ 1589813 w 12192000"/>
-                <a:gd name="connsiteY15" fmla="*/ 211706 h 757168"/>
-                <a:gd name="connsiteX16" fmla="*/ 1716264 w 12192000"/>
-                <a:gd name="connsiteY16" fmla="*/ 207459 h 757168"/>
-                <a:gd name="connsiteX17" fmla="*/ 1772900 w 12192000"/>
-                <a:gd name="connsiteY17" fmla="*/ 208137 h 757168"/>
-                <a:gd name="connsiteX18" fmla="*/ 1929319 w 12192000"/>
-                <a:gd name="connsiteY18" fmla="*/ 193822 h 757168"/>
-                <a:gd name="connsiteX19" fmla="*/ 2021514 w 12192000"/>
-                <a:gd name="connsiteY19" fmla="*/ 204186 h 757168"/>
-                <a:gd name="connsiteX20" fmla="*/ 2111753 w 12192000"/>
-                <a:gd name="connsiteY20" fmla="*/ 223797 h 757168"/>
-                <a:gd name="connsiteX21" fmla="*/ 2169356 w 12192000"/>
-                <a:gd name="connsiteY21" fmla="*/ 241125 h 757168"/>
-                <a:gd name="connsiteX22" fmla="*/ 2286638 w 12192000"/>
-                <a:gd name="connsiteY22" fmla="*/ 257382 h 757168"/>
-                <a:gd name="connsiteX23" fmla="*/ 2308368 w 12192000"/>
-                <a:gd name="connsiteY23" fmla="*/ 256995 h 757168"/>
-                <a:gd name="connsiteX24" fmla="*/ 2660621 w 12192000"/>
-                <a:gd name="connsiteY24" fmla="*/ 262863 h 757168"/>
-                <a:gd name="connsiteX25" fmla="*/ 2801134 w 12192000"/>
-                <a:gd name="connsiteY25" fmla="*/ 250006 h 757168"/>
-                <a:gd name="connsiteX26" fmla="*/ 2830994 w 12192000"/>
-                <a:gd name="connsiteY26" fmla="*/ 249091 h 757168"/>
-                <a:gd name="connsiteX27" fmla="*/ 3129084 w 12192000"/>
-                <a:gd name="connsiteY27" fmla="*/ 242009 h 757168"/>
-                <a:gd name="connsiteX28" fmla="*/ 3162162 w 12192000"/>
-                <a:gd name="connsiteY28" fmla="*/ 242789 h 757168"/>
-                <a:gd name="connsiteX29" fmla="*/ 3254072 w 12192000"/>
-                <a:gd name="connsiteY29" fmla="*/ 251612 h 757168"/>
-                <a:gd name="connsiteX30" fmla="*/ 3473491 w 12192000"/>
-                <a:gd name="connsiteY30" fmla="*/ 221903 h 757168"/>
-                <a:gd name="connsiteX31" fmla="*/ 3691860 w 12192000"/>
-                <a:gd name="connsiteY31" fmla="*/ 219228 h 757168"/>
-                <a:gd name="connsiteX32" fmla="*/ 3811494 w 12192000"/>
-                <a:gd name="connsiteY32" fmla="*/ 225691 h 757168"/>
-                <a:gd name="connsiteX33" fmla="*/ 3897533 w 12192000"/>
-                <a:gd name="connsiteY33" fmla="*/ 220087 h 757168"/>
-                <a:gd name="connsiteX34" fmla="*/ 4109430 w 12192000"/>
-                <a:gd name="connsiteY34" fmla="*/ 200477 h 757168"/>
-                <a:gd name="connsiteX35" fmla="*/ 4208772 w 12192000"/>
-                <a:gd name="connsiteY35" fmla="*/ 200914 h 757168"/>
-                <a:gd name="connsiteX36" fmla="*/ 4314641 w 12192000"/>
-                <a:gd name="connsiteY36" fmla="*/ 196159 h 757168"/>
-                <a:gd name="connsiteX37" fmla="*/ 4577622 w 12192000"/>
-                <a:gd name="connsiteY37" fmla="*/ 163774 h 757168"/>
-                <a:gd name="connsiteX38" fmla="*/ 4790345 w 12192000"/>
-                <a:gd name="connsiteY38" fmla="*/ 177592 h 757168"/>
-                <a:gd name="connsiteX39" fmla="*/ 4926164 w 12192000"/>
-                <a:gd name="connsiteY39" fmla="*/ 184139 h 757168"/>
-                <a:gd name="connsiteX40" fmla="*/ 5088812 w 12192000"/>
-                <a:gd name="connsiteY40" fmla="*/ 177401 h 757168"/>
-                <a:gd name="connsiteX41" fmla="*/ 5222466 w 12192000"/>
-                <a:gd name="connsiteY41" fmla="*/ 162082 h 757168"/>
-                <a:gd name="connsiteX42" fmla="*/ 5406528 w 12192000"/>
-                <a:gd name="connsiteY42" fmla="*/ 153987 h 757168"/>
-                <a:gd name="connsiteX43" fmla="*/ 5590716 w 12192000"/>
-                <a:gd name="connsiteY43" fmla="*/ 129490 h 757168"/>
-                <a:gd name="connsiteX44" fmla="*/ 5719429 w 12192000"/>
-                <a:gd name="connsiteY44" fmla="*/ 110099 h 757168"/>
-                <a:gd name="connsiteX45" fmla="*/ 5897895 w 12192000"/>
-                <a:gd name="connsiteY45" fmla="*/ 96368 h 757168"/>
-                <a:gd name="connsiteX46" fmla="*/ 6169957 w 12192000"/>
-                <a:gd name="connsiteY46" fmla="*/ 94411 h 757168"/>
-                <a:gd name="connsiteX47" fmla="*/ 6294827 w 12192000"/>
-                <a:gd name="connsiteY47" fmla="*/ 99236 h 757168"/>
-                <a:gd name="connsiteX48" fmla="*/ 6494261 w 12192000"/>
-                <a:gd name="connsiteY48" fmla="*/ 71724 h 757168"/>
-                <a:gd name="connsiteX49" fmla="*/ 6579627 w 12192000"/>
-                <a:gd name="connsiteY49" fmla="*/ 57883 h 757168"/>
-                <a:gd name="connsiteX50" fmla="*/ 6654800 w 12192000"/>
-                <a:gd name="connsiteY50" fmla="*/ 77086 h 757168"/>
-                <a:gd name="connsiteX51" fmla="*/ 6703059 w 12192000"/>
-                <a:gd name="connsiteY51" fmla="*/ 97166 h 757168"/>
-                <a:gd name="connsiteX52" fmla="*/ 6859445 w 12192000"/>
-                <a:gd name="connsiteY52" fmla="*/ 90481 h 757168"/>
-                <a:gd name="connsiteX53" fmla="*/ 7025414 w 12192000"/>
-                <a:gd name="connsiteY53" fmla="*/ 83536 h 757168"/>
-                <a:gd name="connsiteX54" fmla="*/ 7144137 w 12192000"/>
-                <a:gd name="connsiteY54" fmla="*/ 79264 h 757168"/>
-                <a:gd name="connsiteX55" fmla="*/ 7291235 w 12192000"/>
-                <a:gd name="connsiteY55" fmla="*/ 95367 h 757168"/>
-                <a:gd name="connsiteX56" fmla="*/ 7407395 w 12192000"/>
-                <a:gd name="connsiteY56" fmla="*/ 104888 h 757168"/>
-                <a:gd name="connsiteX57" fmla="*/ 7500837 w 12192000"/>
-                <a:gd name="connsiteY57" fmla="*/ 119515 h 757168"/>
-                <a:gd name="connsiteX58" fmla="*/ 7533567 w 12192000"/>
-                <a:gd name="connsiteY58" fmla="*/ 126955 h 757168"/>
-                <a:gd name="connsiteX59" fmla="*/ 7792910 w 12192000"/>
-                <a:gd name="connsiteY59" fmla="*/ 185188 h 757168"/>
-                <a:gd name="connsiteX60" fmla="*/ 8070699 w 12192000"/>
-                <a:gd name="connsiteY60" fmla="*/ 235423 h 757168"/>
-                <a:gd name="connsiteX61" fmla="*/ 8253177 w 12192000"/>
-                <a:gd name="connsiteY61" fmla="*/ 222473 h 757168"/>
-                <a:gd name="connsiteX62" fmla="*/ 8320683 w 12192000"/>
-                <a:gd name="connsiteY62" fmla="*/ 226393 h 757168"/>
-                <a:gd name="connsiteX63" fmla="*/ 8631438 w 12192000"/>
-                <a:gd name="connsiteY63" fmla="*/ 237528 h 757168"/>
-                <a:gd name="connsiteX64" fmla="*/ 8686410 w 12192000"/>
-                <a:gd name="connsiteY64" fmla="*/ 234877 h 757168"/>
-                <a:gd name="connsiteX65" fmla="*/ 8980658 w 12192000"/>
-                <a:gd name="connsiteY65" fmla="*/ 273001 h 757168"/>
-                <a:gd name="connsiteX66" fmla="*/ 9087625 w 12192000"/>
-                <a:gd name="connsiteY66" fmla="*/ 282423 h 757168"/>
-                <a:gd name="connsiteX67" fmla="*/ 9186017 w 12192000"/>
-                <a:gd name="connsiteY67" fmla="*/ 293875 h 757168"/>
-                <a:gd name="connsiteX68" fmla="*/ 9323931 w 12192000"/>
-                <a:gd name="connsiteY68" fmla="*/ 302628 h 757168"/>
-                <a:gd name="connsiteX69" fmla="*/ 9467213 w 12192000"/>
-                <a:gd name="connsiteY69" fmla="*/ 307275 h 757168"/>
-                <a:gd name="connsiteX70" fmla="*/ 9626826 w 12192000"/>
-                <a:gd name="connsiteY70" fmla="*/ 316213 h 757168"/>
-                <a:gd name="connsiteX71" fmla="*/ 9689696 w 12192000"/>
-                <a:gd name="connsiteY71" fmla="*/ 324467 h 757168"/>
-                <a:gd name="connsiteX72" fmla="*/ 9860526 w 12192000"/>
-                <a:gd name="connsiteY72" fmla="*/ 329986 h 757168"/>
-                <a:gd name="connsiteX73" fmla="*/ 9949775 w 12192000"/>
-                <a:gd name="connsiteY73" fmla="*/ 340386 h 757168"/>
-                <a:gd name="connsiteX74" fmla="*/ 10097252 w 12192000"/>
-                <a:gd name="connsiteY74" fmla="*/ 349262 h 757168"/>
-                <a:gd name="connsiteX75" fmla="*/ 10145261 w 12192000"/>
-                <a:gd name="connsiteY75" fmla="*/ 353113 h 757168"/>
-                <a:gd name="connsiteX76" fmla="*/ 10188159 w 12192000"/>
-                <a:gd name="connsiteY76" fmla="*/ 356124 h 757168"/>
-                <a:gd name="connsiteX77" fmla="*/ 10336144 w 12192000"/>
-                <a:gd name="connsiteY77" fmla="*/ 348235 h 757168"/>
-                <a:gd name="connsiteX78" fmla="*/ 10466847 w 12192000"/>
-                <a:gd name="connsiteY78" fmla="*/ 354131 h 757168"/>
-                <a:gd name="connsiteX79" fmla="*/ 10696514 w 12192000"/>
-                <a:gd name="connsiteY79" fmla="*/ 353575 h 757168"/>
-                <a:gd name="connsiteX80" fmla="*/ 10746932 w 12192000"/>
-                <a:gd name="connsiteY80" fmla="*/ 360606 h 757168"/>
-                <a:gd name="connsiteX81" fmla="*/ 10905388 w 12192000"/>
-                <a:gd name="connsiteY81" fmla="*/ 370627 h 757168"/>
-                <a:gd name="connsiteX82" fmla="*/ 10995602 w 12192000"/>
-                <a:gd name="connsiteY82" fmla="*/ 376691 h 757168"/>
-                <a:gd name="connsiteX83" fmla="*/ 11107647 w 12192000"/>
-                <a:gd name="connsiteY83" fmla="*/ 373405 h 757168"/>
-                <a:gd name="connsiteX84" fmla="*/ 11302440 w 12192000"/>
-                <a:gd name="connsiteY84" fmla="*/ 364156 h 757168"/>
-                <a:gd name="connsiteX85" fmla="*/ 11353613 w 12192000"/>
-                <a:gd name="connsiteY85" fmla="*/ 363785 h 757168"/>
-                <a:gd name="connsiteX86" fmla="*/ 11447323 w 12192000"/>
-                <a:gd name="connsiteY86" fmla="*/ 359346 h 757168"/>
-                <a:gd name="connsiteX87" fmla="*/ 11464292 w 12192000"/>
-                <a:gd name="connsiteY87" fmla="*/ 358519 h 757168"/>
-                <a:gd name="connsiteX88" fmla="*/ 11607560 w 12192000"/>
-                <a:gd name="connsiteY88" fmla="*/ 342370 h 757168"/>
-                <a:gd name="connsiteX89" fmla="*/ 11681426 w 12192000"/>
-                <a:gd name="connsiteY89" fmla="*/ 344335 h 757168"/>
-                <a:gd name="connsiteX90" fmla="*/ 11893565 w 12192000"/>
-                <a:gd name="connsiteY90" fmla="*/ 355261 h 757168"/>
-                <a:gd name="connsiteX91" fmla="*/ 11983290 w 12192000"/>
-                <a:gd name="connsiteY91" fmla="*/ 363588 h 757168"/>
-                <a:gd name="connsiteX92" fmla="*/ 12192000 w 12192000"/>
-                <a:gd name="connsiteY92" fmla="*/ 388018 h 757168"/>
-                <a:gd name="connsiteX93" fmla="*/ 12192000 w 12192000"/>
-                <a:gd name="connsiteY93" fmla="*/ 577115 h 757168"/>
-                <a:gd name="connsiteX94" fmla="*/ 12157329 w 12192000"/>
-                <a:gd name="connsiteY94" fmla="*/ 588862 h 757168"/>
-                <a:gd name="connsiteX95" fmla="*/ 12066948 w 12192000"/>
-                <a:gd name="connsiteY95" fmla="*/ 586034 h 757168"/>
-                <a:gd name="connsiteX96" fmla="*/ 11911344 w 12192000"/>
-                <a:gd name="connsiteY96" fmla="*/ 521599 h 757168"/>
-                <a:gd name="connsiteX97" fmla="*/ 11847823 w 12192000"/>
-                <a:gd name="connsiteY97" fmla="*/ 511785 h 757168"/>
-                <a:gd name="connsiteX98" fmla="*/ 11737547 w 12192000"/>
-                <a:gd name="connsiteY98" fmla="*/ 502380 h 757168"/>
-                <a:gd name="connsiteX99" fmla="*/ 11636052 w 12192000"/>
-                <a:gd name="connsiteY99" fmla="*/ 514993 h 757168"/>
-                <a:gd name="connsiteX100" fmla="*/ 11394706 w 12192000"/>
-                <a:gd name="connsiteY100" fmla="*/ 590867 h 757168"/>
-                <a:gd name="connsiteX101" fmla="*/ 11354978 w 12192000"/>
-                <a:gd name="connsiteY101" fmla="*/ 597561 h 757168"/>
-                <a:gd name="connsiteX102" fmla="*/ 11285306 w 12192000"/>
-                <a:gd name="connsiteY102" fmla="*/ 599825 h 757168"/>
-                <a:gd name="connsiteX103" fmla="*/ 11008528 w 12192000"/>
-                <a:gd name="connsiteY103" fmla="*/ 656670 h 757168"/>
-                <a:gd name="connsiteX104" fmla="*/ 10948735 w 12192000"/>
-                <a:gd name="connsiteY104" fmla="*/ 652964 h 757168"/>
-                <a:gd name="connsiteX105" fmla="*/ 10850698 w 12192000"/>
-                <a:gd name="connsiteY105" fmla="*/ 641721 h 757168"/>
-                <a:gd name="connsiteX106" fmla="*/ 10744026 w 12192000"/>
-                <a:gd name="connsiteY106" fmla="*/ 647769 h 757168"/>
-                <a:gd name="connsiteX107" fmla="*/ 10666160 w 12192000"/>
-                <a:gd name="connsiteY107" fmla="*/ 651891 h 757168"/>
-                <a:gd name="connsiteX108" fmla="*/ 10450521 w 12192000"/>
-                <a:gd name="connsiteY108" fmla="*/ 616552 h 757168"/>
-                <a:gd name="connsiteX109" fmla="*/ 10271192 w 12192000"/>
-                <a:gd name="connsiteY109" fmla="*/ 583498 h 757168"/>
-                <a:gd name="connsiteX110" fmla="*/ 10246067 w 12192000"/>
-                <a:gd name="connsiteY110" fmla="*/ 585423 h 757168"/>
-                <a:gd name="connsiteX111" fmla="*/ 10005027 w 12192000"/>
-                <a:gd name="connsiteY111" fmla="*/ 592252 h 757168"/>
-                <a:gd name="connsiteX112" fmla="*/ 9898681 w 12192000"/>
-                <a:gd name="connsiteY112" fmla="*/ 613195 h 757168"/>
-                <a:gd name="connsiteX113" fmla="*/ 9753225 w 12192000"/>
-                <a:gd name="connsiteY113" fmla="*/ 629038 h 757168"/>
-                <a:gd name="connsiteX114" fmla="*/ 9591376 w 12192000"/>
-                <a:gd name="connsiteY114" fmla="*/ 648601 h 757168"/>
-                <a:gd name="connsiteX115" fmla="*/ 9472860 w 12192000"/>
-                <a:gd name="connsiteY115" fmla="*/ 655936 h 757168"/>
-                <a:gd name="connsiteX116" fmla="*/ 9299788 w 12192000"/>
-                <a:gd name="connsiteY116" fmla="*/ 636945 h 757168"/>
-                <a:gd name="connsiteX117" fmla="*/ 9264605 w 12192000"/>
-                <a:gd name="connsiteY117" fmla="*/ 627087 h 757168"/>
-                <a:gd name="connsiteX118" fmla="*/ 8926435 w 12192000"/>
-                <a:gd name="connsiteY118" fmla="*/ 549269 h 757168"/>
-                <a:gd name="connsiteX119" fmla="*/ 8698934 w 12192000"/>
-                <a:gd name="connsiteY119" fmla="*/ 536583 h 757168"/>
-                <a:gd name="connsiteX120" fmla="*/ 8622862 w 12192000"/>
-                <a:gd name="connsiteY120" fmla="*/ 541563 h 757168"/>
-                <a:gd name="connsiteX121" fmla="*/ 8482784 w 12192000"/>
-                <a:gd name="connsiteY121" fmla="*/ 574094 h 757168"/>
-                <a:gd name="connsiteX122" fmla="*/ 8421565 w 12192000"/>
-                <a:gd name="connsiteY122" fmla="*/ 576610 h 757168"/>
-                <a:gd name="connsiteX123" fmla="*/ 8313469 w 12192000"/>
-                <a:gd name="connsiteY123" fmla="*/ 574762 h 757168"/>
-                <a:gd name="connsiteX124" fmla="*/ 8079520 w 12192000"/>
-                <a:gd name="connsiteY124" fmla="*/ 558685 h 757168"/>
-                <a:gd name="connsiteX125" fmla="*/ 7773327 w 12192000"/>
-                <a:gd name="connsiteY125" fmla="*/ 558854 h 757168"/>
-                <a:gd name="connsiteX126" fmla="*/ 7652477 w 12192000"/>
-                <a:gd name="connsiteY126" fmla="*/ 547561 h 757168"/>
-                <a:gd name="connsiteX127" fmla="*/ 7522274 w 12192000"/>
-                <a:gd name="connsiteY127" fmla="*/ 532150 h 757168"/>
-                <a:gd name="connsiteX128" fmla="*/ 7484080 w 12192000"/>
-                <a:gd name="connsiteY128" fmla="*/ 530532 h 757168"/>
-                <a:gd name="connsiteX129" fmla="*/ 7282277 w 12192000"/>
-                <a:gd name="connsiteY129" fmla="*/ 540177 h 757168"/>
-                <a:gd name="connsiteX130" fmla="*/ 7235690 w 12192000"/>
-                <a:gd name="connsiteY130" fmla="*/ 551282 h 757168"/>
-                <a:gd name="connsiteX131" fmla="*/ 7116339 w 12192000"/>
-                <a:gd name="connsiteY131" fmla="*/ 539494 h 757168"/>
-                <a:gd name="connsiteX132" fmla="*/ 7011067 w 12192000"/>
-                <a:gd name="connsiteY132" fmla="*/ 511848 h 757168"/>
-                <a:gd name="connsiteX133" fmla="*/ 6403234 w 12192000"/>
-                <a:gd name="connsiteY133" fmla="*/ 432296 h 757168"/>
-                <a:gd name="connsiteX134" fmla="*/ 6036273 w 12192000"/>
-                <a:gd name="connsiteY134" fmla="*/ 412301 h 757168"/>
-                <a:gd name="connsiteX135" fmla="*/ 5780467 w 12192000"/>
-                <a:gd name="connsiteY135" fmla="*/ 377910 h 757168"/>
-                <a:gd name="connsiteX136" fmla="*/ 5739051 w 12192000"/>
-                <a:gd name="connsiteY136" fmla="*/ 353609 h 757168"/>
-                <a:gd name="connsiteX137" fmla="*/ 5583566 w 12192000"/>
-                <a:gd name="connsiteY137" fmla="*/ 321995 h 757168"/>
-                <a:gd name="connsiteX138" fmla="*/ 5432030 w 12192000"/>
-                <a:gd name="connsiteY138" fmla="*/ 362512 h 757168"/>
-                <a:gd name="connsiteX139" fmla="*/ 5241398 w 12192000"/>
-                <a:gd name="connsiteY139" fmla="*/ 425781 h 757168"/>
-                <a:gd name="connsiteX140" fmla="*/ 5139710 w 12192000"/>
-                <a:gd name="connsiteY140" fmla="*/ 421022 h 757168"/>
-                <a:gd name="connsiteX141" fmla="*/ 4929402 w 12192000"/>
-                <a:gd name="connsiteY141" fmla="*/ 424310 h 757168"/>
-                <a:gd name="connsiteX142" fmla="*/ 4782793 w 12192000"/>
-                <a:gd name="connsiteY142" fmla="*/ 441046 h 757168"/>
-                <a:gd name="connsiteX143" fmla="*/ 4577594 w 12192000"/>
-                <a:gd name="connsiteY143" fmla="*/ 459290 h 757168"/>
-                <a:gd name="connsiteX144" fmla="*/ 4500826 w 12192000"/>
-                <a:gd name="connsiteY144" fmla="*/ 470529 h 757168"/>
-                <a:gd name="connsiteX145" fmla="*/ 4317973 w 12192000"/>
-                <a:gd name="connsiteY145" fmla="*/ 483649 h 757168"/>
-                <a:gd name="connsiteX146" fmla="*/ 4166722 w 12192000"/>
-                <a:gd name="connsiteY146" fmla="*/ 490602 h 757168"/>
-                <a:gd name="connsiteX147" fmla="*/ 4042814 w 12192000"/>
-                <a:gd name="connsiteY147" fmla="*/ 530660 h 757168"/>
-                <a:gd name="connsiteX148" fmla="*/ 4002653 w 12192000"/>
-                <a:gd name="connsiteY148" fmla="*/ 552594 h 757168"/>
-                <a:gd name="connsiteX149" fmla="*/ 3969549 w 12192000"/>
-                <a:gd name="connsiteY149" fmla="*/ 566312 h 757168"/>
-                <a:gd name="connsiteX150" fmla="*/ 3821685 w 12192000"/>
-                <a:gd name="connsiteY150" fmla="*/ 649183 h 757168"/>
-                <a:gd name="connsiteX151" fmla="*/ 3805138 w 12192000"/>
-                <a:gd name="connsiteY151" fmla="*/ 655947 h 757168"/>
-                <a:gd name="connsiteX152" fmla="*/ 3609177 w 12192000"/>
-                <a:gd name="connsiteY152" fmla="*/ 687459 h 757168"/>
-                <a:gd name="connsiteX153" fmla="*/ 3539727 w 12192000"/>
-                <a:gd name="connsiteY153" fmla="*/ 706521 h 757168"/>
-                <a:gd name="connsiteX154" fmla="*/ 3396572 w 12192000"/>
-                <a:gd name="connsiteY154" fmla="*/ 755681 h 757168"/>
-                <a:gd name="connsiteX155" fmla="*/ 3341054 w 12192000"/>
-                <a:gd name="connsiteY155" fmla="*/ 754679 h 757168"/>
-                <a:gd name="connsiteX156" fmla="*/ 3138775 w 12192000"/>
-                <a:gd name="connsiteY156" fmla="*/ 710120 h 757168"/>
-                <a:gd name="connsiteX157" fmla="*/ 3037283 w 12192000"/>
-                <a:gd name="connsiteY157" fmla="*/ 666453 h 757168"/>
-                <a:gd name="connsiteX158" fmla="*/ 3002117 w 12192000"/>
-                <a:gd name="connsiteY158" fmla="*/ 649347 h 757168"/>
-                <a:gd name="connsiteX159" fmla="*/ 2747294 w 12192000"/>
-                <a:gd name="connsiteY159" fmla="*/ 652400 h 757168"/>
-                <a:gd name="connsiteX160" fmla="*/ 2676273 w 12192000"/>
-                <a:gd name="connsiteY160" fmla="*/ 652304 h 757168"/>
-                <a:gd name="connsiteX161" fmla="*/ 2432360 w 12192000"/>
-                <a:gd name="connsiteY161" fmla="*/ 657836 h 757168"/>
-                <a:gd name="connsiteX162" fmla="*/ 2382311 w 12192000"/>
-                <a:gd name="connsiteY162" fmla="*/ 650824 h 757168"/>
-                <a:gd name="connsiteX163" fmla="*/ 2055134 w 12192000"/>
-                <a:gd name="connsiteY163" fmla="*/ 630053 h 757168"/>
-                <a:gd name="connsiteX164" fmla="*/ 2031829 w 12192000"/>
-                <a:gd name="connsiteY164" fmla="*/ 639324 h 757168"/>
-                <a:gd name="connsiteX165" fmla="*/ 1912764 w 12192000"/>
-                <a:gd name="connsiteY165" fmla="*/ 664183 h 757168"/>
-                <a:gd name="connsiteX166" fmla="*/ 1755637 w 12192000"/>
-                <a:gd name="connsiteY166" fmla="*/ 663960 h 757168"/>
-                <a:gd name="connsiteX167" fmla="*/ 1727159 w 12192000"/>
-                <a:gd name="connsiteY167" fmla="*/ 659605 h 757168"/>
-                <a:gd name="connsiteX168" fmla="*/ 1622470 w 12192000"/>
-                <a:gd name="connsiteY168" fmla="*/ 634850 h 757168"/>
-                <a:gd name="connsiteX169" fmla="*/ 1385955 w 12192000"/>
-                <a:gd name="connsiteY169" fmla="*/ 604522 h 757168"/>
-                <a:gd name="connsiteX170" fmla="*/ 1340055 w 12192000"/>
-                <a:gd name="connsiteY170" fmla="*/ 595629 h 757168"/>
-                <a:gd name="connsiteX171" fmla="*/ 1257271 w 12192000"/>
-                <a:gd name="connsiteY171" fmla="*/ 581180 h 757168"/>
-                <a:gd name="connsiteX172" fmla="*/ 1031914 w 12192000"/>
-                <a:gd name="connsiteY172" fmla="*/ 562692 h 757168"/>
-                <a:gd name="connsiteX173" fmla="*/ 922031 w 12192000"/>
-                <a:gd name="connsiteY173" fmla="*/ 566853 h 757168"/>
-                <a:gd name="connsiteX174" fmla="*/ 873250 w 12192000"/>
-                <a:gd name="connsiteY174" fmla="*/ 563724 h 757168"/>
-                <a:gd name="connsiteX175" fmla="*/ 711627 w 12192000"/>
-                <a:gd name="connsiteY175" fmla="*/ 529880 h 757168"/>
-                <a:gd name="connsiteX176" fmla="*/ 311112 w 12192000"/>
-                <a:gd name="connsiteY176" fmla="*/ 525106 h 757168"/>
-                <a:gd name="connsiteX177" fmla="*/ 184145 w 12192000"/>
-                <a:gd name="connsiteY177" fmla="*/ 532188 h 757168"/>
-                <a:gd name="connsiteX178" fmla="*/ 116886 w 12192000"/>
-                <a:gd name="connsiteY178" fmla="*/ 530572 h 757168"/>
-                <a:gd name="connsiteX179" fmla="*/ 23941 w 12192000"/>
-                <a:gd name="connsiteY179" fmla="*/ 506433 h 757168"/>
-                <a:gd name="connsiteX180" fmla="*/ 0 w 12192000"/>
-                <a:gd name="connsiteY180" fmla="*/ 502149 h 757168"/>
-              </a:gdLst>
-              <a:ahLst/>
-              <a:cxnLst>
-                <a:cxn ang="0">
-                  <a:pos x="connsiteX0" y="connsiteY0"/>
-                </a:cxn>
-                <a:cxn ang="0">
-                  <a:pos x="connsiteX1" y="connsiteY1"/>
-                </a:cxn>
-                <a:cxn ang="0">
-                  <a:pos x="connsiteX2" y="connsiteY2"/>
-                </a:cxn>
-                <a:cxn ang="0">
-                  <a:pos x="connsiteX3" y="connsiteY3"/>
-                </a:cxn>
-                <a:cxn ang="0">
-                  <a:pos x="connsiteX4" y="connsiteY4"/>
-                </a:cxn>
-                <a:cxn ang="0">
-                  <a:pos x="connsiteX5" y="connsiteY5"/>
-                </a:cxn>
-                <a:cxn ang="0">
-                  <a:pos x="connsiteX6" y="connsiteY6"/>
-                </a:cxn>
-                <a:cxn ang="0">
-                  <a:pos x="connsiteX7" y="connsiteY7"/>
-                </a:cxn>
-                <a:cxn ang="0">
-                  <a:pos x="connsiteX8" y="connsiteY8"/>
-                </a:cxn>
-                <a:cxn ang="0">
-                  <a:pos x="connsiteX9" y="connsiteY9"/>
-                </a:cxn>
-                <a:cxn ang="0">
-                  <a:pos x="connsiteX10" y="connsiteY10"/>
-                </a:cxn>
-                <a:cxn ang="0">
-                  <a:pos x="connsiteX11" y="connsiteY11"/>
-                </a:cxn>
-                <a:cxn ang="0">
-                  <a:pos x="connsiteX12" y="connsiteY12"/>
-                </a:cxn>
-                <a:cxn ang="0">
-                  <a:pos x="connsiteX13" y="connsiteY13"/>
-                </a:cxn>
-                <a:cxn ang="0">
-                  <a:pos x="connsiteX14" y="connsiteY14"/>
-                </a:cxn>
-                <a:cxn ang="0">
-                  <a:pos x="connsiteX15" y="connsiteY15"/>
-                </a:cxn>
-                <a:cxn ang="0">
-                  <a:pos x="connsiteX16" y="connsiteY16"/>
-                </a:cxn>
-                <a:cxn ang="0">
-                  <a:pos x="connsiteX17" y="connsiteY17"/>
-                </a:cxn>
-                <a:cxn ang="0">
-                  <a:pos x="connsiteX18" y="connsiteY18"/>
-                </a:cxn>
-                <a:cxn ang="0">
-                  <a:pos x="connsiteX19" y="connsiteY19"/>
-                </a:cxn>
-                <a:cxn ang="0">
-                  <a:pos x="connsiteX20" y="connsiteY20"/>
-                </a:cxn>
-                <a:cxn ang="0">
-                  <a:pos x="connsiteX21" y="connsiteY21"/>
-                </a:cxn>
-                <a:cxn ang="0">
-                  <a:pos x="connsiteX22" y="connsiteY22"/>
-                </a:cxn>
-                <a:cxn ang="0">
-                  <a:pos x="connsiteX23" y="connsiteY23"/>
-                </a:cxn>
-                <a:cxn ang="0">
-                  <a:pos x="connsiteX24" y="connsiteY24"/>
-                </a:cxn>
-                <a:cxn ang="0">
-                  <a:pos x="connsiteX25" y="connsiteY25"/>
-                </a:cxn>
-                <a:cxn ang="0">
-                  <a:pos x="connsiteX26" y="connsiteY26"/>
-                </a:cxn>
-                <a:cxn ang="0">
-                  <a:pos x="connsiteX27" y="connsiteY27"/>
-                </a:cxn>
-                <a:cxn ang="0">
-                  <a:pos x="connsiteX28" y="connsiteY28"/>
-                </a:cxn>
-                <a:cxn ang="0">
-                  <a:pos x="connsiteX29" y="connsiteY29"/>
-                </a:cxn>
-                <a:cxn ang="0">
-                  <a:pos x="connsiteX30" y="connsiteY30"/>
-                </a:cxn>
-                <a:cxn ang="0">
-                  <a:pos x="connsiteX31" y="connsiteY31"/>
-                </a:cxn>
-                <a:cxn ang="0">
-                  <a:pos x="connsiteX32" y="connsiteY32"/>
-                </a:cxn>
-                <a:cxn ang="0">
-                  <a:pos x="connsiteX33" y="connsiteY33"/>
-                </a:cxn>
-                <a:cxn ang="0">
-                  <a:pos x="connsiteX34" y="connsiteY34"/>
-                </a:cxn>
-                <a:cxn ang="0">
-                  <a:pos x="connsiteX35" y="connsiteY35"/>
-                </a:cxn>
-                <a:cxn ang="0">
-                  <a:pos x="connsiteX36" y="connsiteY36"/>
-                </a:cxn>
-                <a:cxn ang="0">
-                  <a:pos x="connsiteX37" y="connsiteY37"/>
-                </a:cxn>
-                <a:cxn ang="0">
-                  <a:pos x="connsiteX38" y="connsiteY38"/>
-                </a:cxn>
-                <a:cxn ang="0">
-                  <a:pos x="connsiteX39" y="connsiteY39"/>
-                </a:cxn>
-                <a:cxn ang="0">
-                  <a:pos x="connsiteX40" y="connsiteY40"/>
-                </a:cxn>
-                <a:cxn ang="0">
-                  <a:pos x="connsiteX41" y="connsiteY41"/>
-                </a:cxn>
-                <a:cxn ang="0">
-                  <a:pos x="connsiteX42" y="connsiteY42"/>
-                </a:cxn>
-                <a:cxn ang="0">
-                  <a:pos x="connsiteX43" y="connsiteY43"/>
-                </a:cxn>
-                <a:cxn ang="0">
-                  <a:pos x="connsiteX44" y="connsiteY44"/>
-                </a:cxn>
-                <a:cxn ang="0">
-                  <a:pos x="connsiteX45" y="connsiteY45"/>
-                </a:cxn>
-                <a:cxn ang="0">
-                  <a:pos x="connsiteX46" y="connsiteY46"/>
-                </a:cxn>
-                <a:cxn ang="0">
-                  <a:pos x="connsiteX47" y="connsiteY47"/>
-                </a:cxn>
-                <a:cxn ang="0">
-                  <a:pos x="connsiteX48" y="connsiteY48"/>
-                </a:cxn>
-                <a:cxn ang="0">
-                  <a:pos x="connsiteX49" y="connsiteY49"/>
-                </a:cxn>
-                <a:cxn ang="0">
-                  <a:pos x="connsiteX50" y="connsiteY50"/>
-                </a:cxn>
-                <a:cxn ang="0">
-                  <a:pos x="connsiteX51" y="connsiteY51"/>
-                </a:cxn>
-                <a:cxn ang="0">
-                  <a:pos x="connsiteX52" y="connsiteY52"/>
-                </a:cxn>
-                <a:cxn ang="0">
-                  <a:pos x="connsiteX53" y="connsiteY53"/>
-                </a:cxn>
-                <a:cxn ang="0">
-                  <a:pos x="connsiteX54" y="connsiteY54"/>
-                </a:cxn>
-                <a:cxn ang="0">
-                  <a:pos x="connsiteX55" y="connsiteY55"/>
-                </a:cxn>
-                <a:cxn ang="0">
-                  <a:pos x="connsiteX56" y="connsiteY56"/>
-                </a:cxn>
-                <a:cxn ang="0">
-                  <a:pos x="connsiteX57" y="connsiteY57"/>
-                </a:cxn>
-                <a:cxn ang="0">
-                  <a:pos x="connsiteX58" y="connsiteY58"/>
-                </a:cxn>
-                <a:cxn ang="0">
-                  <a:pos x="connsiteX59" y="connsiteY59"/>
-                </a:cxn>
-                <a:cxn ang="0">
-                  <a:pos x="connsiteX60" y="connsiteY60"/>
-                </a:cxn>
-                <a:cxn ang="0">
-                  <a:pos x="connsiteX61" y="connsiteY61"/>
-                </a:cxn>
-                <a:cxn ang="0">
-                  <a:pos x="connsiteX62" y="connsiteY62"/>
-                </a:cxn>
-                <a:cxn ang="0">
-                  <a:pos x="connsiteX63" y="connsiteY63"/>
-                </a:cxn>
-                <a:cxn ang="0">
-                  <a:pos x="connsiteX64" y="connsiteY64"/>
-                </a:cxn>
-                <a:cxn ang="0">
-                  <a:pos x="connsiteX65" y="connsiteY65"/>
-                </a:cxn>
-                <a:cxn ang="0">
-                  <a:pos x="connsiteX66" y="connsiteY66"/>
-                </a:cxn>
-                <a:cxn ang="0">
-                  <a:pos x="connsiteX67" y="connsiteY67"/>
-                </a:cxn>
-                <a:cxn ang="0">
-                  <a:pos x="connsiteX68" y="connsiteY68"/>
-                </a:cxn>
-                <a:cxn ang="0">
-                  <a:pos x="connsiteX69" y="connsiteY69"/>
-                </a:cxn>
-                <a:cxn ang="0">
-                  <a:pos x="connsiteX70" y="connsiteY70"/>
-                </a:cxn>
-                <a:cxn ang="0">
-                  <a:pos x="connsiteX71" y="connsiteY71"/>
-                </a:cxn>
-                <a:cxn ang="0">
-                  <a:pos x="connsiteX72" y="connsiteY72"/>
-                </a:cxn>
-                <a:cxn ang="0">
-                  <a:pos x="connsiteX73" y="connsiteY73"/>
-                </a:cxn>
-                <a:cxn ang="0">
-                  <a:pos x="connsiteX74" y="connsiteY74"/>
-                </a:cxn>
-                <a:cxn ang="0">
-                  <a:pos x="connsiteX75" y="connsiteY75"/>
-                </a:cxn>
-                <a:cxn ang="0">
-                  <a:pos x="connsiteX76" y="connsiteY76"/>
-                </a:cxn>
-                <a:cxn ang="0">
-                  <a:pos x="connsiteX77" y="connsiteY77"/>
-                </a:cxn>
-                <a:cxn ang="0">
-                  <a:pos x="connsiteX78" y="connsiteY78"/>
-                </a:cxn>
-                <a:cxn ang="0">
-                  <a:pos x="connsiteX79" y="connsiteY79"/>
-                </a:cxn>
-                <a:cxn ang="0">
-                  <a:pos x="connsiteX80" y="connsiteY80"/>
-                </a:cxn>
-                <a:cxn ang="0">
-                  <a:pos x="connsiteX81" y="connsiteY81"/>
-                </a:cxn>
-                <a:cxn ang="0">
-                  <a:pos x="connsiteX82" y="connsiteY82"/>
-                </a:cxn>
-                <a:cxn ang="0">
-                  <a:pos x="connsiteX83" y="connsiteY83"/>
-                </a:cxn>
-                <a:cxn ang="0">
-                  <a:pos x="connsiteX84" y="connsiteY84"/>
-                </a:cxn>
-                <a:cxn ang="0">
-                  <a:pos x="connsiteX85" y="connsiteY85"/>
-                </a:cxn>
-                <a:cxn ang="0">
-                  <a:pos x="connsiteX86" y="connsiteY86"/>
-                </a:cxn>
-                <a:cxn ang="0">
-                  <a:pos x="connsiteX87" y="connsiteY87"/>
-                </a:cxn>
-                <a:cxn ang="0">
-                  <a:pos x="connsiteX88" y="connsiteY88"/>
-                </a:cxn>
-                <a:cxn ang="0">
-                  <a:pos x="connsiteX89" y="connsiteY89"/>
-                </a:cxn>
-                <a:cxn ang="0">
-                  <a:pos x="connsiteX90" y="connsiteY90"/>
-                </a:cxn>
-                <a:cxn ang="0">
-                  <a:pos x="connsiteX91" y="connsiteY91"/>
-                </a:cxn>
-                <a:cxn ang="0">
-                  <a:pos x="connsiteX92" y="connsiteY92"/>
-                </a:cxn>
-                <a:cxn ang="0">
-                  <a:pos x="connsiteX93" y="connsiteY93"/>
-                </a:cxn>
-                <a:cxn ang="0">
-                  <a:pos x="connsiteX94" y="connsiteY94"/>
-                </a:cxn>
-                <a:cxn ang="0">
-                  <a:pos x="connsiteX95" y="connsiteY95"/>
-                </a:cxn>
-                <a:cxn ang="0">
-                  <a:pos x="connsiteX96" y="connsiteY96"/>
-                </a:cxn>
-                <a:cxn ang="0">
-                  <a:pos x="connsiteX97" y="connsiteY97"/>
-                </a:cxn>
-                <a:cxn ang="0">
-                  <a:pos x="connsiteX98" y="connsiteY98"/>
-                </a:cxn>
-                <a:cxn ang="0">
-                  <a:pos x="connsiteX99" y="connsiteY99"/>
-                </a:cxn>
-                <a:cxn ang="0">
-                  <a:pos x="connsiteX100" y="connsiteY100"/>
-                </a:cxn>
-                <a:cxn ang="0">
-                  <a:pos x="connsiteX101" y="connsiteY101"/>
-                </a:cxn>
-                <a:cxn ang="0">
-                  <a:pos x="connsiteX102" y="connsiteY102"/>
-                </a:cxn>
-                <a:cxn ang="0">
-                  <a:pos x="connsiteX103" y="connsiteY103"/>
-                </a:cxn>
-                <a:cxn ang="0">
-                  <a:pos x="connsiteX104" y="connsiteY104"/>
-                </a:cxn>
-                <a:cxn ang="0">
-                  <a:pos x="connsiteX105" y="connsiteY105"/>
-                </a:cxn>
-                <a:cxn ang="0">
-                  <a:pos x="connsiteX106" y="connsiteY106"/>
-                </a:cxn>
-                <a:cxn ang="0">
-                  <a:pos x="connsiteX107" y="connsiteY107"/>
-                </a:cxn>
-                <a:cxn ang="0">
-                  <a:pos x="connsiteX108" y="connsiteY108"/>
-                </a:cxn>
-                <a:cxn ang="0">
-                  <a:pos x="connsiteX109" y="connsiteY109"/>
-                </a:cxn>
-                <a:cxn ang="0">
-                  <a:pos x="connsiteX110" y="connsiteY110"/>
-                </a:cxn>
-                <a:cxn ang="0">
-                  <a:pos x="connsiteX111" y="connsiteY111"/>
-                </a:cxn>
-                <a:cxn ang="0">
-                  <a:pos x="connsiteX112" y="connsiteY112"/>
-                </a:cxn>
-                <a:cxn ang="0">
-                  <a:pos x="connsiteX113" y="connsiteY113"/>
-                </a:cxn>
-                <a:cxn ang="0">
-                  <a:pos x="connsiteX114" y="connsiteY114"/>
-                </a:cxn>
-                <a:cxn ang="0">
-                  <a:pos x="connsiteX115" y="connsiteY115"/>
-                </a:cxn>
-                <a:cxn ang="0">
-                  <a:pos x="connsiteX116" y="connsiteY116"/>
-                </a:cxn>
-                <a:cxn ang="0">
-                  <a:pos x="connsiteX117" y="connsiteY117"/>
-                </a:cxn>
-                <a:cxn ang="0">
-                  <a:pos x="connsiteX118" y="connsiteY118"/>
-                </a:cxn>
-                <a:cxn ang="0">
-                  <a:pos x="connsiteX119" y="connsiteY119"/>
-                </a:cxn>
-                <a:cxn ang="0">
-                  <a:pos x="connsiteX120" y="connsiteY120"/>
-                </a:cxn>
-                <a:cxn ang="0">
-                  <a:pos x="connsiteX121" y="connsiteY121"/>
-                </a:cxn>
-                <a:cxn ang="0">
-                  <a:pos x="connsiteX122" y="connsiteY122"/>
-                </a:cxn>
-                <a:cxn ang="0">
-                  <a:pos x="connsiteX123" y="connsiteY123"/>
-                </a:cxn>
-                <a:cxn ang="0">
-                  <a:pos x="connsiteX124" y="connsiteY124"/>
-                </a:cxn>
-                <a:cxn ang="0">
-                  <a:pos x="connsiteX125" y="connsiteY125"/>
-                </a:cxn>
-                <a:cxn ang="0">
-                  <a:pos x="connsiteX126" y="connsiteY126"/>
-                </a:cxn>
-                <a:cxn ang="0">
-                  <a:pos x="connsiteX127" y="connsiteY127"/>
-                </a:cxn>
-                <a:cxn ang="0">
-                  <a:pos x="connsiteX128" y="connsiteY128"/>
-                </a:cxn>
-                <a:cxn ang="0">
-                  <a:pos x="connsiteX129" y="connsiteY129"/>
-                </a:cxn>
-                <a:cxn ang="0">
-                  <a:pos x="connsiteX130" y="connsiteY130"/>
-                </a:cxn>
-                <a:cxn ang="0">
-                  <a:pos x="connsiteX131" y="connsiteY131"/>
-                </a:cxn>
-                <a:cxn ang="0">
-                  <a:pos x="connsiteX132" y="connsiteY132"/>
-                </a:cxn>
-                <a:cxn ang="0">
-                  <a:pos x="connsiteX133" y="connsiteY133"/>
-                </a:cxn>
-                <a:cxn ang="0">
-                  <a:pos x="connsiteX134" y="connsiteY134"/>
-                </a:cxn>
-                <a:cxn ang="0">
-                  <a:pos x="connsiteX135" y="connsiteY135"/>
-                </a:cxn>
-                <a:cxn ang="0">
-                  <a:pos x="connsiteX136" y="connsiteY136"/>
-                </a:cxn>
-                <a:cxn ang="0">
-                  <a:pos x="connsiteX137" y="connsiteY137"/>
-                </a:cxn>
-                <a:cxn ang="0">
-                  <a:pos x="connsiteX138" y="connsiteY138"/>
-                </a:cxn>
-                <a:cxn ang="0">
-                  <a:pos x="connsiteX139" y="connsiteY139"/>
-                </a:cxn>
-                <a:cxn ang="0">
-                  <a:pos x="connsiteX140" y="connsiteY140"/>
-                </a:cxn>
-                <a:cxn ang="0">
-                  <a:pos x="connsiteX141" y="connsiteY141"/>
-                </a:cxn>
-                <a:cxn ang="0">
-                  <a:pos x="connsiteX142" y="connsiteY142"/>
-                </a:cxn>
-                <a:cxn ang="0">
-                  <a:pos x="connsiteX143" y="connsiteY143"/>
-                </a:cxn>
-                <a:cxn ang="0">
-                  <a:pos x="connsiteX144" y="connsiteY144"/>
-                </a:cxn>
-                <a:cxn ang="0">
-                  <a:pos x="connsiteX145" y="connsiteY145"/>
-                </a:cxn>
-                <a:cxn ang="0">
-                  <a:pos x="connsiteX146" y="connsiteY146"/>
-                </a:cxn>
-                <a:cxn ang="0">
-                  <a:pos x="connsiteX147" y="connsiteY147"/>
-                </a:cxn>
-                <a:cxn ang="0">
-                  <a:pos x="connsiteX148" y="connsiteY148"/>
-                </a:cxn>
-                <a:cxn ang="0">
-                  <a:pos x="connsiteX149" y="connsiteY149"/>
-                </a:cxn>
-                <a:cxn ang="0">
-                  <a:pos x="connsiteX150" y="connsiteY150"/>
-                </a:cxn>
-                <a:cxn ang="0">
-                  <a:pos x="connsiteX151" y="connsiteY151"/>
-                </a:cxn>
-                <a:cxn ang="0">
-                  <a:pos x="connsiteX152" y="connsiteY152"/>
-                </a:cxn>
-                <a:cxn ang="0">
-                  <a:pos x="connsiteX153" y="connsiteY153"/>
-                </a:cxn>
-                <a:cxn ang="0">
-                  <a:pos x="connsiteX154" y="connsiteY154"/>
-                </a:cxn>
-                <a:cxn ang="0">
-                  <a:pos x="connsiteX155" y="connsiteY155"/>
-                </a:cxn>
-                <a:cxn ang="0">
-                  <a:pos x="connsiteX156" y="connsiteY156"/>
-                </a:cxn>
-                <a:cxn ang="0">
-                  <a:pos x="connsiteX157" y="connsiteY157"/>
-                </a:cxn>
-                <a:cxn ang="0">
-                  <a:pos x="connsiteX158" y="connsiteY158"/>
-                </a:cxn>
-                <a:cxn ang="0">
-                  <a:pos x="connsiteX159" y="connsiteY159"/>
-                </a:cxn>
-                <a:cxn ang="0">
-                  <a:pos x="connsiteX160" y="connsiteY160"/>
-                </a:cxn>
-                <a:cxn ang="0">
-                  <a:pos x="connsiteX161" y="connsiteY161"/>
-                </a:cxn>
-                <a:cxn ang="0">
-                  <a:pos x="connsiteX162" y="connsiteY162"/>
-                </a:cxn>
-                <a:cxn ang="0">
-                  <a:pos x="connsiteX163" y="connsiteY163"/>
-                </a:cxn>
-                <a:cxn ang="0">
-                  <a:pos x="connsiteX164" y="connsiteY164"/>
-                </a:cxn>
-                <a:cxn ang="0">
-                  <a:pos x="connsiteX165" y="connsiteY165"/>
-                </a:cxn>
-                <a:cxn ang="0">
-                  <a:pos x="connsiteX166" y="connsiteY166"/>
-                </a:cxn>
-                <a:cxn ang="0">
-                  <a:pos x="connsiteX167" y="connsiteY167"/>
-                </a:cxn>
-                <a:cxn ang="0">
-                  <a:pos x="connsiteX168" y="connsiteY168"/>
-                </a:cxn>
-                <a:cxn ang="0">
-                  <a:pos x="connsiteX169" y="connsiteY169"/>
-                </a:cxn>
-                <a:cxn ang="0">
-                  <a:pos x="connsiteX170" y="connsiteY170"/>
-                </a:cxn>
-                <a:cxn ang="0">
-                  <a:pos x="connsiteX171" y="connsiteY171"/>
-                </a:cxn>
-                <a:cxn ang="0">
-                  <a:pos x="connsiteX172" y="connsiteY172"/>
-                </a:cxn>
-                <a:cxn ang="0">
-                  <a:pos x="connsiteX173" y="connsiteY173"/>
-                </a:cxn>
-                <a:cxn ang="0">
-                  <a:pos x="connsiteX174" y="connsiteY174"/>
-                </a:cxn>
-                <a:cxn ang="0">
-                  <a:pos x="connsiteX175" y="connsiteY175"/>
-                </a:cxn>
-                <a:cxn ang="0">
-                  <a:pos x="connsiteX176" y="connsiteY176"/>
-                </a:cxn>
-                <a:cxn ang="0">
-                  <a:pos x="connsiteX177" y="connsiteY177"/>
-                </a:cxn>
-                <a:cxn ang="0">
-                  <a:pos x="connsiteX178" y="connsiteY178"/>
-                </a:cxn>
-                <a:cxn ang="0">
-                  <a:pos x="connsiteX179" y="connsiteY179"/>
-                </a:cxn>
-                <a:cxn ang="0">
-                  <a:pos x="connsiteX180" y="connsiteY180"/>
-                </a:cxn>
-              </a:cxnLst>
-              <a:rect l="l" t="t" r="r" b="b"/>
-              <a:pathLst>
-                <a:path w="12192000" h="757168">
-                  <a:moveTo>
-                    <a:pt x="0" y="0"/>
-                  </a:moveTo>
-                  <a:lnTo>
-                    <a:pt x="41653" y="6945"/>
-                  </a:lnTo>
-                  <a:cubicBezTo>
-                    <a:pt x="55151" y="9178"/>
-                    <a:pt x="68996" y="11810"/>
-                    <a:pt x="81317" y="15509"/>
-                  </a:cubicBezTo>
-                  <a:cubicBezTo>
-                    <a:pt x="92911" y="18978"/>
-                    <a:pt x="102562" y="24446"/>
-                    <a:pt x="114150" y="28105"/>
-                  </a:cubicBezTo>
-                  <a:cubicBezTo>
-                    <a:pt x="145644" y="37958"/>
-                    <a:pt x="177914" y="47281"/>
-                    <a:pt x="214865" y="58374"/>
-                  </a:cubicBezTo>
-                  <a:cubicBezTo>
-                    <a:pt x="236680" y="42349"/>
-                    <a:pt x="264438" y="53534"/>
-                    <a:pt x="299237" y="63560"/>
-                  </a:cubicBezTo>
-                  <a:cubicBezTo>
-                    <a:pt x="334763" y="73816"/>
-                    <a:pt x="376093" y="78654"/>
-                    <a:pt x="415570" y="83774"/>
-                  </a:cubicBezTo>
-                  <a:cubicBezTo>
-                    <a:pt x="487949" y="93100"/>
-                    <a:pt x="560804" y="100354"/>
-                    <a:pt x="633210" y="109108"/>
-                  </a:cubicBezTo>
-                  <a:cubicBezTo>
-                    <a:pt x="648566" y="111058"/>
-                    <a:pt x="666073" y="114072"/>
-                    <a:pt x="677567" y="119446"/>
-                  </a:cubicBezTo>
-                  <a:cubicBezTo>
-                    <a:pt x="756262" y="155621"/>
-                    <a:pt x="853422" y="169678"/>
-                    <a:pt x="946429" y="171502"/>
-                  </a:cubicBezTo>
-                  <a:cubicBezTo>
-                    <a:pt x="1019582" y="173044"/>
-                    <a:pt x="1091239" y="175083"/>
-                    <a:pt x="1163367" y="182106"/>
-                  </a:cubicBezTo>
-                  <a:cubicBezTo>
-                    <a:pt x="1168863" y="182586"/>
-                    <a:pt x="1176224" y="182589"/>
-                    <a:pt x="1180337" y="181279"/>
-                  </a:cubicBezTo>
-                  <a:cubicBezTo>
-                    <a:pt x="1205822" y="172503"/>
-                    <a:pt x="1231920" y="173109"/>
-                    <a:pt x="1263939" y="173070"/>
-                  </a:cubicBezTo>
-                  <a:cubicBezTo>
-                    <a:pt x="1309211" y="172961"/>
-                    <a:pt x="1350592" y="176848"/>
-                    <a:pt x="1392213" y="183225"/>
-                  </a:cubicBezTo>
-                  <a:cubicBezTo>
-                    <a:pt x="1422516" y="187866"/>
-                    <a:pt x="1453010" y="195759"/>
-                    <a:pt x="1479752" y="205174"/>
-                  </a:cubicBezTo>
-                  <a:cubicBezTo>
-                    <a:pt x="1516962" y="218381"/>
-                    <a:pt x="1553071" y="224660"/>
-                    <a:pt x="1589813" y="211706"/>
-                  </a:cubicBezTo>
-                  <a:cubicBezTo>
-                    <a:pt x="1629541" y="197953"/>
-                    <a:pt x="1673292" y="205778"/>
-                    <a:pt x="1716264" y="207459"/>
-                  </a:cubicBezTo>
-                  <a:cubicBezTo>
-                    <a:pt x="1734988" y="208248"/>
-                    <a:pt x="1754789" y="209668"/>
-                    <a:pt x="1772900" y="208137"/>
-                  </a:cubicBezTo>
-                  <a:cubicBezTo>
-                    <a:pt x="1825381" y="203828"/>
-                    <a:pt x="1876222" y="195808"/>
-                    <a:pt x="1929319" y="193822"/>
-                  </a:cubicBezTo>
-                  <a:cubicBezTo>
-                    <a:pt x="1958819" y="192698"/>
-                    <a:pt x="1991232" y="199166"/>
-                    <a:pt x="2021514" y="204186"/>
-                  </a:cubicBezTo>
-                  <a:cubicBezTo>
-                    <a:pt x="2052154" y="209417"/>
-                    <a:pt x="2082323" y="216530"/>
-                    <a:pt x="2111753" y="223797"/>
-                  </a:cubicBezTo>
-                  <a:cubicBezTo>
-                    <a:pt x="2131736" y="228659"/>
-                    <a:pt x="2153567" y="233429"/>
-                    <a:pt x="2169356" y="241125"/>
-                  </a:cubicBezTo>
-                  <a:cubicBezTo>
-                    <a:pt x="2205243" y="258649"/>
-                    <a:pt x="2242901" y="263295"/>
-                    <a:pt x="2286638" y="257382"/>
-                  </a:cubicBezTo>
-                  <a:cubicBezTo>
-                    <a:pt x="2293313" y="256396"/>
-                    <a:pt x="2301018" y="256799"/>
-                    <a:pt x="2308368" y="256995"/>
-                  </a:cubicBezTo>
-                  <a:cubicBezTo>
-                    <a:pt x="2426026" y="259155"/>
-                    <a:pt x="2543593" y="262834"/>
-                    <a:pt x="2660621" y="262863"/>
-                  </a:cubicBezTo>
-                  <a:cubicBezTo>
-                    <a:pt x="2708088" y="262871"/>
-                    <a:pt x="2754165" y="254412"/>
-                    <a:pt x="2801134" y="250006"/>
-                  </a:cubicBezTo>
-                  <a:cubicBezTo>
-                    <a:pt x="2810748" y="249174"/>
-                    <a:pt x="2821504" y="247638"/>
-                    <a:pt x="2830994" y="249091"/>
-                  </a:cubicBezTo>
-                  <a:cubicBezTo>
-                    <a:pt x="2934354" y="264045"/>
-                    <a:pt x="3032340" y="255254"/>
-                    <a:pt x="3129084" y="242009"/>
-                  </a:cubicBezTo>
-                  <a:cubicBezTo>
-                    <a:pt x="3139090" y="240625"/>
-                    <a:pt x="3151170" y="241831"/>
-                    <a:pt x="3162162" y="242789"/>
-                  </a:cubicBezTo>
-                  <a:cubicBezTo>
-                    <a:pt x="3192925" y="245736"/>
-                    <a:pt x="3225969" y="254145"/>
-                    <a:pt x="3254072" y="251612"/>
-                  </a:cubicBezTo>
-                  <a:cubicBezTo>
-                    <a:pt x="3328782" y="244461"/>
-                    <a:pt x="3402881" y="234992"/>
-                    <a:pt x="3473491" y="221903"/>
-                  </a:cubicBezTo>
-                  <a:cubicBezTo>
-                    <a:pt x="3545212" y="208683"/>
-                    <a:pt x="3611651" y="197856"/>
-                    <a:pt x="3691860" y="219228"/>
-                  </a:cubicBezTo>
-                  <a:cubicBezTo>
-                    <a:pt x="3725977" y="228268"/>
-                    <a:pt x="3771754" y="225515"/>
-                    <a:pt x="3811494" y="225691"/>
-                  </a:cubicBezTo>
-                  <a:cubicBezTo>
-                    <a:pt x="3840564" y="225687"/>
-                    <a:pt x="3868906" y="218586"/>
-                    <a:pt x="3897533" y="220087"/>
-                  </a:cubicBezTo>
-                  <a:cubicBezTo>
-                    <a:pt x="3973874" y="224087"/>
-                    <a:pt x="4042293" y="217563"/>
-                    <a:pt x="4109430" y="200477"/>
-                  </a:cubicBezTo>
-                  <a:cubicBezTo>
-                    <a:pt x="4135544" y="193834"/>
-                    <a:pt x="4175268" y="201258"/>
-                    <a:pt x="4208772" y="200914"/>
-                  </a:cubicBezTo>
-                  <a:cubicBezTo>
-                    <a:pt x="4244136" y="200288"/>
-                    <a:pt x="4280583" y="199908"/>
-                    <a:pt x="4314641" y="196159"/>
-                  </a:cubicBezTo>
-                  <a:cubicBezTo>
-                    <a:pt x="4402743" y="186278"/>
-                    <a:pt x="4489848" y="174436"/>
-                    <a:pt x="4577622" y="163774"/>
-                  </a:cubicBezTo>
-                  <a:cubicBezTo>
-                    <a:pt x="4649843" y="154967"/>
-                    <a:pt x="4719794" y="168553"/>
-                    <a:pt x="4790345" y="177592"/>
-                  </a:cubicBezTo>
-                  <a:cubicBezTo>
-                    <a:pt x="4834576" y="183345"/>
-                    <a:pt x="4875614" y="193701"/>
-                    <a:pt x="4926164" y="184139"/>
-                  </a:cubicBezTo>
-                  <a:cubicBezTo>
-                    <a:pt x="4974485" y="175032"/>
-                    <a:pt x="5034899" y="180870"/>
-                    <a:pt x="5088812" y="177401"/>
-                  </a:cubicBezTo>
-                  <a:cubicBezTo>
-                    <a:pt x="5134238" y="174439"/>
-                    <a:pt x="5178353" y="168165"/>
-                    <a:pt x="5222466" y="162082"/>
-                  </a:cubicBezTo>
-                  <a:cubicBezTo>
-                    <a:pt x="5282519" y="153783"/>
-                    <a:pt x="5341864" y="144876"/>
-                    <a:pt x="5406528" y="153987"/>
-                  </a:cubicBezTo>
-                  <a:cubicBezTo>
-                    <a:pt x="5479960" y="164323"/>
-                    <a:pt x="5531876" y="142624"/>
-                    <a:pt x="5590716" y="129490"/>
-                  </a:cubicBezTo>
-                  <a:cubicBezTo>
-                    <a:pt x="5631296" y="120553"/>
-                    <a:pt x="5675395" y="114659"/>
-                    <a:pt x="5719429" y="110099"/>
-                  </a:cubicBezTo>
-                  <a:cubicBezTo>
-                    <a:pt x="5778247" y="104215"/>
-                    <a:pt x="5838715" y="102042"/>
-                    <a:pt x="5897895" y="96368"/>
-                  </a:cubicBezTo>
-                  <a:cubicBezTo>
-                    <a:pt x="5987399" y="87895"/>
-                    <a:pt x="6077855" y="82333"/>
-                    <a:pt x="6169957" y="94411"/>
-                  </a:cubicBezTo>
-                  <a:cubicBezTo>
-                    <a:pt x="6212360" y="99875"/>
-                    <a:pt x="6252010" y="101763"/>
-                    <a:pt x="6294827" y="99236"/>
-                  </a:cubicBezTo>
-                  <a:cubicBezTo>
-                    <a:pt x="6364965" y="95091"/>
-                    <a:pt x="6436581" y="97891"/>
-                    <a:pt x="6494261" y="71724"/>
-                  </a:cubicBezTo>
-                  <a:cubicBezTo>
-                    <a:pt x="6514615" y="62488"/>
-                    <a:pt x="6550354" y="61691"/>
-                    <a:pt x="6579627" y="57883"/>
-                  </a:cubicBezTo>
-                  <a:cubicBezTo>
-                    <a:pt x="6613354" y="53353"/>
-                    <a:pt x="6637770" y="57878"/>
-                    <a:pt x="6654800" y="77086"/>
-                  </a:cubicBezTo>
-                  <a:cubicBezTo>
-                    <a:pt x="6662444" y="85688"/>
-                    <a:pt x="6685147" y="94892"/>
-                    <a:pt x="6703059" y="97166"/>
-                  </a:cubicBezTo>
-                  <a:cubicBezTo>
-                    <a:pt x="6756799" y="103989"/>
-                    <a:pt x="6806654" y="100687"/>
-                    <a:pt x="6859445" y="90481"/>
-                  </a:cubicBezTo>
-                  <a:cubicBezTo>
-                    <a:pt x="6908894" y="80861"/>
-                    <a:pt x="6969747" y="85387"/>
-                    <a:pt x="7025414" y="83536"/>
-                  </a:cubicBezTo>
-                  <a:cubicBezTo>
-                    <a:pt x="7064862" y="82168"/>
-                    <a:pt x="7104501" y="77186"/>
-                    <a:pt x="7144137" y="79264"/>
-                  </a:cubicBezTo>
-                  <a:cubicBezTo>
-                    <a:pt x="7193316" y="81841"/>
-                    <a:pt x="7241809" y="90488"/>
-                    <a:pt x="7291235" y="95367"/>
-                  </a:cubicBezTo>
-                  <a:cubicBezTo>
-                    <a:pt x="7329668" y="99288"/>
-                    <a:pt x="7368978" y="100585"/>
-                    <a:pt x="7407395" y="104888"/>
-                  </a:cubicBezTo>
-                  <a:cubicBezTo>
-                    <a:pt x="7438868" y="108256"/>
-                    <a:pt x="7469832" y="114265"/>
-                    <a:pt x="7500837" y="119515"/>
-                  </a:cubicBezTo>
-                  <a:cubicBezTo>
-                    <a:pt x="7512146" y="121444"/>
-                    <a:pt x="7523255" y="127178"/>
-                    <a:pt x="7533567" y="126955"/>
-                  </a:cubicBezTo>
-                  <a:cubicBezTo>
-                    <a:pt x="7636025" y="124121"/>
-                    <a:pt x="7707510" y="164497"/>
-                    <a:pt x="7792910" y="185188"/>
-                  </a:cubicBezTo>
-                  <a:cubicBezTo>
-                    <a:pt x="7882663" y="207063"/>
-                    <a:pt x="7969001" y="237914"/>
-                    <a:pt x="8070699" y="235423"/>
-                  </a:cubicBezTo>
-                  <a:cubicBezTo>
-                    <a:pt x="8132239" y="233879"/>
-                    <a:pt x="8191903" y="225939"/>
-                    <a:pt x="8253177" y="222473"/>
-                  </a:cubicBezTo>
-                  <a:cubicBezTo>
-                    <a:pt x="8274949" y="221324"/>
-                    <a:pt x="8299150" y="222976"/>
-                    <a:pt x="8320683" y="226393"/>
-                  </a:cubicBezTo>
-                  <a:cubicBezTo>
-                    <a:pt x="8424731" y="242340"/>
-                    <a:pt x="8527777" y="249266"/>
-                    <a:pt x="8631438" y="237528"/>
-                  </a:cubicBezTo>
-                  <a:cubicBezTo>
-                    <a:pt x="8649201" y="235596"/>
-                    <a:pt x="8668058" y="233915"/>
-                    <a:pt x="8686410" y="234877"/>
-                  </a:cubicBezTo>
-                  <a:cubicBezTo>
-                    <a:pt x="8786966" y="240146"/>
-                    <a:pt x="8885480" y="249315"/>
-                    <a:pt x="8980658" y="273001"/>
-                  </a:cubicBezTo>
-                  <a:cubicBezTo>
-                    <a:pt x="9012626" y="280972"/>
-                    <a:pt x="9052108" y="279035"/>
-                    <a:pt x="9087625" y="282423"/>
-                  </a:cubicBezTo>
-                  <a:cubicBezTo>
-                    <a:pt x="9120583" y="285484"/>
-                    <a:pt x="9154319" y="287825"/>
-                    <a:pt x="9186017" y="293875"/>
-                  </a:cubicBezTo>
-                  <a:cubicBezTo>
-                    <a:pt x="9232288" y="302785"/>
-                    <a:pt x="9275554" y="305815"/>
-                    <a:pt x="9323931" y="302628"/>
-                  </a:cubicBezTo>
-                  <a:cubicBezTo>
-                    <a:pt x="9370084" y="299705"/>
-                    <a:pt x="9419491" y="304964"/>
-                    <a:pt x="9467213" y="307275"/>
-                  </a:cubicBezTo>
-                  <a:cubicBezTo>
-                    <a:pt x="9520438" y="309874"/>
-                    <a:pt x="9573661" y="312473"/>
-                    <a:pt x="9626826" y="316213"/>
-                  </a:cubicBezTo>
-                  <a:cubicBezTo>
-                    <a:pt x="9648094" y="317708"/>
-                    <a:pt x="9671915" y="326588"/>
-                    <a:pt x="9689696" y="324467"/>
-                  </a:cubicBezTo>
-                  <a:cubicBezTo>
-                    <a:pt x="9747117" y="317175"/>
-                    <a:pt x="9803355" y="332523"/>
-                    <a:pt x="9860526" y="329986"/>
-                  </a:cubicBezTo>
-                  <a:cubicBezTo>
-                    <a:pt x="9888572" y="328594"/>
-                    <a:pt x="9919723" y="338048"/>
-                    <a:pt x="9949775" y="340386"/>
-                  </a:cubicBezTo>
-                  <a:cubicBezTo>
-                    <a:pt x="9998886" y="344296"/>
-                    <a:pt x="10048092" y="346302"/>
-                    <a:pt x="10097252" y="349262"/>
-                  </a:cubicBezTo>
-                  <a:cubicBezTo>
-                    <a:pt x="10113390" y="350297"/>
-                    <a:pt x="10129133" y="351886"/>
-                    <a:pt x="10145261" y="353113"/>
-                  </a:cubicBezTo>
-                  <a:cubicBezTo>
-                    <a:pt x="10159555" y="354243"/>
-                    <a:pt x="10174512" y="356743"/>
-                    <a:pt x="10188159" y="356124"/>
-                  </a:cubicBezTo>
-                  <a:cubicBezTo>
-                    <a:pt x="10237589" y="353944"/>
-                    <a:pt x="10286441" y="348682"/>
-                    <a:pt x="10336144" y="348235"/>
-                  </a:cubicBezTo>
-                  <a:cubicBezTo>
-                    <a:pt x="10379222" y="347822"/>
-                    <a:pt x="10423443" y="353764"/>
-                    <a:pt x="10466847" y="354131"/>
-                  </a:cubicBezTo>
-                  <a:cubicBezTo>
-                    <a:pt x="10543353" y="354898"/>
-                    <a:pt x="10619988" y="353190"/>
-                    <a:pt x="10696514" y="353575"/>
-                  </a:cubicBezTo>
-                  <a:cubicBezTo>
-                    <a:pt x="10713071" y="353680"/>
-                    <a:pt x="10730069" y="359342"/>
-                    <a:pt x="10746932" y="360606"/>
-                  </a:cubicBezTo>
-                  <a:cubicBezTo>
-                    <a:pt x="10799731" y="364326"/>
-                    <a:pt x="10852569" y="367289"/>
-                    <a:pt x="10905388" y="370627"/>
-                  </a:cubicBezTo>
-                  <a:cubicBezTo>
-                    <a:pt x="10935470" y="372396"/>
-                    <a:pt x="10965963" y="373421"/>
-                    <a:pt x="10995602" y="376691"/>
-                  </a:cubicBezTo>
-                  <a:cubicBezTo>
-                    <a:pt x="11034750" y="381032"/>
-                    <a:pt x="11070168" y="386324"/>
-                    <a:pt x="11107647" y="373405"/>
-                  </a:cubicBezTo>
-                  <a:cubicBezTo>
-                    <a:pt x="11165372" y="353347"/>
-                    <a:pt x="11236837" y="366060"/>
-                    <a:pt x="11302440" y="364156"/>
-                  </a:cubicBezTo>
-                  <a:cubicBezTo>
-                    <a:pt x="11319394" y="363708"/>
-                    <a:pt x="11336655" y="364422"/>
-                    <a:pt x="11353613" y="363785"/>
-                  </a:cubicBezTo>
-                  <a:cubicBezTo>
-                    <a:pt x="11384961" y="362566"/>
-                    <a:pt x="11415955" y="360947"/>
-                    <a:pt x="11447323" y="359346"/>
-                  </a:cubicBezTo>
-                  <a:cubicBezTo>
-                    <a:pt x="11452855" y="359066"/>
-                    <a:pt x="11459104" y="359200"/>
-                    <a:pt x="11464292" y="358519"/>
-                  </a:cubicBezTo>
-                  <a:cubicBezTo>
-                    <a:pt x="11512058" y="353010"/>
-                    <a:pt x="11559143" y="346321"/>
-                    <a:pt x="11607560" y="342370"/>
-                  </a:cubicBezTo>
-                  <a:cubicBezTo>
-                    <a:pt x="11631218" y="340368"/>
-                    <a:pt x="11657295" y="341352"/>
-                    <a:pt x="11681426" y="344335"/>
-                  </a:cubicBezTo>
-                  <a:cubicBezTo>
-                    <a:pt x="11751997" y="352993"/>
-                    <a:pt x="11821986" y="358760"/>
-                    <a:pt x="11893565" y="355261"/>
-                  </a:cubicBezTo>
-                  <a:cubicBezTo>
-                    <a:pt x="11921973" y="353889"/>
-                    <a:pt x="11953288" y="360300"/>
-                    <a:pt x="11983290" y="363588"/>
-                  </a:cubicBezTo>
-                  <a:lnTo>
-                    <a:pt x="12192000" y="388018"/>
-                  </a:lnTo>
-                  <a:lnTo>
-                    <a:pt x="12192000" y="577115"/>
-                  </a:lnTo>
-                  <a:lnTo>
-                    <a:pt x="12157329" y="588862"/>
-                  </a:lnTo>
-                  <a:cubicBezTo>
-                    <a:pt x="12118393" y="608572"/>
-                    <a:pt x="12109715" y="605637"/>
-                    <a:pt x="12066948" y="586034"/>
-                  </a:cubicBezTo>
-                  <a:cubicBezTo>
-                    <a:pt x="12016991" y="563193"/>
-                    <a:pt x="11965119" y="541779"/>
-                    <a:pt x="11911344" y="521599"/>
-                  </a:cubicBezTo>
-                  <a:cubicBezTo>
-                    <a:pt x="11894383" y="515178"/>
-                    <a:pt x="11869417" y="514060"/>
-                    <a:pt x="11847823" y="511785"/>
-                  </a:cubicBezTo>
-                  <a:cubicBezTo>
-                    <a:pt x="11811233" y="507768"/>
-                    <a:pt x="11773630" y="501982"/>
-                    <a:pt x="11737547" y="502380"/>
-                  </a:cubicBezTo>
-                  <a:cubicBezTo>
-                    <a:pt x="11702930" y="502855"/>
-                    <a:pt x="11668388" y="508866"/>
-                    <a:pt x="11636052" y="514993"/>
-                  </a:cubicBezTo>
-                  <a:cubicBezTo>
-                    <a:pt x="11545722" y="532199"/>
-                    <a:pt x="11462455" y="555118"/>
-                    <a:pt x="11394706" y="590867"/>
-                  </a:cubicBezTo>
-                  <a:cubicBezTo>
-                    <a:pt x="11385999" y="595562"/>
-                    <a:pt x="11369016" y="596581"/>
-                    <a:pt x="11354978" y="597561"/>
-                  </a:cubicBezTo>
-                  <a:cubicBezTo>
-                    <a:pt x="11332076" y="599224"/>
-                    <a:pt x="11308448" y="600655"/>
-                    <a:pt x="11285306" y="599825"/>
-                  </a:cubicBezTo>
-                  <a:cubicBezTo>
-                    <a:pt x="11172906" y="595841"/>
-                    <a:pt x="11083430" y="617861"/>
-                    <a:pt x="11008528" y="656670"/>
-                  </a:cubicBezTo>
-                  <a:cubicBezTo>
-                    <a:pt x="10986971" y="667750"/>
-                    <a:pt x="10970753" y="668236"/>
-                    <a:pt x="10948735" y="652964"/>
-                  </a:cubicBezTo>
-                  <a:cubicBezTo>
-                    <a:pt x="10923173" y="635218"/>
-                    <a:pt x="10885031" y="639705"/>
-                    <a:pt x="10850698" y="641721"/>
-                  </a:cubicBezTo>
-                  <a:cubicBezTo>
-                    <a:pt x="10815269" y="643680"/>
-                    <a:pt x="10779458" y="645811"/>
-                    <a:pt x="10744026" y="647769"/>
-                  </a:cubicBezTo>
-                  <a:cubicBezTo>
-                    <a:pt x="10717832" y="649066"/>
-                    <a:pt x="10692021" y="650003"/>
-                    <a:pt x="10666160" y="651891"/>
-                  </a:cubicBezTo>
-                  <a:cubicBezTo>
-                    <a:pt x="10585627" y="657783"/>
-                    <a:pt x="10513854" y="650969"/>
-                    <a:pt x="10450521" y="616552"/>
-                  </a:cubicBezTo>
-                  <a:cubicBezTo>
-                    <a:pt x="10402221" y="590175"/>
-                    <a:pt x="10339099" y="579806"/>
-                    <a:pt x="10271192" y="583498"/>
-                  </a:cubicBezTo>
-                  <a:cubicBezTo>
-                    <a:pt x="10262701" y="584006"/>
-                    <a:pt x="10251859" y="587254"/>
-                    <a:pt x="10246067" y="585423"/>
-                  </a:cubicBezTo>
-                  <a:cubicBezTo>
-                    <a:pt x="10158786" y="558528"/>
-                    <a:pt x="10086634" y="594049"/>
-                    <a:pt x="10005027" y="592252"/>
-                  </a:cubicBezTo>
-                  <a:cubicBezTo>
-                    <a:pt x="9969004" y="591507"/>
-                    <a:pt x="9931565" y="603664"/>
-                    <a:pt x="9898681" y="613195"/>
-                  </a:cubicBezTo>
-                  <a:cubicBezTo>
-                    <a:pt x="9853463" y="626281"/>
-                    <a:pt x="9813049" y="639042"/>
-                    <a:pt x="9753225" y="629038"/>
-                  </a:cubicBezTo>
-                  <a:cubicBezTo>
-                    <a:pt x="9693404" y="618845"/>
-                    <a:pt x="9637675" y="628898"/>
-                    <a:pt x="9591376" y="648601"/>
-                  </a:cubicBezTo>
-                  <a:cubicBezTo>
-                    <a:pt x="9556001" y="663537"/>
-                    <a:pt x="9518120" y="663077"/>
-                    <a:pt x="9472860" y="655936"/>
-                  </a:cubicBezTo>
-                  <a:cubicBezTo>
-                    <a:pt x="9416283" y="647056"/>
-                    <a:pt x="9357217" y="643578"/>
-                    <a:pt x="9299788" y="636945"/>
-                  </a:cubicBezTo>
-                  <a:cubicBezTo>
-                    <a:pt x="9287347" y="635531"/>
-                    <a:pt x="9271710" y="632039"/>
-                    <a:pt x="9264605" y="627087"/>
-                  </a:cubicBezTo>
-                  <a:cubicBezTo>
-                    <a:pt x="9177661" y="565680"/>
-                    <a:pt x="9051076" y="558473"/>
-                    <a:pt x="8926435" y="549269"/>
-                  </a:cubicBezTo>
-                  <a:cubicBezTo>
-                    <a:pt x="8850925" y="543595"/>
-                    <a:pt x="8774954" y="539613"/>
-                    <a:pt x="8698934" y="536583"/>
-                  </a:cubicBezTo>
-                  <a:cubicBezTo>
-                    <a:pt x="8673232" y="535428"/>
-                    <a:pt x="8645916" y="537050"/>
-                    <a:pt x="8622862" y="541563"/>
-                  </a:cubicBezTo>
-                  <a:cubicBezTo>
-                    <a:pt x="8574890" y="551069"/>
-                    <a:pt x="8530403" y="564380"/>
-                    <a:pt x="8482784" y="574094"/>
-                  </a:cubicBezTo>
-                  <a:cubicBezTo>
-                    <a:pt x="8464923" y="577929"/>
-                    <a:pt x="8442157" y="576927"/>
-                    <a:pt x="8421565" y="576610"/>
-                  </a:cubicBezTo>
-                  <a:cubicBezTo>
-                    <a:pt x="8385152" y="576229"/>
-                    <a:pt x="8345023" y="569546"/>
-                    <a:pt x="8313469" y="574762"/>
-                  </a:cubicBezTo>
-                  <a:cubicBezTo>
-                    <a:pt x="8231431" y="588203"/>
-                    <a:pt x="8155671" y="580227"/>
-                    <a:pt x="8079520" y="558685"/>
-                  </a:cubicBezTo>
-                  <a:cubicBezTo>
-                    <a:pt x="7972906" y="528487"/>
-                    <a:pt x="7870782" y="525043"/>
-                    <a:pt x="7773327" y="558854"/>
-                  </a:cubicBezTo>
-                  <a:cubicBezTo>
-                    <a:pt x="7729470" y="574107"/>
-                    <a:pt x="7688069" y="563543"/>
-                    <a:pt x="7652477" y="547561"/>
-                  </a:cubicBezTo>
-                  <a:cubicBezTo>
-                    <a:pt x="7611494" y="529005"/>
-                    <a:pt x="7570974" y="522685"/>
-                    <a:pt x="7522274" y="532150"/>
-                  </a:cubicBezTo>
-                  <a:cubicBezTo>
-                    <a:pt x="7511488" y="534257"/>
-                    <a:pt x="7496511" y="532136"/>
-                    <a:pt x="7484080" y="530532"/>
-                  </a:cubicBezTo>
-                  <a:cubicBezTo>
-                    <a:pt x="7413133" y="522044"/>
-                    <a:pt x="7341987" y="510303"/>
-                    <a:pt x="7282277" y="540177"/>
-                  </a:cubicBezTo>
-                  <a:cubicBezTo>
-                    <a:pt x="7270558" y="546051"/>
-                    <a:pt x="7251336" y="547713"/>
-                    <a:pt x="7235690" y="551282"/>
-                  </a:cubicBezTo>
-                  <a:cubicBezTo>
-                    <a:pt x="7170161" y="565782"/>
-                    <a:pt x="7172820" y="564203"/>
-                    <a:pt x="7116339" y="539494"/>
-                  </a:cubicBezTo>
-                  <a:cubicBezTo>
-                    <a:pt x="7086841" y="526502"/>
-                    <a:pt x="7045980" y="512724"/>
-                    <a:pt x="7011067" y="511848"/>
-                  </a:cubicBezTo>
-                  <a:cubicBezTo>
-                    <a:pt x="6800473" y="506533"/>
-                    <a:pt x="6601893" y="468653"/>
-                    <a:pt x="6403234" y="432296"/>
-                  </a:cubicBezTo>
-                  <a:cubicBezTo>
-                    <a:pt x="6280760" y="409851"/>
-                    <a:pt x="6160432" y="402592"/>
-                    <a:pt x="6036273" y="412301"/>
-                  </a:cubicBezTo>
-                  <a:cubicBezTo>
-                    <a:pt x="5946471" y="419425"/>
-                    <a:pt x="5863077" y="395593"/>
-                    <a:pt x="5780467" y="377910"/>
-                  </a:cubicBezTo>
-                  <a:cubicBezTo>
-                    <a:pt x="5763357" y="374343"/>
-                    <a:pt x="5747757" y="363033"/>
-                    <a:pt x="5739051" y="353609"/>
-                  </a:cubicBezTo>
-                  <a:cubicBezTo>
-                    <a:pt x="5707675" y="320294"/>
-                    <a:pt x="5653252" y="312483"/>
-                    <a:pt x="5583566" y="321995"/>
-                  </a:cubicBezTo>
-                  <a:cubicBezTo>
-                    <a:pt x="5528347" y="329404"/>
-                    <a:pt x="5477716" y="340486"/>
-                    <a:pt x="5432030" y="362512"/>
-                  </a:cubicBezTo>
-                  <a:cubicBezTo>
-                    <a:pt x="5378421" y="388318"/>
-                    <a:pt x="5322767" y="418026"/>
-                    <a:pt x="5241398" y="425781"/>
-                  </a:cubicBezTo>
-                  <a:cubicBezTo>
-                    <a:pt x="5206262" y="429089"/>
-                    <a:pt x="5176131" y="428273"/>
-                    <a:pt x="5139710" y="421022"/>
-                  </a:cubicBezTo>
-                  <a:cubicBezTo>
-                    <a:pt x="5069048" y="407018"/>
-                    <a:pt x="4997864" y="396037"/>
-                    <a:pt x="4929402" y="424310"/>
-                  </a:cubicBezTo>
-                  <a:cubicBezTo>
-                    <a:pt x="4891785" y="439890"/>
-                    <a:pt x="4841650" y="448519"/>
-                    <a:pt x="4782793" y="441046"/>
-                  </a:cubicBezTo>
-                  <a:cubicBezTo>
-                    <a:pt x="4709316" y="431663"/>
-                    <a:pt x="4641426" y="442031"/>
-                    <a:pt x="4577594" y="459290"/>
-                  </a:cubicBezTo>
-                  <a:cubicBezTo>
-                    <a:pt x="4554816" y="465538"/>
-                    <a:pt x="4527069" y="468279"/>
-                    <a:pt x="4500826" y="470529"/>
-                  </a:cubicBezTo>
-                  <a:cubicBezTo>
-                    <a:pt x="4440199" y="475746"/>
-                    <a:pt x="4379252" y="479993"/>
-                    <a:pt x="4317973" y="483649"/>
-                  </a:cubicBezTo>
-                  <a:cubicBezTo>
-                    <a:pt x="4267762" y="486741"/>
-                    <a:pt x="4217264" y="488292"/>
-                    <a:pt x="4166722" y="490602"/>
-                  </a:cubicBezTo>
-                  <a:cubicBezTo>
-                    <a:pt x="4111394" y="493045"/>
-                    <a:pt x="4067073" y="503124"/>
-                    <a:pt x="4042814" y="530660"/>
-                  </a:cubicBezTo>
-                  <a:cubicBezTo>
-                    <a:pt x="4034996" y="539407"/>
-                    <a:pt x="4017001" y="545715"/>
-                    <a:pt x="4002653" y="552594"/>
-                  </a:cubicBezTo>
-                  <a:cubicBezTo>
-                    <a:pt x="3992459" y="557592"/>
-                    <a:pt x="3979023" y="561086"/>
-                    <a:pt x="3969549" y="566312"/>
-                  </a:cubicBezTo>
-                  <a:cubicBezTo>
-                    <a:pt x="3919896" y="593854"/>
-                    <a:pt x="3870968" y="621622"/>
-                    <a:pt x="3821685" y="649183"/>
-                  </a:cubicBezTo>
-                  <a:cubicBezTo>
-                    <a:pt x="3816761" y="651788"/>
-                    <a:pt x="3811445" y="654943"/>
-                    <a:pt x="3805138" y="655947"/>
-                  </a:cubicBezTo>
-                  <a:cubicBezTo>
-                    <a:pt x="3739817" y="666451"/>
-                    <a:pt x="3673801" y="676154"/>
-                    <a:pt x="3609177" y="687459"/>
-                  </a:cubicBezTo>
-                  <a:cubicBezTo>
-                    <a:pt x="3584288" y="691878"/>
-                    <a:pt x="3558597" y="697589"/>
-                    <a:pt x="3539727" y="706521"/>
-                  </a:cubicBezTo>
-                  <a:cubicBezTo>
-                    <a:pt x="3496714" y="726780"/>
-                    <a:pt x="3457268" y="749132"/>
-                    <a:pt x="3396572" y="755681"/>
-                  </a:cubicBezTo>
-                  <a:cubicBezTo>
-                    <a:pt x="3378807" y="757611"/>
-                    <a:pt x="3357809" y="758036"/>
-                    <a:pt x="3341054" y="754679"/>
-                  </a:cubicBezTo>
-                  <a:cubicBezTo>
-                    <a:pt x="3272962" y="740809"/>
-                    <a:pt x="3206471" y="724541"/>
-                    <a:pt x="3138775" y="710120"/>
-                  </a:cubicBezTo>
-                  <a:cubicBezTo>
-                    <a:pt x="3095820" y="701191"/>
-                    <a:pt x="3056969" y="691141"/>
-                    <a:pt x="3037283" y="666453"/>
-                  </a:cubicBezTo>
-                  <a:cubicBezTo>
-                    <a:pt x="3031764" y="659487"/>
-                    <a:pt x="3015626" y="651391"/>
-                    <a:pt x="3002117" y="649347"/>
-                  </a:cubicBezTo>
-                  <a:cubicBezTo>
-                    <a:pt x="2915220" y="636209"/>
-                    <a:pt x="2829194" y="627503"/>
-                    <a:pt x="2747294" y="652400"/>
-                  </a:cubicBezTo>
-                  <a:cubicBezTo>
-                    <a:pt x="2730084" y="657794"/>
-                    <a:pt x="2698519" y="656140"/>
-                    <a:pt x="2676273" y="652304"/>
-                  </a:cubicBezTo>
-                  <a:cubicBezTo>
-                    <a:pt x="2590546" y="637890"/>
-                    <a:pt x="2508883" y="630176"/>
-                    <a:pt x="2432360" y="657836"/>
-                  </a:cubicBezTo>
-                  <a:cubicBezTo>
-                    <a:pt x="2423352" y="661179"/>
-                    <a:pt x="2395274" y="656272"/>
-                    <a:pt x="2382311" y="650824"/>
-                  </a:cubicBezTo>
-                  <a:cubicBezTo>
-                    <a:pt x="2257393" y="597728"/>
-                    <a:pt x="2187724" y="592930"/>
-                    <a:pt x="2055134" y="630053"/>
-                  </a:cubicBezTo>
-                  <a:cubicBezTo>
-                    <a:pt x="2046542" y="632464"/>
-                    <a:pt x="2035364" y="635121"/>
-                    <a:pt x="2031829" y="639324"/>
-                  </a:cubicBezTo>
-                  <a:cubicBezTo>
-                    <a:pt x="2007977" y="666120"/>
-                    <a:pt x="1960229" y="664380"/>
-                    <a:pt x="1912764" y="664183"/>
-                  </a:cubicBezTo>
-                  <a:cubicBezTo>
-                    <a:pt x="1860521" y="663924"/>
-                    <a:pt x="1808236" y="664426"/>
-                    <a:pt x="1755637" y="663960"/>
-                  </a:cubicBezTo>
-                  <a:cubicBezTo>
-                    <a:pt x="1746439" y="663859"/>
-                    <a:pt x="1736243" y="661799"/>
-                    <a:pt x="1727159" y="659605"/>
-                  </a:cubicBezTo>
-                  <a:cubicBezTo>
-                    <a:pt x="1692256" y="651480"/>
-                    <a:pt x="1658604" y="640559"/>
-                    <a:pt x="1622470" y="634850"/>
-                  </a:cubicBezTo>
-                  <a:cubicBezTo>
-                    <a:pt x="1544362" y="622552"/>
-                    <a:pt x="1469248" y="602210"/>
-                    <a:pt x="1385955" y="604522"/>
-                  </a:cubicBezTo>
-                  <a:cubicBezTo>
-                    <a:pt x="1371585" y="604913"/>
-                    <a:pt x="1355357" y="598530"/>
-                    <a:pt x="1340055" y="595629"/>
-                  </a:cubicBezTo>
-                  <a:cubicBezTo>
-                    <a:pt x="1312351" y="590552"/>
-                    <a:pt x="1285460" y="583993"/>
-                    <a:pt x="1257271" y="581180"/>
-                  </a:cubicBezTo>
-                  <a:cubicBezTo>
-                    <a:pt x="1182583" y="573830"/>
-                    <a:pt x="1107142" y="566824"/>
-                    <a:pt x="1031914" y="562692"/>
-                  </a:cubicBezTo>
-                  <a:cubicBezTo>
-                    <a:pt x="995593" y="560597"/>
-                    <a:pt x="958880" y="565923"/>
-                    <a:pt x="922031" y="566853"/>
-                  </a:cubicBezTo>
-                  <a:cubicBezTo>
-                    <a:pt x="905446" y="567320"/>
-                    <a:pt x="878533" y="568199"/>
-                    <a:pt x="873250" y="563724"/>
-                  </a:cubicBezTo>
-                  <a:cubicBezTo>
-                    <a:pt x="832343" y="529722"/>
-                    <a:pt x="772202" y="532674"/>
-                    <a:pt x="711627" y="529880"/>
-                  </a:cubicBezTo>
-                  <a:cubicBezTo>
-                    <a:pt x="577999" y="523641"/>
-                    <a:pt x="447408" y="543696"/>
-                    <a:pt x="311112" y="525106"/>
-                  </a:cubicBezTo>
-                  <a:cubicBezTo>
-                    <a:pt x="271645" y="519795"/>
-                    <a:pt x="226936" y="530235"/>
-                    <a:pt x="184145" y="532188"/>
-                  </a:cubicBezTo>
-                  <a:cubicBezTo>
-                    <a:pt x="162015" y="533128"/>
-                    <a:pt x="137665" y="534333"/>
-                    <a:pt x="116886" y="530572"/>
-                  </a:cubicBezTo>
-                  <a:cubicBezTo>
-                    <a:pt x="84810" y="524693"/>
-                    <a:pt x="54011" y="515448"/>
-                    <a:pt x="23941" y="506433"/>
-                  </a:cubicBezTo>
-                  <a:lnTo>
-                    <a:pt x="0" y="502149"/>
-                  </a:lnTo>
-                  <a:close/>
-                </a:path>
-              </a:pathLst>
-            </a:custGeom>
-            <a:blipFill>
-              <a:blip r:embed="rId3">
-                <a:alphaModFix amt="57000"/>
-              </a:blip>
-              <a:tile tx="0" ty="0" sx="100000" sy="100000" flip="none" algn="tl"/>
-            </a:blipFill>
-            <a:ln w="12700" cap="flat" cmpd="sng" algn="ctr">
-              <a:noFill/>
-              <a:prstDash val="solid"/>
-              <a:miter lim="800000"/>
-            </a:ln>
-            <a:effectLst/>
-          </p:spPr>
-          <p:style>
-            <a:lnRef idx="2">
-              <a:schemeClr val="accent1">
-                <a:shade val="50000"/>
-              </a:schemeClr>
-            </a:lnRef>
-            <a:fillRef idx="1">
-              <a:schemeClr val="accent1"/>
-            </a:fillRef>
-            <a:effectRef idx="0">
-              <a:schemeClr val="accent1"/>
-            </a:effectRef>
-            <a:fontRef idx="minor">
-              <a:schemeClr val="lt1"/>
-            </a:fontRef>
-          </p:style>
-          <p:txBody>
-            <a:bodyPr wrap="square" rtlCol="0" anchor="ctr">
-              <a:noAutofit/>
-            </a:bodyPr>
-            <a:lstStyle/>
-            <a:p>
-              <a:pPr algn="ctr"/>
-              <a:endParaRPr lang="en-US"/>
-            </a:p>
-          </p:txBody>
-        </p:sp>
-      </p:grpSp>
     </p:spTree>
     <p:extLst>
       <p:ext uri="{BB962C8B-B14F-4D97-AF65-F5344CB8AC3E}">
@@ -39881,6 +36207,136 @@
   <p:clrMapOvr>
     <a:masterClrMapping/>
   </p:clrMapOvr>
+  <p:timing>
+    <p:tnLst>
+      <p:par>
+        <p:cTn id="1" dur="indefinite" restart="never" nodeType="tmRoot">
+          <p:childTnLst>
+            <p:seq concurrent="1" nextAc="seek">
+              <p:cTn id="2" dur="indefinite" nodeType="mainSeq">
+                <p:childTnLst>
+                  <p:par>
+                    <p:cTn id="3" fill="hold">
+                      <p:stCondLst>
+                        <p:cond delay="indefinite"/>
+                        <p:cond evt="onBegin" delay="0">
+                          <p:tn val="2"/>
+                        </p:cond>
+                      </p:stCondLst>
+                      <p:childTnLst>
+                        <p:par>
+                          <p:cTn id="4" fill="hold">
+                            <p:stCondLst>
+                              <p:cond delay="0"/>
+                            </p:stCondLst>
+                            <p:childTnLst>
+                              <p:par>
+                                <p:cTn id="5" presetID="10" presetClass="entr" presetSubtype="0" fill="hold" nodeType="withEffect">
+                                  <p:stCondLst>
+                                    <p:cond delay="0"/>
+                                  </p:stCondLst>
+                                  <p:iterate>
+                                    <p:tmPct val="10000"/>
+                                  </p:iterate>
+                                  <p:childTnLst>
+                                    <p:set>
+                                      <p:cBhvr>
+                                        <p:cTn id="6" dur="1" fill="hold">
+                                          <p:stCondLst>
+                                            <p:cond delay="0"/>
+                                          </p:stCondLst>
+                                        </p:cTn>
+                                        <p:tgtEl>
+                                          <p:spTgt spid="11"/>
+                                        </p:tgtEl>
+                                        <p:attrNameLst>
+                                          <p:attrName>style.visibility</p:attrName>
+                                        </p:attrNameLst>
+                                      </p:cBhvr>
+                                      <p:to>
+                                        <p:strVal val="visible"/>
+                                      </p:to>
+                                    </p:set>
+                                    <p:animEffect transition="in" filter="fade">
+                                      <p:cBhvr>
+                                        <p:cTn id="7" dur="700"/>
+                                        <p:tgtEl>
+                                          <p:spTgt spid="11"/>
+                                        </p:tgtEl>
+                                      </p:cBhvr>
+                                    </p:animEffect>
+                                  </p:childTnLst>
+                                </p:cTn>
+                              </p:par>
+                              <p:par>
+                                <p:cTn id="8" presetID="10" presetClass="entr" presetSubtype="0" fill="hold" grpId="0" nodeType="withEffect">
+                                  <p:stCondLst>
+                                    <p:cond delay="1000"/>
+                                  </p:stCondLst>
+                                  <p:iterate type="lt">
+                                    <p:tmPct val="10000"/>
+                                  </p:iterate>
+                                  <p:childTnLst>
+                                    <p:set>
+                                      <p:cBhvr>
+                                        <p:cTn id="9" dur="1" fill="hold">
+                                          <p:stCondLst>
+                                            <p:cond delay="0"/>
+                                          </p:stCondLst>
+                                        </p:cTn>
+                                        <p:tgtEl>
+                                          <p:spTgt spid="2"/>
+                                        </p:tgtEl>
+                                        <p:attrNameLst>
+                                          <p:attrName>style.visibility</p:attrName>
+                                        </p:attrNameLst>
+                                      </p:cBhvr>
+                                      <p:to>
+                                        <p:strVal val="visible"/>
+                                      </p:to>
+                                    </p:set>
+                                    <p:animEffect transition="in" filter="fade">
+                                      <p:cBhvr>
+                                        <p:cTn id="10" dur="400"/>
+                                        <p:tgtEl>
+                                          <p:spTgt spid="2"/>
+                                        </p:tgtEl>
+                                      </p:cBhvr>
+                                    </p:animEffect>
+                                  </p:childTnLst>
+                                </p:cTn>
+                              </p:par>
+                            </p:childTnLst>
+                          </p:cTn>
+                        </p:par>
+                      </p:childTnLst>
+                    </p:cTn>
+                  </p:par>
+                </p:childTnLst>
+              </p:cTn>
+              <p:prevCondLst>
+                <p:cond evt="onPrev" delay="0">
+                  <p:tgtEl>
+                    <p:sldTgt/>
+                  </p:tgtEl>
+                </p:cond>
+              </p:prevCondLst>
+              <p:nextCondLst>
+                <p:cond evt="onNext" delay="0">
+                  <p:tgtEl>
+                    <p:sldTgt/>
+                  </p:tgtEl>
+                </p:cond>
+              </p:nextCondLst>
+            </p:seq>
+          </p:childTnLst>
+        </p:cTn>
+      </p:par>
+    </p:tnLst>
+    <p:bldLst>
+      <p:bldP spid="2" grpId="0"/>
+    </p:bldLst>
+  </p:timing>
 </p:sld>
 </file>
 

</xml_diff>